<commit_message>
Add more slides and add Presentation_text.doc
</commit_message>
<xml_diff>
--- a/CLOUD COMPUTING.pptx
+++ b/CLOUD COMPUTING.pptx
@@ -5,7 +5,7 @@
     <p:sldMasterId id="2147483648" r:id="rId1"/>
   </p:sldMasterIdLst>
   <p:notesMasterIdLst>
-    <p:notesMasterId r:id="rId9"/>
+    <p:notesMasterId r:id="rId14"/>
   </p:notesMasterIdLst>
   <p:sldIdLst>
     <p:sldId id="256" r:id="rId2"/>
@@ -14,7 +14,12 @@
     <p:sldId id="263" r:id="rId5"/>
     <p:sldId id="258" r:id="rId6"/>
     <p:sldId id="259" r:id="rId7"/>
-    <p:sldId id="264" r:id="rId8"/>
+    <p:sldId id="265" r:id="rId8"/>
+    <p:sldId id="266" r:id="rId9"/>
+    <p:sldId id="264" r:id="rId10"/>
+    <p:sldId id="267" r:id="rId11"/>
+    <p:sldId id="268" r:id="rId12"/>
+    <p:sldId id="269" r:id="rId13"/>
   </p:sldIdLst>
   <p:sldSz cx="12192000" cy="6858000"/>
   <p:notesSz cx="6858000" cy="9144000"/>
@@ -713,7 +718,427 @@
     </p:spTree>
     <p:extLst>
       <p:ext uri="{BB962C8B-B14F-4D97-AF65-F5344CB8AC3E}">
+        <p14:creationId xmlns:p14="http://schemas.microsoft.com/office/powerpoint/2010/main" val="1676535005"/>
+      </p:ext>
+    </p:extLst>
+  </p:cSld>
+  <p:clrMapOvr>
+    <a:masterClrMapping/>
+  </p:clrMapOvr>
+</p:notes>
+</file>
+
+<file path=ppt/notesSlides/notesSlide4.xml><?xml version="1.0" encoding="utf-8"?>
+<p:notes xmlns:a="http://schemas.openxmlformats.org/drawingml/2006/main" xmlns:r="http://schemas.openxmlformats.org/officeDocument/2006/relationships" xmlns:p="http://schemas.openxmlformats.org/presentationml/2006/main">
+  <p:cSld>
+    <p:spTree>
+      <p:nvGrpSpPr>
+        <p:cNvPr id="1" name=""/>
+        <p:cNvGrpSpPr/>
+        <p:nvPr/>
+      </p:nvGrpSpPr>
+      <p:grpSpPr>
+        <a:xfrm>
+          <a:off x="0" y="0"/>
+          <a:ext cx="0" cy="0"/>
+          <a:chOff x="0" y="0"/>
+          <a:chExt cx="0" cy="0"/>
+        </a:xfrm>
+      </p:grpSpPr>
+      <p:sp>
+        <p:nvSpPr>
+          <p:cNvPr id="2" name="Контейнер за изображение на слайда 1"/>
+          <p:cNvSpPr>
+            <a:spLocks noGrp="1" noRot="1" noChangeAspect="1"/>
+          </p:cNvSpPr>
+          <p:nvPr>
+            <p:ph type="sldImg"/>
+          </p:nvPr>
+        </p:nvSpPr>
+        <p:spPr/>
+      </p:sp>
+      <p:sp>
+        <p:nvSpPr>
+          <p:cNvPr id="3" name="Контейнер за бележки 2"/>
+          <p:cNvSpPr>
+            <a:spLocks noGrp="1"/>
+          </p:cNvSpPr>
+          <p:nvPr>
+            <p:ph type="body" idx="1"/>
+          </p:nvPr>
+        </p:nvSpPr>
+        <p:spPr/>
+        <p:txBody>
+          <a:bodyPr/>
+          <a:lstStyle/>
+          <a:p>
+            <a:endParaRPr lang="en-US" dirty="0"/>
+          </a:p>
+        </p:txBody>
+      </p:sp>
+      <p:sp>
+        <p:nvSpPr>
+          <p:cNvPr id="4" name="Контейнер за номер на слайда 3"/>
+          <p:cNvSpPr>
+            <a:spLocks noGrp="1"/>
+          </p:cNvSpPr>
+          <p:nvPr>
+            <p:ph type="sldNum" sz="quarter" idx="10"/>
+          </p:nvPr>
+        </p:nvSpPr>
+        <p:spPr/>
+        <p:txBody>
+          <a:bodyPr/>
+          <a:lstStyle/>
+          <a:p>
+            <a:fld id="{34DB9454-9595-409E-8BC5-8848C7CC2ACF}" type="slidenum">
+              <a:rPr lang="en-US" smtClean="0"/>
+              <a:t>8</a:t>
+            </a:fld>
+            <a:endParaRPr lang="en-US"/>
+          </a:p>
+        </p:txBody>
+      </p:sp>
+    </p:spTree>
+    <p:extLst>
+      <p:ext uri="{BB962C8B-B14F-4D97-AF65-F5344CB8AC3E}">
+        <p14:creationId xmlns:p14="http://schemas.microsoft.com/office/powerpoint/2010/main" val="2243907018"/>
+      </p:ext>
+    </p:extLst>
+  </p:cSld>
+  <p:clrMapOvr>
+    <a:masterClrMapping/>
+  </p:clrMapOvr>
+</p:notes>
+</file>
+
+<file path=ppt/notesSlides/notesSlide5.xml><?xml version="1.0" encoding="utf-8"?>
+<p:notes xmlns:a="http://schemas.openxmlformats.org/drawingml/2006/main" xmlns:r="http://schemas.openxmlformats.org/officeDocument/2006/relationships" xmlns:p="http://schemas.openxmlformats.org/presentationml/2006/main">
+  <p:cSld>
+    <p:spTree>
+      <p:nvGrpSpPr>
+        <p:cNvPr id="1" name=""/>
+        <p:cNvGrpSpPr/>
+        <p:nvPr/>
+      </p:nvGrpSpPr>
+      <p:grpSpPr>
+        <a:xfrm>
+          <a:off x="0" y="0"/>
+          <a:ext cx="0" cy="0"/>
+          <a:chOff x="0" y="0"/>
+          <a:chExt cx="0" cy="0"/>
+        </a:xfrm>
+      </p:grpSpPr>
+      <p:sp>
+        <p:nvSpPr>
+          <p:cNvPr id="2" name="Контейнер за изображение на слайда 1"/>
+          <p:cNvSpPr>
+            <a:spLocks noGrp="1" noRot="1" noChangeAspect="1"/>
+          </p:cNvSpPr>
+          <p:nvPr>
+            <p:ph type="sldImg"/>
+          </p:nvPr>
+        </p:nvSpPr>
+        <p:spPr/>
+      </p:sp>
+      <p:sp>
+        <p:nvSpPr>
+          <p:cNvPr id="3" name="Контейнер за бележки 2"/>
+          <p:cNvSpPr>
+            <a:spLocks noGrp="1"/>
+          </p:cNvSpPr>
+          <p:nvPr>
+            <p:ph type="body" idx="1"/>
+          </p:nvPr>
+        </p:nvSpPr>
+        <p:spPr/>
+        <p:txBody>
+          <a:bodyPr/>
+          <a:lstStyle/>
+          <a:p>
+            <a:endParaRPr lang="en-US" dirty="0"/>
+          </a:p>
+        </p:txBody>
+      </p:sp>
+      <p:sp>
+        <p:nvSpPr>
+          <p:cNvPr id="4" name="Контейнер за номер на слайда 3"/>
+          <p:cNvSpPr>
+            <a:spLocks noGrp="1"/>
+          </p:cNvSpPr>
+          <p:nvPr>
+            <p:ph type="sldNum" sz="quarter" idx="10"/>
+          </p:nvPr>
+        </p:nvSpPr>
+        <p:spPr/>
+        <p:txBody>
+          <a:bodyPr/>
+          <a:lstStyle/>
+          <a:p>
+            <a:fld id="{34DB9454-9595-409E-8BC5-8848C7CC2ACF}" type="slidenum">
+              <a:rPr lang="en-US" smtClean="0"/>
+              <a:t>9</a:t>
+            </a:fld>
+            <a:endParaRPr lang="en-US"/>
+          </a:p>
+        </p:txBody>
+      </p:sp>
+    </p:spTree>
+    <p:extLst>
+      <p:ext uri="{BB962C8B-B14F-4D97-AF65-F5344CB8AC3E}">
         <p14:creationId xmlns:p14="http://schemas.microsoft.com/office/powerpoint/2010/main" val="2192015838"/>
+      </p:ext>
+    </p:extLst>
+  </p:cSld>
+  <p:clrMapOvr>
+    <a:masterClrMapping/>
+  </p:clrMapOvr>
+</p:notes>
+</file>
+
+<file path=ppt/notesSlides/notesSlide6.xml><?xml version="1.0" encoding="utf-8"?>
+<p:notes xmlns:a="http://schemas.openxmlformats.org/drawingml/2006/main" xmlns:r="http://schemas.openxmlformats.org/officeDocument/2006/relationships" xmlns:p="http://schemas.openxmlformats.org/presentationml/2006/main">
+  <p:cSld>
+    <p:spTree>
+      <p:nvGrpSpPr>
+        <p:cNvPr id="1" name=""/>
+        <p:cNvGrpSpPr/>
+        <p:nvPr/>
+      </p:nvGrpSpPr>
+      <p:grpSpPr>
+        <a:xfrm>
+          <a:off x="0" y="0"/>
+          <a:ext cx="0" cy="0"/>
+          <a:chOff x="0" y="0"/>
+          <a:chExt cx="0" cy="0"/>
+        </a:xfrm>
+      </p:grpSpPr>
+      <p:sp>
+        <p:nvSpPr>
+          <p:cNvPr id="2" name="Контейнер за изображение на слайда 1"/>
+          <p:cNvSpPr>
+            <a:spLocks noGrp="1" noRot="1" noChangeAspect="1"/>
+          </p:cNvSpPr>
+          <p:nvPr>
+            <p:ph type="sldImg"/>
+          </p:nvPr>
+        </p:nvSpPr>
+        <p:spPr/>
+      </p:sp>
+      <p:sp>
+        <p:nvSpPr>
+          <p:cNvPr id="3" name="Контейнер за бележки 2"/>
+          <p:cNvSpPr>
+            <a:spLocks noGrp="1"/>
+          </p:cNvSpPr>
+          <p:nvPr>
+            <p:ph type="body" idx="1"/>
+          </p:nvPr>
+        </p:nvSpPr>
+        <p:spPr/>
+        <p:txBody>
+          <a:bodyPr/>
+          <a:lstStyle/>
+          <a:p>
+            <a:endParaRPr lang="en-US" dirty="0"/>
+          </a:p>
+        </p:txBody>
+      </p:sp>
+      <p:sp>
+        <p:nvSpPr>
+          <p:cNvPr id="4" name="Контейнер за номер на слайда 3"/>
+          <p:cNvSpPr>
+            <a:spLocks noGrp="1"/>
+          </p:cNvSpPr>
+          <p:nvPr>
+            <p:ph type="sldNum" sz="quarter" idx="10"/>
+          </p:nvPr>
+        </p:nvSpPr>
+        <p:spPr/>
+        <p:txBody>
+          <a:bodyPr/>
+          <a:lstStyle/>
+          <a:p>
+            <a:fld id="{34DB9454-9595-409E-8BC5-8848C7CC2ACF}" type="slidenum">
+              <a:rPr lang="en-US" smtClean="0"/>
+              <a:t>10</a:t>
+            </a:fld>
+            <a:endParaRPr lang="en-US"/>
+          </a:p>
+        </p:txBody>
+      </p:sp>
+    </p:spTree>
+    <p:extLst>
+      <p:ext uri="{BB962C8B-B14F-4D97-AF65-F5344CB8AC3E}">
+        <p14:creationId xmlns:p14="http://schemas.microsoft.com/office/powerpoint/2010/main" val="3897183721"/>
+      </p:ext>
+    </p:extLst>
+  </p:cSld>
+  <p:clrMapOvr>
+    <a:masterClrMapping/>
+  </p:clrMapOvr>
+</p:notes>
+</file>
+
+<file path=ppt/notesSlides/notesSlide7.xml><?xml version="1.0" encoding="utf-8"?>
+<p:notes xmlns:a="http://schemas.openxmlformats.org/drawingml/2006/main" xmlns:r="http://schemas.openxmlformats.org/officeDocument/2006/relationships" xmlns:p="http://schemas.openxmlformats.org/presentationml/2006/main">
+  <p:cSld>
+    <p:spTree>
+      <p:nvGrpSpPr>
+        <p:cNvPr id="1" name=""/>
+        <p:cNvGrpSpPr/>
+        <p:nvPr/>
+      </p:nvGrpSpPr>
+      <p:grpSpPr>
+        <a:xfrm>
+          <a:off x="0" y="0"/>
+          <a:ext cx="0" cy="0"/>
+          <a:chOff x="0" y="0"/>
+          <a:chExt cx="0" cy="0"/>
+        </a:xfrm>
+      </p:grpSpPr>
+      <p:sp>
+        <p:nvSpPr>
+          <p:cNvPr id="2" name="Контейнер за изображение на слайда 1"/>
+          <p:cNvSpPr>
+            <a:spLocks noGrp="1" noRot="1" noChangeAspect="1"/>
+          </p:cNvSpPr>
+          <p:nvPr>
+            <p:ph type="sldImg"/>
+          </p:nvPr>
+        </p:nvSpPr>
+        <p:spPr/>
+      </p:sp>
+      <p:sp>
+        <p:nvSpPr>
+          <p:cNvPr id="3" name="Контейнер за бележки 2"/>
+          <p:cNvSpPr>
+            <a:spLocks noGrp="1"/>
+          </p:cNvSpPr>
+          <p:nvPr>
+            <p:ph type="body" idx="1"/>
+          </p:nvPr>
+        </p:nvSpPr>
+        <p:spPr/>
+        <p:txBody>
+          <a:bodyPr/>
+          <a:lstStyle/>
+          <a:p>
+            <a:endParaRPr lang="en-US" dirty="0"/>
+          </a:p>
+        </p:txBody>
+      </p:sp>
+      <p:sp>
+        <p:nvSpPr>
+          <p:cNvPr id="4" name="Контейнер за номер на слайда 3"/>
+          <p:cNvSpPr>
+            <a:spLocks noGrp="1"/>
+          </p:cNvSpPr>
+          <p:nvPr>
+            <p:ph type="sldNum" sz="quarter" idx="10"/>
+          </p:nvPr>
+        </p:nvSpPr>
+        <p:spPr/>
+        <p:txBody>
+          <a:bodyPr/>
+          <a:lstStyle/>
+          <a:p>
+            <a:fld id="{34DB9454-9595-409E-8BC5-8848C7CC2ACF}" type="slidenum">
+              <a:rPr lang="en-US" smtClean="0"/>
+              <a:t>11</a:t>
+            </a:fld>
+            <a:endParaRPr lang="en-US"/>
+          </a:p>
+        </p:txBody>
+      </p:sp>
+    </p:spTree>
+    <p:extLst>
+      <p:ext uri="{BB962C8B-B14F-4D97-AF65-F5344CB8AC3E}">
+        <p14:creationId xmlns:p14="http://schemas.microsoft.com/office/powerpoint/2010/main" val="152682299"/>
+      </p:ext>
+    </p:extLst>
+  </p:cSld>
+  <p:clrMapOvr>
+    <a:masterClrMapping/>
+  </p:clrMapOvr>
+</p:notes>
+</file>
+
+<file path=ppt/notesSlides/notesSlide8.xml><?xml version="1.0" encoding="utf-8"?>
+<p:notes xmlns:a="http://schemas.openxmlformats.org/drawingml/2006/main" xmlns:r="http://schemas.openxmlformats.org/officeDocument/2006/relationships" xmlns:p="http://schemas.openxmlformats.org/presentationml/2006/main">
+  <p:cSld>
+    <p:spTree>
+      <p:nvGrpSpPr>
+        <p:cNvPr id="1" name=""/>
+        <p:cNvGrpSpPr/>
+        <p:nvPr/>
+      </p:nvGrpSpPr>
+      <p:grpSpPr>
+        <a:xfrm>
+          <a:off x="0" y="0"/>
+          <a:ext cx="0" cy="0"/>
+          <a:chOff x="0" y="0"/>
+          <a:chExt cx="0" cy="0"/>
+        </a:xfrm>
+      </p:grpSpPr>
+      <p:sp>
+        <p:nvSpPr>
+          <p:cNvPr id="2" name="Контейнер за изображение на слайда 1"/>
+          <p:cNvSpPr>
+            <a:spLocks noGrp="1" noRot="1" noChangeAspect="1"/>
+          </p:cNvSpPr>
+          <p:nvPr>
+            <p:ph type="sldImg"/>
+          </p:nvPr>
+        </p:nvSpPr>
+        <p:spPr/>
+      </p:sp>
+      <p:sp>
+        <p:nvSpPr>
+          <p:cNvPr id="3" name="Контейнер за бележки 2"/>
+          <p:cNvSpPr>
+            <a:spLocks noGrp="1"/>
+          </p:cNvSpPr>
+          <p:nvPr>
+            <p:ph type="body" idx="1"/>
+          </p:nvPr>
+        </p:nvSpPr>
+        <p:spPr/>
+        <p:txBody>
+          <a:bodyPr/>
+          <a:lstStyle/>
+          <a:p>
+            <a:endParaRPr lang="en-US" dirty="0"/>
+          </a:p>
+        </p:txBody>
+      </p:sp>
+      <p:sp>
+        <p:nvSpPr>
+          <p:cNvPr id="4" name="Контейнер за номер на слайда 3"/>
+          <p:cNvSpPr>
+            <a:spLocks noGrp="1"/>
+          </p:cNvSpPr>
+          <p:nvPr>
+            <p:ph type="sldNum" sz="quarter" idx="10"/>
+          </p:nvPr>
+        </p:nvSpPr>
+        <p:spPr/>
+        <p:txBody>
+          <a:bodyPr/>
+          <a:lstStyle/>
+          <a:p>
+            <a:fld id="{34DB9454-9595-409E-8BC5-8848C7CC2ACF}" type="slidenum">
+              <a:rPr lang="en-US" smtClean="0"/>
+              <a:t>12</a:t>
+            </a:fld>
+            <a:endParaRPr lang="en-US"/>
+          </a:p>
+        </p:txBody>
+      </p:sp>
+    </p:spTree>
+    <p:extLst>
+      <p:ext uri="{BB962C8B-B14F-4D97-AF65-F5344CB8AC3E}">
+        <p14:creationId xmlns:p14="http://schemas.microsoft.com/office/powerpoint/2010/main" val="3050715757"/>
       </p:ext>
     </p:extLst>
   </p:cSld>
@@ -6467,6 +6892,972 @@
 </p:sld>
 </file>
 
+<file path=ppt/slides/slide10.xml><?xml version="1.0" encoding="utf-8"?>
+<p:sld xmlns:a="http://schemas.openxmlformats.org/drawingml/2006/main" xmlns:r="http://schemas.openxmlformats.org/officeDocument/2006/relationships" xmlns:p="http://schemas.openxmlformats.org/presentationml/2006/main">
+  <p:cSld>
+    <p:spTree>
+      <p:nvGrpSpPr>
+        <p:cNvPr id="1" name=""/>
+        <p:cNvGrpSpPr/>
+        <p:nvPr/>
+      </p:nvGrpSpPr>
+      <p:grpSpPr>
+        <a:xfrm>
+          <a:off x="0" y="0"/>
+          <a:ext cx="0" cy="0"/>
+          <a:chOff x="0" y="0"/>
+          <a:chExt cx="0" cy="0"/>
+        </a:xfrm>
+      </p:grpSpPr>
+      <p:sp>
+        <p:nvSpPr>
+          <p:cNvPr id="4" name="Title 1"/>
+          <p:cNvSpPr txBox="1">
+            <a:spLocks/>
+          </p:cNvSpPr>
+          <p:nvPr/>
+        </p:nvSpPr>
+        <p:spPr>
+          <a:xfrm>
+            <a:off x="640410" y="429231"/>
+            <a:ext cx="6960537" cy="1047481"/>
+          </a:xfrm>
+          <a:prstGeom prst="rect">
+            <a:avLst/>
+          </a:prstGeom>
+        </p:spPr>
+        <p:txBody>
+          <a:bodyPr vert="horz" lIns="91440" tIns="45720" rIns="91440" bIns="45720" rtlCol="0" anchor="t">
+            <a:normAutofit/>
+          </a:bodyPr>
+          <a:lstStyle>
+            <a:lvl1pPr algn="l" defTabSz="457200" rtl="0" eaLnBrk="1" latinLnBrk="0" hangingPunct="1">
+              <a:spcBef>
+                <a:spcPct val="0"/>
+              </a:spcBef>
+              <a:buNone/>
+              <a:defRPr sz="3600" kern="1200">
+                <a:solidFill>
+                  <a:schemeClr val="accent1"/>
+                </a:solidFill>
+                <a:latin typeface="+mj-lt"/>
+                <a:ea typeface="+mj-ea"/>
+                <a:cs typeface="+mj-cs"/>
+              </a:defRPr>
+            </a:lvl1pPr>
+            <a:lvl2pPr eaLnBrk="1" hangingPunct="1">
+              <a:defRPr>
+                <a:solidFill>
+                  <a:schemeClr val="tx2"/>
+                </a:solidFill>
+              </a:defRPr>
+            </a:lvl2pPr>
+            <a:lvl3pPr eaLnBrk="1" hangingPunct="1">
+              <a:defRPr>
+                <a:solidFill>
+                  <a:schemeClr val="tx2"/>
+                </a:solidFill>
+              </a:defRPr>
+            </a:lvl3pPr>
+            <a:lvl4pPr eaLnBrk="1" hangingPunct="1">
+              <a:defRPr>
+                <a:solidFill>
+                  <a:schemeClr val="tx2"/>
+                </a:solidFill>
+              </a:defRPr>
+            </a:lvl4pPr>
+            <a:lvl5pPr eaLnBrk="1" hangingPunct="1">
+              <a:defRPr>
+                <a:solidFill>
+                  <a:schemeClr val="tx2"/>
+                </a:solidFill>
+              </a:defRPr>
+            </a:lvl5pPr>
+            <a:lvl6pPr eaLnBrk="1" hangingPunct="1">
+              <a:defRPr>
+                <a:solidFill>
+                  <a:schemeClr val="tx2"/>
+                </a:solidFill>
+              </a:defRPr>
+            </a:lvl6pPr>
+            <a:lvl7pPr eaLnBrk="1" hangingPunct="1">
+              <a:defRPr>
+                <a:solidFill>
+                  <a:schemeClr val="tx2"/>
+                </a:solidFill>
+              </a:defRPr>
+            </a:lvl7pPr>
+            <a:lvl8pPr eaLnBrk="1" hangingPunct="1">
+              <a:defRPr>
+                <a:solidFill>
+                  <a:schemeClr val="tx2"/>
+                </a:solidFill>
+              </a:defRPr>
+            </a:lvl8pPr>
+            <a:lvl9pPr eaLnBrk="1" hangingPunct="1">
+              <a:defRPr>
+                <a:solidFill>
+                  <a:schemeClr val="tx2"/>
+                </a:solidFill>
+              </a:defRPr>
+            </a:lvl9pPr>
+          </a:lstStyle>
+          <a:p>
+            <a:pPr marL="0" lvl="1">
+              <a:spcBef>
+                <a:spcPct val="0"/>
+              </a:spcBef>
+            </a:pPr>
+            <a:r>
+              <a:rPr lang="bg-BG" sz="3200" dirty="0" smtClean="0">
+                <a:solidFill>
+                  <a:schemeClr val="accent1"/>
+                </a:solidFill>
+                <a:latin typeface="+mj-lt"/>
+                <a:ea typeface="+mj-ea"/>
+                <a:cs typeface="+mj-cs"/>
+              </a:rPr>
+              <a:t>Платформа </a:t>
+            </a:r>
+            <a:r>
+              <a:rPr lang="bg-BG" sz="3200" dirty="0">
+                <a:solidFill>
+                  <a:schemeClr val="accent1"/>
+                </a:solidFill>
+                <a:latin typeface="+mj-lt"/>
+                <a:ea typeface="+mj-ea"/>
+                <a:cs typeface="+mj-cs"/>
+              </a:rPr>
+              <a:t>като услуга</a:t>
+            </a:r>
+            <a:r>
+              <a:rPr lang="en-US" sz="3200" dirty="0">
+                <a:solidFill>
+                  <a:schemeClr val="accent1"/>
+                </a:solidFill>
+                <a:latin typeface="+mj-lt"/>
+                <a:ea typeface="+mj-ea"/>
+                <a:cs typeface="+mj-cs"/>
+              </a:rPr>
+              <a:t>(PaaS)</a:t>
+            </a:r>
+          </a:p>
+          <a:p>
+            <a:endParaRPr lang="bg-BG" sz="3200" dirty="0"/>
+          </a:p>
+        </p:txBody>
+      </p:sp>
+      <p:sp>
+        <p:nvSpPr>
+          <p:cNvPr id="2" name="Текстово поле 1"/>
+          <p:cNvSpPr txBox="1"/>
+          <p:nvPr/>
+        </p:nvSpPr>
+        <p:spPr>
+          <a:xfrm>
+            <a:off x="640410" y="1476712"/>
+            <a:ext cx="9646590" cy="2949525"/>
+          </a:xfrm>
+          <a:prstGeom prst="rect">
+            <a:avLst/>
+          </a:prstGeom>
+          <a:noFill/>
+        </p:spPr>
+        <p:txBody>
+          <a:bodyPr wrap="square" rtlCol="0">
+            <a:spAutoFit/>
+          </a:bodyPr>
+          <a:lstStyle/>
+          <a:p>
+            <a:r>
+              <a:rPr lang="bg-BG" sz="2400" dirty="0">
+                <a:solidFill>
+                  <a:schemeClr val="tx1">
+                    <a:lumMod val="75000"/>
+                    <a:lumOff val="25000"/>
+                  </a:schemeClr>
+                </a:solidFill>
+              </a:rPr>
+              <a:t>Основни компоненти:</a:t>
+            </a:r>
+          </a:p>
+          <a:p>
+            <a:pPr marL="854075" lvl="1" indent="-396875">
+              <a:spcBef>
+                <a:spcPts val="1000"/>
+              </a:spcBef>
+              <a:buClr>
+                <a:schemeClr val="accent1"/>
+              </a:buClr>
+              <a:buSzPct val="80000"/>
+              <a:buFont typeface="Wingdings 3" charset="2"/>
+              <a:buChar char=""/>
+              <a:tabLst>
+                <a:tab pos="0" algn="l"/>
+              </a:tabLst>
+            </a:pPr>
+            <a:r>
+              <a:rPr lang="bg-BG" sz="2400" dirty="0">
+                <a:solidFill>
+                  <a:schemeClr val="tx1">
+                    <a:lumMod val="75000"/>
+                    <a:lumOff val="25000"/>
+                  </a:schemeClr>
+                </a:solidFill>
+              </a:rPr>
+              <a:t>Виртуални машини</a:t>
+            </a:r>
+          </a:p>
+          <a:p>
+            <a:pPr marL="854075" lvl="1" indent="-396875">
+              <a:spcBef>
+                <a:spcPts val="1000"/>
+              </a:spcBef>
+              <a:buClr>
+                <a:schemeClr val="accent1"/>
+              </a:buClr>
+              <a:buSzPct val="80000"/>
+              <a:buFont typeface="Wingdings 3" charset="2"/>
+              <a:buChar char=""/>
+              <a:tabLst>
+                <a:tab pos="0" algn="l"/>
+              </a:tabLst>
+            </a:pPr>
+            <a:r>
+              <a:rPr lang="bg-BG" sz="2400" dirty="0">
+                <a:solidFill>
+                  <a:schemeClr val="tx1">
+                    <a:lumMod val="75000"/>
+                    <a:lumOff val="25000"/>
+                  </a:schemeClr>
+                </a:solidFill>
+              </a:rPr>
+              <a:t>Сървъри</a:t>
+            </a:r>
+          </a:p>
+          <a:p>
+            <a:pPr marL="854075" lvl="1" indent="-396875">
+              <a:spcBef>
+                <a:spcPts val="1000"/>
+              </a:spcBef>
+              <a:buClr>
+                <a:schemeClr val="accent1"/>
+              </a:buClr>
+              <a:buSzPct val="80000"/>
+              <a:buFont typeface="Wingdings 3" charset="2"/>
+              <a:buChar char=""/>
+              <a:tabLst>
+                <a:tab pos="0" algn="l"/>
+              </a:tabLst>
+            </a:pPr>
+            <a:r>
+              <a:rPr lang="bg-BG" sz="2400" dirty="0">
+                <a:solidFill>
+                  <a:schemeClr val="tx1">
+                    <a:lumMod val="75000"/>
+                    <a:lumOff val="25000"/>
+                  </a:schemeClr>
+                </a:solidFill>
+              </a:rPr>
+              <a:t>Място за съхранение на информация</a:t>
+            </a:r>
+          </a:p>
+          <a:p>
+            <a:pPr marL="854075" lvl="1" indent="-396875">
+              <a:spcBef>
+                <a:spcPts val="1000"/>
+              </a:spcBef>
+              <a:buClr>
+                <a:schemeClr val="accent1"/>
+              </a:buClr>
+              <a:buSzPct val="80000"/>
+              <a:buFont typeface="Wingdings 3" charset="2"/>
+              <a:buChar char=""/>
+              <a:tabLst>
+                <a:tab pos="0" algn="l"/>
+              </a:tabLst>
+            </a:pPr>
+            <a:r>
+              <a:rPr lang="en-US" sz="2400" dirty="0">
+                <a:solidFill>
+                  <a:schemeClr val="tx1">
+                    <a:lumMod val="75000"/>
+                    <a:lumOff val="25000"/>
+                  </a:schemeClr>
+                </a:solidFill>
+              </a:rPr>
+              <a:t>Load-balancers</a:t>
+            </a:r>
+            <a:endParaRPr lang="bg-BG" sz="2400" dirty="0">
+              <a:solidFill>
+                <a:schemeClr val="tx1">
+                  <a:lumMod val="75000"/>
+                  <a:lumOff val="25000"/>
+                </a:schemeClr>
+              </a:solidFill>
+            </a:endParaRPr>
+          </a:p>
+          <a:p>
+            <a:pPr marL="854075" lvl="1" indent="-396875">
+              <a:spcBef>
+                <a:spcPts val="1000"/>
+              </a:spcBef>
+              <a:buClr>
+                <a:schemeClr val="accent1"/>
+              </a:buClr>
+              <a:buSzPct val="80000"/>
+              <a:buFont typeface="Wingdings 3" charset="2"/>
+              <a:buChar char=""/>
+              <a:tabLst>
+                <a:tab pos="0" algn="l"/>
+              </a:tabLst>
+            </a:pPr>
+            <a:r>
+              <a:rPr lang="bg-BG" sz="2400" dirty="0">
+                <a:solidFill>
+                  <a:schemeClr val="tx1">
+                    <a:lumMod val="75000"/>
+                    <a:lumOff val="25000"/>
+                  </a:schemeClr>
+                </a:solidFill>
+              </a:rPr>
+              <a:t>Мрежови </a:t>
+            </a:r>
+            <a:r>
+              <a:rPr lang="bg-BG" sz="2400" dirty="0" smtClean="0">
+                <a:solidFill>
+                  <a:schemeClr val="tx1">
+                    <a:lumMod val="75000"/>
+                    <a:lumOff val="25000"/>
+                  </a:schemeClr>
+                </a:solidFill>
+              </a:rPr>
+              <a:t>достъп</a:t>
+            </a:r>
+          </a:p>
+        </p:txBody>
+      </p:sp>
+    </p:spTree>
+    <p:extLst>
+      <p:ext uri="{BB962C8B-B14F-4D97-AF65-F5344CB8AC3E}">
+        <p14:creationId xmlns:p14="http://schemas.microsoft.com/office/powerpoint/2010/main" val="1958845994"/>
+      </p:ext>
+    </p:extLst>
+  </p:cSld>
+  <p:clrMapOvr>
+    <a:masterClrMapping/>
+  </p:clrMapOvr>
+  <p:timing>
+    <p:tnLst>
+      <p:par>
+        <p:cTn id="1" dur="indefinite" restart="never" nodeType="tmRoot"/>
+      </p:par>
+    </p:tnLst>
+  </p:timing>
+</p:sld>
+</file>
+
+<file path=ppt/slides/slide11.xml><?xml version="1.0" encoding="utf-8"?>
+<p:sld xmlns:a="http://schemas.openxmlformats.org/drawingml/2006/main" xmlns:r="http://schemas.openxmlformats.org/officeDocument/2006/relationships" xmlns:p="http://schemas.openxmlformats.org/presentationml/2006/main">
+  <p:cSld>
+    <p:spTree>
+      <p:nvGrpSpPr>
+        <p:cNvPr id="1" name=""/>
+        <p:cNvGrpSpPr/>
+        <p:nvPr/>
+      </p:nvGrpSpPr>
+      <p:grpSpPr>
+        <a:xfrm>
+          <a:off x="0" y="0"/>
+          <a:ext cx="0" cy="0"/>
+          <a:chOff x="0" y="0"/>
+          <a:chExt cx="0" cy="0"/>
+        </a:xfrm>
+      </p:grpSpPr>
+      <p:sp>
+        <p:nvSpPr>
+          <p:cNvPr id="4" name="Title 1"/>
+          <p:cNvSpPr txBox="1">
+            <a:spLocks/>
+          </p:cNvSpPr>
+          <p:nvPr/>
+        </p:nvSpPr>
+        <p:spPr>
+          <a:xfrm>
+            <a:off x="580452" y="414239"/>
+            <a:ext cx="6960537" cy="1047481"/>
+          </a:xfrm>
+          <a:prstGeom prst="rect">
+            <a:avLst/>
+          </a:prstGeom>
+        </p:spPr>
+        <p:txBody>
+          <a:bodyPr vert="horz" lIns="91440" tIns="45720" rIns="91440" bIns="45720" rtlCol="0" anchor="t">
+            <a:normAutofit/>
+          </a:bodyPr>
+          <a:lstStyle>
+            <a:lvl1pPr algn="l" defTabSz="457200" rtl="0" eaLnBrk="1" latinLnBrk="0" hangingPunct="1">
+              <a:spcBef>
+                <a:spcPct val="0"/>
+              </a:spcBef>
+              <a:buNone/>
+              <a:defRPr sz="3600" kern="1200">
+                <a:solidFill>
+                  <a:schemeClr val="accent1"/>
+                </a:solidFill>
+                <a:latin typeface="+mj-lt"/>
+                <a:ea typeface="+mj-ea"/>
+                <a:cs typeface="+mj-cs"/>
+              </a:defRPr>
+            </a:lvl1pPr>
+            <a:lvl2pPr eaLnBrk="1" hangingPunct="1">
+              <a:defRPr>
+                <a:solidFill>
+                  <a:schemeClr val="tx2"/>
+                </a:solidFill>
+              </a:defRPr>
+            </a:lvl2pPr>
+            <a:lvl3pPr eaLnBrk="1" hangingPunct="1">
+              <a:defRPr>
+                <a:solidFill>
+                  <a:schemeClr val="tx2"/>
+                </a:solidFill>
+              </a:defRPr>
+            </a:lvl3pPr>
+            <a:lvl4pPr eaLnBrk="1" hangingPunct="1">
+              <a:defRPr>
+                <a:solidFill>
+                  <a:schemeClr val="tx2"/>
+                </a:solidFill>
+              </a:defRPr>
+            </a:lvl4pPr>
+            <a:lvl5pPr eaLnBrk="1" hangingPunct="1">
+              <a:defRPr>
+                <a:solidFill>
+                  <a:schemeClr val="tx2"/>
+                </a:solidFill>
+              </a:defRPr>
+            </a:lvl5pPr>
+            <a:lvl6pPr eaLnBrk="1" hangingPunct="1">
+              <a:defRPr>
+                <a:solidFill>
+                  <a:schemeClr val="tx2"/>
+                </a:solidFill>
+              </a:defRPr>
+            </a:lvl6pPr>
+            <a:lvl7pPr eaLnBrk="1" hangingPunct="1">
+              <a:defRPr>
+                <a:solidFill>
+                  <a:schemeClr val="tx2"/>
+                </a:solidFill>
+              </a:defRPr>
+            </a:lvl7pPr>
+            <a:lvl8pPr eaLnBrk="1" hangingPunct="1">
+              <a:defRPr>
+                <a:solidFill>
+                  <a:schemeClr val="tx2"/>
+                </a:solidFill>
+              </a:defRPr>
+            </a:lvl8pPr>
+            <a:lvl9pPr eaLnBrk="1" hangingPunct="1">
+              <a:defRPr>
+                <a:solidFill>
+                  <a:schemeClr val="tx2"/>
+                </a:solidFill>
+              </a:defRPr>
+            </a:lvl9pPr>
+          </a:lstStyle>
+          <a:p>
+            <a:pPr marL="0" lvl="1">
+              <a:spcBef>
+                <a:spcPct val="0"/>
+              </a:spcBef>
+            </a:pPr>
+            <a:r>
+              <a:rPr lang="bg-BG" sz="3200" dirty="0">
+                <a:solidFill>
+                  <a:schemeClr val="accent1"/>
+                </a:solidFill>
+              </a:rPr>
+              <a:t>Платформа като услуга</a:t>
+            </a:r>
+            <a:r>
+              <a:rPr lang="en-US" sz="3200" dirty="0">
+                <a:solidFill>
+                  <a:schemeClr val="accent1"/>
+                </a:solidFill>
+              </a:rPr>
+              <a:t>(PaaS)</a:t>
+            </a:r>
+          </a:p>
+          <a:p>
+            <a:endParaRPr lang="bg-BG" sz="3200" dirty="0"/>
+          </a:p>
+        </p:txBody>
+      </p:sp>
+      <p:sp>
+        <p:nvSpPr>
+          <p:cNvPr id="2" name="Текстово поле 1"/>
+          <p:cNvSpPr txBox="1"/>
+          <p:nvPr/>
+        </p:nvSpPr>
+        <p:spPr>
+          <a:xfrm>
+            <a:off x="580452" y="1461720"/>
+            <a:ext cx="9717791" cy="3816429"/>
+          </a:xfrm>
+          <a:prstGeom prst="rect">
+            <a:avLst/>
+          </a:prstGeom>
+          <a:noFill/>
+        </p:spPr>
+        <p:txBody>
+          <a:bodyPr wrap="square" rtlCol="0">
+            <a:spAutoFit/>
+          </a:bodyPr>
+          <a:lstStyle/>
+          <a:p>
+            <a:r>
+              <a:rPr lang="bg-BG" sz="2400" dirty="0" smtClean="0">
+                <a:solidFill>
+                  <a:schemeClr val="tx1">
+                    <a:lumMod val="75000"/>
+                    <a:lumOff val="25000"/>
+                  </a:schemeClr>
+                </a:solidFill>
+              </a:rPr>
+              <a:t>Предимства:</a:t>
+            </a:r>
+            <a:endParaRPr lang="bg-BG" sz="2400" dirty="0">
+              <a:solidFill>
+                <a:schemeClr val="tx1">
+                  <a:lumMod val="75000"/>
+                  <a:lumOff val="25000"/>
+                </a:schemeClr>
+              </a:solidFill>
+            </a:endParaRPr>
+          </a:p>
+          <a:p>
+            <a:pPr marL="854075" lvl="1" indent="-396875">
+              <a:spcBef>
+                <a:spcPts val="1000"/>
+              </a:spcBef>
+              <a:buClr>
+                <a:schemeClr val="accent1"/>
+              </a:buClr>
+              <a:buSzPct val="80000"/>
+              <a:buFont typeface="Wingdings 3" charset="2"/>
+              <a:buChar char=""/>
+              <a:tabLst>
+                <a:tab pos="0" algn="l"/>
+              </a:tabLst>
+            </a:pPr>
+            <a:r>
+              <a:rPr lang="bg-BG" sz="2400" dirty="0" err="1">
+                <a:solidFill>
+                  <a:schemeClr val="tx1">
+                    <a:lumMod val="75000"/>
+                    <a:lumOff val="25000"/>
+                  </a:schemeClr>
+                </a:solidFill>
+              </a:rPr>
+              <a:t>Мащабируемост</a:t>
+            </a:r>
+            <a:r>
+              <a:rPr lang="bg-BG" sz="2400" dirty="0">
+                <a:solidFill>
+                  <a:schemeClr val="tx1">
+                    <a:lumMod val="75000"/>
+                    <a:lumOff val="25000"/>
+                  </a:schemeClr>
+                </a:solidFill>
+              </a:rPr>
+              <a:t> без забавяне при разширяване на ресурсите</a:t>
+            </a:r>
+          </a:p>
+          <a:p>
+            <a:pPr marL="854075" lvl="1" indent="-396875">
+              <a:spcBef>
+                <a:spcPts val="1000"/>
+              </a:spcBef>
+              <a:buClr>
+                <a:schemeClr val="accent1"/>
+              </a:buClr>
+              <a:buSzPct val="80000"/>
+              <a:buFont typeface="Wingdings 3" charset="2"/>
+              <a:buChar char=""/>
+              <a:tabLst>
+                <a:tab pos="0" algn="l"/>
+              </a:tabLst>
+            </a:pPr>
+            <a:r>
+              <a:rPr lang="bg-BG" sz="2400" dirty="0">
+                <a:solidFill>
+                  <a:schemeClr val="tx1">
+                    <a:lumMod val="75000"/>
+                    <a:lumOff val="25000"/>
+                  </a:schemeClr>
+                </a:solidFill>
+              </a:rPr>
+              <a:t>Няма нужда от допълнителна инвестиция в хардуер</a:t>
+            </a:r>
+          </a:p>
+          <a:p>
+            <a:pPr marL="854075" lvl="1" indent="-396875">
+              <a:spcBef>
+                <a:spcPts val="1000"/>
+              </a:spcBef>
+              <a:buClr>
+                <a:schemeClr val="accent1"/>
+              </a:buClr>
+              <a:buSzPct val="80000"/>
+              <a:buFont typeface="Wingdings 3" charset="2"/>
+              <a:buChar char=""/>
+              <a:tabLst>
+                <a:tab pos="0" algn="l"/>
+              </a:tabLst>
+            </a:pPr>
+            <a:r>
+              <a:rPr lang="bg-BG" sz="2400" dirty="0">
+                <a:solidFill>
+                  <a:schemeClr val="tx1">
+                    <a:lumMod val="75000"/>
+                    <a:lumOff val="25000"/>
+                  </a:schemeClr>
+                </a:solidFill>
+              </a:rPr>
+              <a:t>Клиентът използва това, за което платил</a:t>
+            </a:r>
+          </a:p>
+          <a:p>
+            <a:pPr marL="854075" lvl="1" indent="-396875">
+              <a:spcBef>
+                <a:spcPts val="1000"/>
+              </a:spcBef>
+              <a:buClr>
+                <a:schemeClr val="accent1"/>
+              </a:buClr>
+              <a:buSzPct val="80000"/>
+              <a:buFont typeface="Wingdings 3" charset="2"/>
+              <a:buChar char=""/>
+              <a:tabLst>
+                <a:tab pos="0" algn="l"/>
+              </a:tabLst>
+            </a:pPr>
+            <a:r>
+              <a:rPr lang="bg-BG" sz="2400" dirty="0">
+                <a:solidFill>
+                  <a:schemeClr val="tx1">
+                    <a:lumMod val="75000"/>
+                    <a:lumOff val="25000"/>
+                  </a:schemeClr>
+                </a:solidFill>
+              </a:rPr>
+              <a:t>Независимост от локацията</a:t>
+            </a:r>
+          </a:p>
+          <a:p>
+            <a:pPr marL="854075" lvl="1" indent="-396875">
+              <a:spcBef>
+                <a:spcPts val="1000"/>
+              </a:spcBef>
+              <a:buClr>
+                <a:schemeClr val="accent1"/>
+              </a:buClr>
+              <a:buSzPct val="80000"/>
+              <a:buFont typeface="Wingdings 3" charset="2"/>
+              <a:buChar char=""/>
+              <a:tabLst>
+                <a:tab pos="0" algn="l"/>
+              </a:tabLst>
+            </a:pPr>
+            <a:r>
+              <a:rPr lang="bg-BG" sz="2400" dirty="0">
+                <a:solidFill>
+                  <a:schemeClr val="tx1">
+                    <a:lumMod val="75000"/>
+                    <a:lumOff val="25000"/>
+                  </a:schemeClr>
+                </a:solidFill>
+              </a:rPr>
+              <a:t>Високо ниво на </a:t>
+            </a:r>
+            <a:r>
+              <a:rPr lang="bg-BG" sz="2400" dirty="0" smtClean="0">
+                <a:solidFill>
+                  <a:schemeClr val="tx1">
+                    <a:lumMod val="75000"/>
+                    <a:lumOff val="25000"/>
+                  </a:schemeClr>
+                </a:solidFill>
+              </a:rPr>
+              <a:t>сигурност</a:t>
+            </a:r>
+            <a:endParaRPr lang="en-US" sz="2400" dirty="0">
+              <a:solidFill>
+                <a:schemeClr val="tx1">
+                  <a:lumMod val="75000"/>
+                  <a:lumOff val="25000"/>
+                </a:schemeClr>
+              </a:solidFill>
+            </a:endParaRPr>
+          </a:p>
+          <a:p>
+            <a:pPr marL="854075" lvl="1" indent="-396875">
+              <a:spcBef>
+                <a:spcPts val="1000"/>
+              </a:spcBef>
+              <a:buClr>
+                <a:schemeClr val="accent1"/>
+              </a:buClr>
+              <a:buSzPct val="80000"/>
+              <a:buFont typeface="Wingdings 3" charset="2"/>
+              <a:buChar char=""/>
+              <a:tabLst>
+                <a:tab pos="0" algn="l"/>
+              </a:tabLst>
+            </a:pPr>
+            <a:r>
+              <a:rPr lang="en-US" sz="2400" dirty="0" smtClean="0">
+                <a:solidFill>
+                  <a:schemeClr val="tx1">
+                    <a:lumMod val="75000"/>
+                    <a:lumOff val="25000"/>
+                  </a:schemeClr>
+                </a:solidFill>
+              </a:rPr>
+              <a:t>No single point of failure</a:t>
+            </a:r>
+            <a:endParaRPr lang="bg-BG" sz="2400" dirty="0" smtClean="0">
+              <a:solidFill>
+                <a:schemeClr val="tx1">
+                  <a:lumMod val="75000"/>
+                  <a:lumOff val="25000"/>
+                </a:schemeClr>
+              </a:solidFill>
+            </a:endParaRPr>
+          </a:p>
+        </p:txBody>
+      </p:sp>
+    </p:spTree>
+    <p:extLst>
+      <p:ext uri="{BB962C8B-B14F-4D97-AF65-F5344CB8AC3E}">
+        <p14:creationId xmlns:p14="http://schemas.microsoft.com/office/powerpoint/2010/main" val="2092850558"/>
+      </p:ext>
+    </p:extLst>
+  </p:cSld>
+  <p:clrMapOvr>
+    <a:masterClrMapping/>
+  </p:clrMapOvr>
+  <p:timing>
+    <p:tnLst>
+      <p:par>
+        <p:cTn id="1" dur="indefinite" restart="never" nodeType="tmRoot"/>
+      </p:par>
+    </p:tnLst>
+  </p:timing>
+</p:sld>
+</file>
+
+<file path=ppt/slides/slide12.xml><?xml version="1.0" encoding="utf-8"?>
+<p:sld xmlns:a="http://schemas.openxmlformats.org/drawingml/2006/main" xmlns:r="http://schemas.openxmlformats.org/officeDocument/2006/relationships" xmlns:p="http://schemas.openxmlformats.org/presentationml/2006/main">
+  <p:cSld>
+    <p:spTree>
+      <p:nvGrpSpPr>
+        <p:cNvPr id="1" name=""/>
+        <p:cNvGrpSpPr/>
+        <p:nvPr/>
+      </p:nvGrpSpPr>
+      <p:grpSpPr>
+        <a:xfrm>
+          <a:off x="0" y="0"/>
+          <a:ext cx="0" cy="0"/>
+          <a:chOff x="0" y="0"/>
+          <a:chExt cx="0" cy="0"/>
+        </a:xfrm>
+      </p:grpSpPr>
+      <p:sp>
+        <p:nvSpPr>
+          <p:cNvPr id="4" name="Title 1"/>
+          <p:cNvSpPr txBox="1">
+            <a:spLocks/>
+          </p:cNvSpPr>
+          <p:nvPr/>
+        </p:nvSpPr>
+        <p:spPr>
+          <a:xfrm>
+            <a:off x="640412" y="399245"/>
+            <a:ext cx="6960537" cy="1047481"/>
+          </a:xfrm>
+          <a:prstGeom prst="rect">
+            <a:avLst/>
+          </a:prstGeom>
+        </p:spPr>
+        <p:txBody>
+          <a:bodyPr vert="horz" lIns="91440" tIns="45720" rIns="91440" bIns="45720" rtlCol="0" anchor="t">
+            <a:normAutofit/>
+          </a:bodyPr>
+          <a:lstStyle>
+            <a:lvl1pPr algn="l" defTabSz="457200" rtl="0" eaLnBrk="1" latinLnBrk="0" hangingPunct="1">
+              <a:spcBef>
+                <a:spcPct val="0"/>
+              </a:spcBef>
+              <a:buNone/>
+              <a:defRPr sz="3600" kern="1200">
+                <a:solidFill>
+                  <a:schemeClr val="accent1"/>
+                </a:solidFill>
+                <a:latin typeface="+mj-lt"/>
+                <a:ea typeface="+mj-ea"/>
+                <a:cs typeface="+mj-cs"/>
+              </a:defRPr>
+            </a:lvl1pPr>
+            <a:lvl2pPr eaLnBrk="1" hangingPunct="1">
+              <a:defRPr>
+                <a:solidFill>
+                  <a:schemeClr val="tx2"/>
+                </a:solidFill>
+              </a:defRPr>
+            </a:lvl2pPr>
+            <a:lvl3pPr eaLnBrk="1" hangingPunct="1">
+              <a:defRPr>
+                <a:solidFill>
+                  <a:schemeClr val="tx2"/>
+                </a:solidFill>
+              </a:defRPr>
+            </a:lvl3pPr>
+            <a:lvl4pPr eaLnBrk="1" hangingPunct="1">
+              <a:defRPr>
+                <a:solidFill>
+                  <a:schemeClr val="tx2"/>
+                </a:solidFill>
+              </a:defRPr>
+            </a:lvl4pPr>
+            <a:lvl5pPr eaLnBrk="1" hangingPunct="1">
+              <a:defRPr>
+                <a:solidFill>
+                  <a:schemeClr val="tx2"/>
+                </a:solidFill>
+              </a:defRPr>
+            </a:lvl5pPr>
+            <a:lvl6pPr eaLnBrk="1" hangingPunct="1">
+              <a:defRPr>
+                <a:solidFill>
+                  <a:schemeClr val="tx2"/>
+                </a:solidFill>
+              </a:defRPr>
+            </a:lvl6pPr>
+            <a:lvl7pPr eaLnBrk="1" hangingPunct="1">
+              <a:defRPr>
+                <a:solidFill>
+                  <a:schemeClr val="tx2"/>
+                </a:solidFill>
+              </a:defRPr>
+            </a:lvl7pPr>
+            <a:lvl8pPr eaLnBrk="1" hangingPunct="1">
+              <a:defRPr>
+                <a:solidFill>
+                  <a:schemeClr val="tx2"/>
+                </a:solidFill>
+              </a:defRPr>
+            </a:lvl8pPr>
+            <a:lvl9pPr eaLnBrk="1" hangingPunct="1">
+              <a:defRPr>
+                <a:solidFill>
+                  <a:schemeClr val="tx2"/>
+                </a:solidFill>
+              </a:defRPr>
+            </a:lvl9pPr>
+          </a:lstStyle>
+          <a:p>
+            <a:pPr marL="0" lvl="1">
+              <a:spcBef>
+                <a:spcPct val="0"/>
+              </a:spcBef>
+            </a:pPr>
+            <a:r>
+              <a:rPr lang="bg-BG" sz="3200" dirty="0">
+                <a:solidFill>
+                  <a:schemeClr val="accent1"/>
+                </a:solidFill>
+              </a:rPr>
+              <a:t>Платформа като услуга</a:t>
+            </a:r>
+            <a:r>
+              <a:rPr lang="en-US" sz="3200" dirty="0">
+                <a:solidFill>
+                  <a:schemeClr val="accent1"/>
+                </a:solidFill>
+              </a:rPr>
+              <a:t>(PaaS)</a:t>
+            </a:r>
+          </a:p>
+          <a:p>
+            <a:endParaRPr lang="bg-BG" sz="3200" dirty="0"/>
+          </a:p>
+        </p:txBody>
+      </p:sp>
+      <p:pic>
+        <p:nvPicPr>
+          <p:cNvPr id="1026" name="Picture 2" descr="http://www.arrayguard.com/images/solutions/IaaS-Diagram.png"/>
+          <p:cNvPicPr>
+            <a:picLocks noChangeAspect="1" noChangeArrowheads="1"/>
+          </p:cNvPicPr>
+          <p:nvPr/>
+        </p:nvPicPr>
+        <p:blipFill>
+          <a:blip r:embed="rId3">
+            <a:extLst>
+              <a:ext uri="{28A0092B-C50C-407E-A947-70E740481C1C}">
+                <a14:useLocalDpi xmlns:a14="http://schemas.microsoft.com/office/drawing/2010/main" val="0"/>
+              </a:ext>
+            </a:extLst>
+          </a:blip>
+          <a:srcRect/>
+          <a:stretch>
+            <a:fillRect/>
+          </a:stretch>
+        </p:blipFill>
+        <p:spPr bwMode="auto">
+          <a:xfrm>
+            <a:off x="640411" y="1446726"/>
+            <a:ext cx="8760723" cy="4768337"/>
+          </a:xfrm>
+          <a:prstGeom prst="rect">
+            <a:avLst/>
+          </a:prstGeom>
+          <a:noFill/>
+          <a:extLst>
+            <a:ext uri="{909E8E84-426E-40DD-AFC4-6F175D3DCCD1}">
+              <a14:hiddenFill xmlns:a14="http://schemas.microsoft.com/office/drawing/2010/main">
+                <a:solidFill>
+                  <a:srgbClr val="FFFFFF"/>
+                </a:solidFill>
+              </a14:hiddenFill>
+            </a:ext>
+          </a:extLst>
+        </p:spPr>
+      </p:pic>
+    </p:spTree>
+    <p:extLst>
+      <p:ext uri="{BB962C8B-B14F-4D97-AF65-F5344CB8AC3E}">
+        <p14:creationId xmlns:p14="http://schemas.microsoft.com/office/powerpoint/2010/main" val="2932817663"/>
+      </p:ext>
+    </p:extLst>
+  </p:cSld>
+  <p:clrMapOvr>
+    <a:masterClrMapping/>
+  </p:clrMapOvr>
+  <p:timing>
+    <p:tnLst>
+      <p:par>
+        <p:cTn id="1" dur="indefinite" restart="never" nodeType="tmRoot"/>
+      </p:par>
+    </p:tnLst>
+  </p:timing>
+</p:sld>
+</file>
+
 <file path=ppt/slides/slide2.xml><?xml version="1.0" encoding="utf-8"?>
 <p:sld xmlns:a="http://schemas.openxmlformats.org/drawingml/2006/main" xmlns:r="http://schemas.openxmlformats.org/officeDocument/2006/relationships" xmlns:p="http://schemas.openxmlformats.org/presentationml/2006/main">
   <p:cSld>
@@ -8807,7 +10198,7 @@
         </p:nvSpPr>
         <p:spPr>
           <a:xfrm>
-            <a:off x="640412" y="399245"/>
+            <a:off x="640410" y="429231"/>
             <a:ext cx="6960537" cy="1047481"/>
           </a:xfrm>
           <a:prstGeom prst="rect">
@@ -8903,6 +10294,767 @@
           </a:p>
         </p:txBody>
       </p:sp>
+      <p:sp>
+        <p:nvSpPr>
+          <p:cNvPr id="2" name="Текстово поле 1"/>
+          <p:cNvSpPr txBox="1"/>
+          <p:nvPr/>
+        </p:nvSpPr>
+        <p:spPr>
+          <a:xfrm>
+            <a:off x="640410" y="1476712"/>
+            <a:ext cx="9646590" cy="2949525"/>
+          </a:xfrm>
+          <a:prstGeom prst="rect">
+            <a:avLst/>
+          </a:prstGeom>
+          <a:noFill/>
+        </p:spPr>
+        <p:txBody>
+          <a:bodyPr wrap="square" rtlCol="0">
+            <a:spAutoFit/>
+          </a:bodyPr>
+          <a:lstStyle/>
+          <a:p>
+            <a:r>
+              <a:rPr lang="bg-BG" sz="2400" dirty="0">
+                <a:solidFill>
+                  <a:schemeClr val="tx1">
+                    <a:lumMod val="75000"/>
+                    <a:lumOff val="25000"/>
+                  </a:schemeClr>
+                </a:solidFill>
+              </a:rPr>
+              <a:t>Основни компоненти:</a:t>
+            </a:r>
+          </a:p>
+          <a:p>
+            <a:pPr marL="854075" lvl="1" indent="-396875">
+              <a:spcBef>
+                <a:spcPts val="1000"/>
+              </a:spcBef>
+              <a:buClr>
+                <a:schemeClr val="accent1"/>
+              </a:buClr>
+              <a:buSzPct val="80000"/>
+              <a:buFont typeface="Wingdings 3" charset="2"/>
+              <a:buChar char=""/>
+              <a:tabLst>
+                <a:tab pos="0" algn="l"/>
+              </a:tabLst>
+            </a:pPr>
+            <a:r>
+              <a:rPr lang="bg-BG" sz="2400" dirty="0">
+                <a:solidFill>
+                  <a:schemeClr val="tx1">
+                    <a:lumMod val="75000"/>
+                    <a:lumOff val="25000"/>
+                  </a:schemeClr>
+                </a:solidFill>
+              </a:rPr>
+              <a:t>Виртуални машини</a:t>
+            </a:r>
+          </a:p>
+          <a:p>
+            <a:pPr marL="854075" lvl="1" indent="-396875">
+              <a:spcBef>
+                <a:spcPts val="1000"/>
+              </a:spcBef>
+              <a:buClr>
+                <a:schemeClr val="accent1"/>
+              </a:buClr>
+              <a:buSzPct val="80000"/>
+              <a:buFont typeface="Wingdings 3" charset="2"/>
+              <a:buChar char=""/>
+              <a:tabLst>
+                <a:tab pos="0" algn="l"/>
+              </a:tabLst>
+            </a:pPr>
+            <a:r>
+              <a:rPr lang="bg-BG" sz="2400" dirty="0">
+                <a:solidFill>
+                  <a:schemeClr val="tx1">
+                    <a:lumMod val="75000"/>
+                    <a:lumOff val="25000"/>
+                  </a:schemeClr>
+                </a:solidFill>
+              </a:rPr>
+              <a:t>Сървъри</a:t>
+            </a:r>
+          </a:p>
+          <a:p>
+            <a:pPr marL="854075" lvl="1" indent="-396875">
+              <a:spcBef>
+                <a:spcPts val="1000"/>
+              </a:spcBef>
+              <a:buClr>
+                <a:schemeClr val="accent1"/>
+              </a:buClr>
+              <a:buSzPct val="80000"/>
+              <a:buFont typeface="Wingdings 3" charset="2"/>
+              <a:buChar char=""/>
+              <a:tabLst>
+                <a:tab pos="0" algn="l"/>
+              </a:tabLst>
+            </a:pPr>
+            <a:r>
+              <a:rPr lang="bg-BG" sz="2400" dirty="0">
+                <a:solidFill>
+                  <a:schemeClr val="tx1">
+                    <a:lumMod val="75000"/>
+                    <a:lumOff val="25000"/>
+                  </a:schemeClr>
+                </a:solidFill>
+              </a:rPr>
+              <a:t>Място за съхранение на информация</a:t>
+            </a:r>
+          </a:p>
+          <a:p>
+            <a:pPr marL="854075" lvl="1" indent="-396875">
+              <a:spcBef>
+                <a:spcPts val="1000"/>
+              </a:spcBef>
+              <a:buClr>
+                <a:schemeClr val="accent1"/>
+              </a:buClr>
+              <a:buSzPct val="80000"/>
+              <a:buFont typeface="Wingdings 3" charset="2"/>
+              <a:buChar char=""/>
+              <a:tabLst>
+                <a:tab pos="0" algn="l"/>
+              </a:tabLst>
+            </a:pPr>
+            <a:r>
+              <a:rPr lang="en-US" sz="2400" dirty="0">
+                <a:solidFill>
+                  <a:schemeClr val="tx1">
+                    <a:lumMod val="75000"/>
+                    <a:lumOff val="25000"/>
+                  </a:schemeClr>
+                </a:solidFill>
+              </a:rPr>
+              <a:t>Load-balancers</a:t>
+            </a:r>
+            <a:endParaRPr lang="bg-BG" sz="2400" dirty="0">
+              <a:solidFill>
+                <a:schemeClr val="tx1">
+                  <a:lumMod val="75000"/>
+                  <a:lumOff val="25000"/>
+                </a:schemeClr>
+              </a:solidFill>
+            </a:endParaRPr>
+          </a:p>
+          <a:p>
+            <a:pPr marL="854075" lvl="1" indent="-396875">
+              <a:spcBef>
+                <a:spcPts val="1000"/>
+              </a:spcBef>
+              <a:buClr>
+                <a:schemeClr val="accent1"/>
+              </a:buClr>
+              <a:buSzPct val="80000"/>
+              <a:buFont typeface="Wingdings 3" charset="2"/>
+              <a:buChar char=""/>
+              <a:tabLst>
+                <a:tab pos="0" algn="l"/>
+              </a:tabLst>
+            </a:pPr>
+            <a:r>
+              <a:rPr lang="bg-BG" sz="2400" dirty="0">
+                <a:solidFill>
+                  <a:schemeClr val="tx1">
+                    <a:lumMod val="75000"/>
+                    <a:lumOff val="25000"/>
+                  </a:schemeClr>
+                </a:solidFill>
+              </a:rPr>
+              <a:t>Мрежови </a:t>
+            </a:r>
+            <a:r>
+              <a:rPr lang="bg-BG" sz="2400" dirty="0" smtClean="0">
+                <a:solidFill>
+                  <a:schemeClr val="tx1">
+                    <a:lumMod val="75000"/>
+                    <a:lumOff val="25000"/>
+                  </a:schemeClr>
+                </a:solidFill>
+              </a:rPr>
+              <a:t>достъп</a:t>
+            </a:r>
+          </a:p>
+        </p:txBody>
+      </p:sp>
+    </p:spTree>
+    <p:extLst>
+      <p:ext uri="{BB962C8B-B14F-4D97-AF65-F5344CB8AC3E}">
+        <p14:creationId xmlns:p14="http://schemas.microsoft.com/office/powerpoint/2010/main" val="3124723652"/>
+      </p:ext>
+    </p:extLst>
+  </p:cSld>
+  <p:clrMapOvr>
+    <a:masterClrMapping/>
+  </p:clrMapOvr>
+  <p:timing>
+    <p:tnLst>
+      <p:par>
+        <p:cTn id="1" dur="indefinite" restart="never" nodeType="tmRoot"/>
+      </p:par>
+    </p:tnLst>
+  </p:timing>
+</p:sld>
+</file>
+
+<file path=ppt/slides/slide8.xml><?xml version="1.0" encoding="utf-8"?>
+<p:sld xmlns:a="http://schemas.openxmlformats.org/drawingml/2006/main" xmlns:r="http://schemas.openxmlformats.org/officeDocument/2006/relationships" xmlns:p="http://schemas.openxmlformats.org/presentationml/2006/main">
+  <p:cSld>
+    <p:spTree>
+      <p:nvGrpSpPr>
+        <p:cNvPr id="1" name=""/>
+        <p:cNvGrpSpPr/>
+        <p:nvPr/>
+      </p:nvGrpSpPr>
+      <p:grpSpPr>
+        <a:xfrm>
+          <a:off x="0" y="0"/>
+          <a:ext cx="0" cy="0"/>
+          <a:chOff x="0" y="0"/>
+          <a:chExt cx="0" cy="0"/>
+        </a:xfrm>
+      </p:grpSpPr>
+      <p:sp>
+        <p:nvSpPr>
+          <p:cNvPr id="4" name="Title 1"/>
+          <p:cNvSpPr txBox="1">
+            <a:spLocks/>
+          </p:cNvSpPr>
+          <p:nvPr/>
+        </p:nvSpPr>
+        <p:spPr>
+          <a:xfrm>
+            <a:off x="580452" y="414239"/>
+            <a:ext cx="6960537" cy="1047481"/>
+          </a:xfrm>
+          <a:prstGeom prst="rect">
+            <a:avLst/>
+          </a:prstGeom>
+        </p:spPr>
+        <p:txBody>
+          <a:bodyPr vert="horz" lIns="91440" tIns="45720" rIns="91440" bIns="45720" rtlCol="0" anchor="t">
+            <a:normAutofit fontScale="92500"/>
+          </a:bodyPr>
+          <a:lstStyle>
+            <a:lvl1pPr algn="l" defTabSz="457200" rtl="0" eaLnBrk="1" latinLnBrk="0" hangingPunct="1">
+              <a:spcBef>
+                <a:spcPct val="0"/>
+              </a:spcBef>
+              <a:buNone/>
+              <a:defRPr sz="3600" kern="1200">
+                <a:solidFill>
+                  <a:schemeClr val="accent1"/>
+                </a:solidFill>
+                <a:latin typeface="+mj-lt"/>
+                <a:ea typeface="+mj-ea"/>
+                <a:cs typeface="+mj-cs"/>
+              </a:defRPr>
+            </a:lvl1pPr>
+            <a:lvl2pPr eaLnBrk="1" hangingPunct="1">
+              <a:defRPr>
+                <a:solidFill>
+                  <a:schemeClr val="tx2"/>
+                </a:solidFill>
+              </a:defRPr>
+            </a:lvl2pPr>
+            <a:lvl3pPr eaLnBrk="1" hangingPunct="1">
+              <a:defRPr>
+                <a:solidFill>
+                  <a:schemeClr val="tx2"/>
+                </a:solidFill>
+              </a:defRPr>
+            </a:lvl3pPr>
+            <a:lvl4pPr eaLnBrk="1" hangingPunct="1">
+              <a:defRPr>
+                <a:solidFill>
+                  <a:schemeClr val="tx2"/>
+                </a:solidFill>
+              </a:defRPr>
+            </a:lvl4pPr>
+            <a:lvl5pPr eaLnBrk="1" hangingPunct="1">
+              <a:defRPr>
+                <a:solidFill>
+                  <a:schemeClr val="tx2"/>
+                </a:solidFill>
+              </a:defRPr>
+            </a:lvl5pPr>
+            <a:lvl6pPr eaLnBrk="1" hangingPunct="1">
+              <a:defRPr>
+                <a:solidFill>
+                  <a:schemeClr val="tx2"/>
+                </a:solidFill>
+              </a:defRPr>
+            </a:lvl6pPr>
+            <a:lvl7pPr eaLnBrk="1" hangingPunct="1">
+              <a:defRPr>
+                <a:solidFill>
+                  <a:schemeClr val="tx2"/>
+                </a:solidFill>
+              </a:defRPr>
+            </a:lvl7pPr>
+            <a:lvl8pPr eaLnBrk="1" hangingPunct="1">
+              <a:defRPr>
+                <a:solidFill>
+                  <a:schemeClr val="tx2"/>
+                </a:solidFill>
+              </a:defRPr>
+            </a:lvl8pPr>
+            <a:lvl9pPr eaLnBrk="1" hangingPunct="1">
+              <a:defRPr>
+                <a:solidFill>
+                  <a:schemeClr val="tx2"/>
+                </a:solidFill>
+              </a:defRPr>
+            </a:lvl9pPr>
+          </a:lstStyle>
+          <a:p>
+            <a:r>
+              <a:rPr lang="bg-BG" dirty="0" smtClean="0"/>
+              <a:t>Инфраструктура като услуга (</a:t>
+            </a:r>
+            <a:r>
+              <a:rPr lang="en-US" dirty="0" smtClean="0"/>
+              <a:t>IaaS)</a:t>
+            </a:r>
+            <a:endParaRPr lang="bg-BG" dirty="0"/>
+          </a:p>
+        </p:txBody>
+      </p:sp>
+      <p:sp>
+        <p:nvSpPr>
+          <p:cNvPr id="2" name="Текстово поле 1"/>
+          <p:cNvSpPr txBox="1"/>
+          <p:nvPr/>
+        </p:nvSpPr>
+        <p:spPr>
+          <a:xfrm>
+            <a:off x="580452" y="1461720"/>
+            <a:ext cx="9717791" cy="3816429"/>
+          </a:xfrm>
+          <a:prstGeom prst="rect">
+            <a:avLst/>
+          </a:prstGeom>
+          <a:noFill/>
+        </p:spPr>
+        <p:txBody>
+          <a:bodyPr wrap="square" rtlCol="0">
+            <a:spAutoFit/>
+          </a:bodyPr>
+          <a:lstStyle/>
+          <a:p>
+            <a:r>
+              <a:rPr lang="bg-BG" sz="2400" dirty="0" smtClean="0">
+                <a:solidFill>
+                  <a:schemeClr val="tx1">
+                    <a:lumMod val="75000"/>
+                    <a:lumOff val="25000"/>
+                  </a:schemeClr>
+                </a:solidFill>
+              </a:rPr>
+              <a:t>Предимства:</a:t>
+            </a:r>
+            <a:endParaRPr lang="bg-BG" sz="2400" dirty="0">
+              <a:solidFill>
+                <a:schemeClr val="tx1">
+                  <a:lumMod val="75000"/>
+                  <a:lumOff val="25000"/>
+                </a:schemeClr>
+              </a:solidFill>
+            </a:endParaRPr>
+          </a:p>
+          <a:p>
+            <a:pPr marL="854075" lvl="1" indent="-396875">
+              <a:spcBef>
+                <a:spcPts val="1000"/>
+              </a:spcBef>
+              <a:buClr>
+                <a:schemeClr val="accent1"/>
+              </a:buClr>
+              <a:buSzPct val="80000"/>
+              <a:buFont typeface="Wingdings 3" charset="2"/>
+              <a:buChar char=""/>
+              <a:tabLst>
+                <a:tab pos="0" algn="l"/>
+              </a:tabLst>
+            </a:pPr>
+            <a:r>
+              <a:rPr lang="bg-BG" sz="2400" dirty="0" err="1">
+                <a:solidFill>
+                  <a:schemeClr val="tx1">
+                    <a:lumMod val="75000"/>
+                    <a:lumOff val="25000"/>
+                  </a:schemeClr>
+                </a:solidFill>
+              </a:rPr>
+              <a:t>Мащабируемост</a:t>
+            </a:r>
+            <a:r>
+              <a:rPr lang="bg-BG" sz="2400" dirty="0">
+                <a:solidFill>
+                  <a:schemeClr val="tx1">
+                    <a:lumMod val="75000"/>
+                    <a:lumOff val="25000"/>
+                  </a:schemeClr>
+                </a:solidFill>
+              </a:rPr>
+              <a:t> без забавяне при разширяване на ресурсите</a:t>
+            </a:r>
+          </a:p>
+          <a:p>
+            <a:pPr marL="854075" lvl="1" indent="-396875">
+              <a:spcBef>
+                <a:spcPts val="1000"/>
+              </a:spcBef>
+              <a:buClr>
+                <a:schemeClr val="accent1"/>
+              </a:buClr>
+              <a:buSzPct val="80000"/>
+              <a:buFont typeface="Wingdings 3" charset="2"/>
+              <a:buChar char=""/>
+              <a:tabLst>
+                <a:tab pos="0" algn="l"/>
+              </a:tabLst>
+            </a:pPr>
+            <a:r>
+              <a:rPr lang="bg-BG" sz="2400" dirty="0">
+                <a:solidFill>
+                  <a:schemeClr val="tx1">
+                    <a:lumMod val="75000"/>
+                    <a:lumOff val="25000"/>
+                  </a:schemeClr>
+                </a:solidFill>
+              </a:rPr>
+              <a:t>Няма нужда от допълнителна инвестиция в хардуер</a:t>
+            </a:r>
+          </a:p>
+          <a:p>
+            <a:pPr marL="854075" lvl="1" indent="-396875">
+              <a:spcBef>
+                <a:spcPts val="1000"/>
+              </a:spcBef>
+              <a:buClr>
+                <a:schemeClr val="accent1"/>
+              </a:buClr>
+              <a:buSzPct val="80000"/>
+              <a:buFont typeface="Wingdings 3" charset="2"/>
+              <a:buChar char=""/>
+              <a:tabLst>
+                <a:tab pos="0" algn="l"/>
+              </a:tabLst>
+            </a:pPr>
+            <a:r>
+              <a:rPr lang="bg-BG" sz="2400" dirty="0">
+                <a:solidFill>
+                  <a:schemeClr val="tx1">
+                    <a:lumMod val="75000"/>
+                    <a:lumOff val="25000"/>
+                  </a:schemeClr>
+                </a:solidFill>
+              </a:rPr>
+              <a:t>Клиентът използва това, за което платил</a:t>
+            </a:r>
+          </a:p>
+          <a:p>
+            <a:pPr marL="854075" lvl="1" indent="-396875">
+              <a:spcBef>
+                <a:spcPts val="1000"/>
+              </a:spcBef>
+              <a:buClr>
+                <a:schemeClr val="accent1"/>
+              </a:buClr>
+              <a:buSzPct val="80000"/>
+              <a:buFont typeface="Wingdings 3" charset="2"/>
+              <a:buChar char=""/>
+              <a:tabLst>
+                <a:tab pos="0" algn="l"/>
+              </a:tabLst>
+            </a:pPr>
+            <a:r>
+              <a:rPr lang="bg-BG" sz="2400" dirty="0">
+                <a:solidFill>
+                  <a:schemeClr val="tx1">
+                    <a:lumMod val="75000"/>
+                    <a:lumOff val="25000"/>
+                  </a:schemeClr>
+                </a:solidFill>
+              </a:rPr>
+              <a:t>Независимост от локацията</a:t>
+            </a:r>
+          </a:p>
+          <a:p>
+            <a:pPr marL="854075" lvl="1" indent="-396875">
+              <a:spcBef>
+                <a:spcPts val="1000"/>
+              </a:spcBef>
+              <a:buClr>
+                <a:schemeClr val="accent1"/>
+              </a:buClr>
+              <a:buSzPct val="80000"/>
+              <a:buFont typeface="Wingdings 3" charset="2"/>
+              <a:buChar char=""/>
+              <a:tabLst>
+                <a:tab pos="0" algn="l"/>
+              </a:tabLst>
+            </a:pPr>
+            <a:r>
+              <a:rPr lang="bg-BG" sz="2400" dirty="0">
+                <a:solidFill>
+                  <a:schemeClr val="tx1">
+                    <a:lumMod val="75000"/>
+                    <a:lumOff val="25000"/>
+                  </a:schemeClr>
+                </a:solidFill>
+              </a:rPr>
+              <a:t>Високо ниво на </a:t>
+            </a:r>
+            <a:r>
+              <a:rPr lang="bg-BG" sz="2400" dirty="0" smtClean="0">
+                <a:solidFill>
+                  <a:schemeClr val="tx1">
+                    <a:lumMod val="75000"/>
+                    <a:lumOff val="25000"/>
+                  </a:schemeClr>
+                </a:solidFill>
+              </a:rPr>
+              <a:t>сигурност</a:t>
+            </a:r>
+            <a:endParaRPr lang="en-US" sz="2400" dirty="0">
+              <a:solidFill>
+                <a:schemeClr val="tx1">
+                  <a:lumMod val="75000"/>
+                  <a:lumOff val="25000"/>
+                </a:schemeClr>
+              </a:solidFill>
+            </a:endParaRPr>
+          </a:p>
+          <a:p>
+            <a:pPr marL="854075" lvl="1" indent="-396875">
+              <a:spcBef>
+                <a:spcPts val="1000"/>
+              </a:spcBef>
+              <a:buClr>
+                <a:schemeClr val="accent1"/>
+              </a:buClr>
+              <a:buSzPct val="80000"/>
+              <a:buFont typeface="Wingdings 3" charset="2"/>
+              <a:buChar char=""/>
+              <a:tabLst>
+                <a:tab pos="0" algn="l"/>
+              </a:tabLst>
+            </a:pPr>
+            <a:r>
+              <a:rPr lang="en-US" sz="2400" dirty="0" smtClean="0">
+                <a:solidFill>
+                  <a:schemeClr val="tx1">
+                    <a:lumMod val="75000"/>
+                    <a:lumOff val="25000"/>
+                  </a:schemeClr>
+                </a:solidFill>
+              </a:rPr>
+              <a:t>No single point of failure</a:t>
+            </a:r>
+            <a:endParaRPr lang="bg-BG" sz="2400" dirty="0" smtClean="0">
+              <a:solidFill>
+                <a:schemeClr val="tx1">
+                  <a:lumMod val="75000"/>
+                  <a:lumOff val="25000"/>
+                </a:schemeClr>
+              </a:solidFill>
+            </a:endParaRPr>
+          </a:p>
+        </p:txBody>
+      </p:sp>
+    </p:spTree>
+    <p:extLst>
+      <p:ext uri="{BB962C8B-B14F-4D97-AF65-F5344CB8AC3E}">
+        <p14:creationId xmlns:p14="http://schemas.microsoft.com/office/powerpoint/2010/main" val="2113968477"/>
+      </p:ext>
+    </p:extLst>
+  </p:cSld>
+  <p:clrMapOvr>
+    <a:masterClrMapping/>
+  </p:clrMapOvr>
+  <p:timing>
+    <p:tnLst>
+      <p:par>
+        <p:cTn id="1" dur="indefinite" restart="never" nodeType="tmRoot"/>
+      </p:par>
+    </p:tnLst>
+  </p:timing>
+</p:sld>
+</file>
+
+<file path=ppt/slides/slide9.xml><?xml version="1.0" encoding="utf-8"?>
+<p:sld xmlns:a="http://schemas.openxmlformats.org/drawingml/2006/main" xmlns:r="http://schemas.openxmlformats.org/officeDocument/2006/relationships" xmlns:p="http://schemas.openxmlformats.org/presentationml/2006/main">
+  <p:cSld>
+    <p:spTree>
+      <p:nvGrpSpPr>
+        <p:cNvPr id="1" name=""/>
+        <p:cNvGrpSpPr/>
+        <p:nvPr/>
+      </p:nvGrpSpPr>
+      <p:grpSpPr>
+        <a:xfrm>
+          <a:off x="0" y="0"/>
+          <a:ext cx="0" cy="0"/>
+          <a:chOff x="0" y="0"/>
+          <a:chExt cx="0" cy="0"/>
+        </a:xfrm>
+      </p:grpSpPr>
+      <p:sp>
+        <p:nvSpPr>
+          <p:cNvPr id="4" name="Title 1"/>
+          <p:cNvSpPr txBox="1">
+            <a:spLocks/>
+          </p:cNvSpPr>
+          <p:nvPr/>
+        </p:nvSpPr>
+        <p:spPr>
+          <a:xfrm>
+            <a:off x="640412" y="399245"/>
+            <a:ext cx="6960537" cy="1047481"/>
+          </a:xfrm>
+          <a:prstGeom prst="rect">
+            <a:avLst/>
+          </a:prstGeom>
+        </p:spPr>
+        <p:txBody>
+          <a:bodyPr vert="horz" lIns="91440" tIns="45720" rIns="91440" bIns="45720" rtlCol="0" anchor="t">
+            <a:normAutofit fontScale="92500"/>
+          </a:bodyPr>
+          <a:lstStyle>
+            <a:lvl1pPr algn="l" defTabSz="457200" rtl="0" eaLnBrk="1" latinLnBrk="0" hangingPunct="1">
+              <a:spcBef>
+                <a:spcPct val="0"/>
+              </a:spcBef>
+              <a:buNone/>
+              <a:defRPr sz="3600" kern="1200">
+                <a:solidFill>
+                  <a:schemeClr val="accent1"/>
+                </a:solidFill>
+                <a:latin typeface="+mj-lt"/>
+                <a:ea typeface="+mj-ea"/>
+                <a:cs typeface="+mj-cs"/>
+              </a:defRPr>
+            </a:lvl1pPr>
+            <a:lvl2pPr eaLnBrk="1" hangingPunct="1">
+              <a:defRPr>
+                <a:solidFill>
+                  <a:schemeClr val="tx2"/>
+                </a:solidFill>
+              </a:defRPr>
+            </a:lvl2pPr>
+            <a:lvl3pPr eaLnBrk="1" hangingPunct="1">
+              <a:defRPr>
+                <a:solidFill>
+                  <a:schemeClr val="tx2"/>
+                </a:solidFill>
+              </a:defRPr>
+            </a:lvl3pPr>
+            <a:lvl4pPr eaLnBrk="1" hangingPunct="1">
+              <a:defRPr>
+                <a:solidFill>
+                  <a:schemeClr val="tx2"/>
+                </a:solidFill>
+              </a:defRPr>
+            </a:lvl4pPr>
+            <a:lvl5pPr eaLnBrk="1" hangingPunct="1">
+              <a:defRPr>
+                <a:solidFill>
+                  <a:schemeClr val="tx2"/>
+                </a:solidFill>
+              </a:defRPr>
+            </a:lvl5pPr>
+            <a:lvl6pPr eaLnBrk="1" hangingPunct="1">
+              <a:defRPr>
+                <a:solidFill>
+                  <a:schemeClr val="tx2"/>
+                </a:solidFill>
+              </a:defRPr>
+            </a:lvl6pPr>
+            <a:lvl7pPr eaLnBrk="1" hangingPunct="1">
+              <a:defRPr>
+                <a:solidFill>
+                  <a:schemeClr val="tx2"/>
+                </a:solidFill>
+              </a:defRPr>
+            </a:lvl7pPr>
+            <a:lvl8pPr eaLnBrk="1" hangingPunct="1">
+              <a:defRPr>
+                <a:solidFill>
+                  <a:schemeClr val="tx2"/>
+                </a:solidFill>
+              </a:defRPr>
+            </a:lvl8pPr>
+            <a:lvl9pPr eaLnBrk="1" hangingPunct="1">
+              <a:defRPr>
+                <a:solidFill>
+                  <a:schemeClr val="tx2"/>
+                </a:solidFill>
+              </a:defRPr>
+            </a:lvl9pPr>
+          </a:lstStyle>
+          <a:p>
+            <a:r>
+              <a:rPr lang="bg-BG" dirty="0" smtClean="0"/>
+              <a:t>Инфраструктура като услуга (</a:t>
+            </a:r>
+            <a:r>
+              <a:rPr lang="en-US" dirty="0" smtClean="0"/>
+              <a:t>IaaS)</a:t>
+            </a:r>
+            <a:endParaRPr lang="bg-BG" dirty="0"/>
+          </a:p>
+        </p:txBody>
+      </p:sp>
+      <p:pic>
+        <p:nvPicPr>
+          <p:cNvPr id="1026" name="Picture 2" descr="http://www.arrayguard.com/images/solutions/IaaS-Diagram.png"/>
+          <p:cNvPicPr>
+            <a:picLocks noChangeAspect="1" noChangeArrowheads="1"/>
+          </p:cNvPicPr>
+          <p:nvPr/>
+        </p:nvPicPr>
+        <p:blipFill>
+          <a:blip r:embed="rId3">
+            <a:extLst>
+              <a:ext uri="{28A0092B-C50C-407E-A947-70E740481C1C}">
+                <a14:useLocalDpi xmlns:a14="http://schemas.microsoft.com/office/drawing/2010/main" val="0"/>
+              </a:ext>
+            </a:extLst>
+          </a:blip>
+          <a:srcRect/>
+          <a:stretch>
+            <a:fillRect/>
+          </a:stretch>
+        </p:blipFill>
+        <p:spPr bwMode="auto">
+          <a:xfrm>
+            <a:off x="640411" y="1446726"/>
+            <a:ext cx="8760723" cy="4768337"/>
+          </a:xfrm>
+          <a:prstGeom prst="rect">
+            <a:avLst/>
+          </a:prstGeom>
+          <a:noFill/>
+          <a:extLst>
+            <a:ext uri="{909E8E84-426E-40DD-AFC4-6F175D3DCCD1}">
+              <a14:hiddenFill xmlns:a14="http://schemas.microsoft.com/office/drawing/2010/main">
+                <a:solidFill>
+                  <a:srgbClr val="FFFFFF"/>
+                </a:solidFill>
+              </a14:hiddenFill>
+            </a:ext>
+          </a:extLst>
+        </p:spPr>
+      </p:pic>
     </p:spTree>
     <p:extLst>
       <p:ext uri="{BB962C8B-B14F-4D97-AF65-F5344CB8AC3E}">

</xml_diff>

<commit_message>
Add slides for Deployment models
</commit_message>
<xml_diff>
--- a/CLOUD COMPUTING.pptx
+++ b/CLOUD COMPUTING.pptx
@@ -5,7 +5,7 @@
     <p:sldMasterId id="2147483648" r:id="rId1"/>
   </p:sldMasterIdLst>
   <p:notesMasterIdLst>
-    <p:notesMasterId r:id="rId16"/>
+    <p:notesMasterId r:id="rId24"/>
   </p:notesMasterIdLst>
   <p:sldIdLst>
     <p:sldId id="256" r:id="rId2"/>
@@ -22,6 +22,14 @@
     <p:sldId id="269" r:id="rId13"/>
     <p:sldId id="271" r:id="rId14"/>
     <p:sldId id="272" r:id="rId15"/>
+    <p:sldId id="273" r:id="rId16"/>
+    <p:sldId id="274" r:id="rId17"/>
+    <p:sldId id="275" r:id="rId18"/>
+    <p:sldId id="276" r:id="rId19"/>
+    <p:sldId id="277" r:id="rId20"/>
+    <p:sldId id="278" r:id="rId21"/>
+    <p:sldId id="279" r:id="rId22"/>
+    <p:sldId id="280" r:id="rId23"/>
   </p:sldIdLst>
   <p:sldSz cx="12192000" cy="6858000"/>
   <p:notesSz cx="6858000" cy="9144000"/>
@@ -210,7 +218,7 @@
           <a:p>
             <a:fld id="{78AF2967-8E22-4B42-90F2-D88CC1BBE804}" type="datetimeFigureOut">
               <a:rPr lang="en-US" smtClean="0"/>
-              <a:t>4/6/2016</a:t>
+              <a:t>08-Apr-16</a:t>
             </a:fld>
             <a:endParaRPr lang="en-US"/>
           </a:p>
@@ -637,6 +645,678 @@
     <p:extLst>
       <p:ext uri="{BB962C8B-B14F-4D97-AF65-F5344CB8AC3E}">
         <p14:creationId xmlns:p14="http://schemas.microsoft.com/office/powerpoint/2010/main" val="1687752865"/>
+      </p:ext>
+    </p:extLst>
+  </p:cSld>
+  <p:clrMapOvr>
+    <a:masterClrMapping/>
+  </p:clrMapOvr>
+</p:notes>
+</file>
+
+<file path=ppt/notesSlides/notesSlide11.xml><?xml version="1.0" encoding="utf-8"?>
+<p:notes xmlns:a="http://schemas.openxmlformats.org/drawingml/2006/main" xmlns:r="http://schemas.openxmlformats.org/officeDocument/2006/relationships" xmlns:p="http://schemas.openxmlformats.org/presentationml/2006/main">
+  <p:cSld>
+    <p:spTree>
+      <p:nvGrpSpPr>
+        <p:cNvPr id="1" name=""/>
+        <p:cNvGrpSpPr/>
+        <p:nvPr/>
+      </p:nvGrpSpPr>
+      <p:grpSpPr>
+        <a:xfrm>
+          <a:off x="0" y="0"/>
+          <a:ext cx="0" cy="0"/>
+          <a:chOff x="0" y="0"/>
+          <a:chExt cx="0" cy="0"/>
+        </a:xfrm>
+      </p:grpSpPr>
+      <p:sp>
+        <p:nvSpPr>
+          <p:cNvPr id="2" name="Контейнер за изображение на слайда 1"/>
+          <p:cNvSpPr>
+            <a:spLocks noGrp="1" noRot="1" noChangeAspect="1"/>
+          </p:cNvSpPr>
+          <p:nvPr>
+            <p:ph type="sldImg"/>
+          </p:nvPr>
+        </p:nvSpPr>
+        <p:spPr/>
+      </p:sp>
+      <p:sp>
+        <p:nvSpPr>
+          <p:cNvPr id="3" name="Контейнер за бележки 2"/>
+          <p:cNvSpPr>
+            <a:spLocks noGrp="1"/>
+          </p:cNvSpPr>
+          <p:nvPr>
+            <p:ph type="body" idx="1"/>
+          </p:nvPr>
+        </p:nvSpPr>
+        <p:spPr/>
+        <p:txBody>
+          <a:bodyPr/>
+          <a:lstStyle/>
+          <a:p>
+            <a:endParaRPr lang="en-US" dirty="0"/>
+          </a:p>
+        </p:txBody>
+      </p:sp>
+      <p:sp>
+        <p:nvSpPr>
+          <p:cNvPr id="4" name="Контейнер за номер на слайда 3"/>
+          <p:cNvSpPr>
+            <a:spLocks noGrp="1"/>
+          </p:cNvSpPr>
+          <p:nvPr>
+            <p:ph type="sldNum" sz="quarter" idx="10"/>
+          </p:nvPr>
+        </p:nvSpPr>
+        <p:spPr/>
+        <p:txBody>
+          <a:bodyPr/>
+          <a:lstStyle/>
+          <a:p>
+            <a:fld id="{34DB9454-9595-409E-8BC5-8848C7CC2ACF}" type="slidenum">
+              <a:rPr lang="en-US" smtClean="0"/>
+              <a:t>15</a:t>
+            </a:fld>
+            <a:endParaRPr lang="en-US"/>
+          </a:p>
+        </p:txBody>
+      </p:sp>
+    </p:spTree>
+    <p:extLst>
+      <p:ext uri="{BB962C8B-B14F-4D97-AF65-F5344CB8AC3E}">
+        <p14:creationId xmlns:p14="http://schemas.microsoft.com/office/powerpoint/2010/main" val="3720334803"/>
+      </p:ext>
+    </p:extLst>
+  </p:cSld>
+  <p:clrMapOvr>
+    <a:masterClrMapping/>
+  </p:clrMapOvr>
+</p:notes>
+</file>
+
+<file path=ppt/notesSlides/notesSlide12.xml><?xml version="1.0" encoding="utf-8"?>
+<p:notes xmlns:a="http://schemas.openxmlformats.org/drawingml/2006/main" xmlns:r="http://schemas.openxmlformats.org/officeDocument/2006/relationships" xmlns:p="http://schemas.openxmlformats.org/presentationml/2006/main">
+  <p:cSld>
+    <p:spTree>
+      <p:nvGrpSpPr>
+        <p:cNvPr id="1" name=""/>
+        <p:cNvGrpSpPr/>
+        <p:nvPr/>
+      </p:nvGrpSpPr>
+      <p:grpSpPr>
+        <a:xfrm>
+          <a:off x="0" y="0"/>
+          <a:ext cx="0" cy="0"/>
+          <a:chOff x="0" y="0"/>
+          <a:chExt cx="0" cy="0"/>
+        </a:xfrm>
+      </p:grpSpPr>
+      <p:sp>
+        <p:nvSpPr>
+          <p:cNvPr id="2" name="Контейнер за изображение на слайда 1"/>
+          <p:cNvSpPr>
+            <a:spLocks noGrp="1" noRot="1" noChangeAspect="1"/>
+          </p:cNvSpPr>
+          <p:nvPr>
+            <p:ph type="sldImg"/>
+          </p:nvPr>
+        </p:nvSpPr>
+        <p:spPr/>
+      </p:sp>
+      <p:sp>
+        <p:nvSpPr>
+          <p:cNvPr id="3" name="Контейнер за бележки 2"/>
+          <p:cNvSpPr>
+            <a:spLocks noGrp="1"/>
+          </p:cNvSpPr>
+          <p:nvPr>
+            <p:ph type="body" idx="1"/>
+          </p:nvPr>
+        </p:nvSpPr>
+        <p:spPr/>
+        <p:txBody>
+          <a:bodyPr/>
+          <a:lstStyle/>
+          <a:p>
+            <a:endParaRPr lang="en-US" dirty="0"/>
+          </a:p>
+        </p:txBody>
+      </p:sp>
+      <p:sp>
+        <p:nvSpPr>
+          <p:cNvPr id="4" name="Контейнер за номер на слайда 3"/>
+          <p:cNvSpPr>
+            <a:spLocks noGrp="1"/>
+          </p:cNvSpPr>
+          <p:nvPr>
+            <p:ph type="sldNum" sz="quarter" idx="10"/>
+          </p:nvPr>
+        </p:nvSpPr>
+        <p:spPr/>
+        <p:txBody>
+          <a:bodyPr/>
+          <a:lstStyle/>
+          <a:p>
+            <a:fld id="{34DB9454-9595-409E-8BC5-8848C7CC2ACF}" type="slidenum">
+              <a:rPr lang="en-US" smtClean="0"/>
+              <a:t>16</a:t>
+            </a:fld>
+            <a:endParaRPr lang="en-US"/>
+          </a:p>
+        </p:txBody>
+      </p:sp>
+    </p:spTree>
+    <p:extLst>
+      <p:ext uri="{BB962C8B-B14F-4D97-AF65-F5344CB8AC3E}">
+        <p14:creationId xmlns:p14="http://schemas.microsoft.com/office/powerpoint/2010/main" val="2739552167"/>
+      </p:ext>
+    </p:extLst>
+  </p:cSld>
+  <p:clrMapOvr>
+    <a:masterClrMapping/>
+  </p:clrMapOvr>
+</p:notes>
+</file>
+
+<file path=ppt/notesSlides/notesSlide13.xml><?xml version="1.0" encoding="utf-8"?>
+<p:notes xmlns:a="http://schemas.openxmlformats.org/drawingml/2006/main" xmlns:r="http://schemas.openxmlformats.org/officeDocument/2006/relationships" xmlns:p="http://schemas.openxmlformats.org/presentationml/2006/main">
+  <p:cSld>
+    <p:spTree>
+      <p:nvGrpSpPr>
+        <p:cNvPr id="1" name=""/>
+        <p:cNvGrpSpPr/>
+        <p:nvPr/>
+      </p:nvGrpSpPr>
+      <p:grpSpPr>
+        <a:xfrm>
+          <a:off x="0" y="0"/>
+          <a:ext cx="0" cy="0"/>
+          <a:chOff x="0" y="0"/>
+          <a:chExt cx="0" cy="0"/>
+        </a:xfrm>
+      </p:grpSpPr>
+      <p:sp>
+        <p:nvSpPr>
+          <p:cNvPr id="2" name="Контейнер за изображение на слайда 1"/>
+          <p:cNvSpPr>
+            <a:spLocks noGrp="1" noRot="1" noChangeAspect="1"/>
+          </p:cNvSpPr>
+          <p:nvPr>
+            <p:ph type="sldImg"/>
+          </p:nvPr>
+        </p:nvSpPr>
+        <p:spPr/>
+      </p:sp>
+      <p:sp>
+        <p:nvSpPr>
+          <p:cNvPr id="3" name="Контейнер за бележки 2"/>
+          <p:cNvSpPr>
+            <a:spLocks noGrp="1"/>
+          </p:cNvSpPr>
+          <p:nvPr>
+            <p:ph type="body" idx="1"/>
+          </p:nvPr>
+        </p:nvSpPr>
+        <p:spPr/>
+        <p:txBody>
+          <a:bodyPr/>
+          <a:lstStyle/>
+          <a:p>
+            <a:endParaRPr lang="en-US" dirty="0"/>
+          </a:p>
+        </p:txBody>
+      </p:sp>
+      <p:sp>
+        <p:nvSpPr>
+          <p:cNvPr id="4" name="Контейнер за номер на слайда 3"/>
+          <p:cNvSpPr>
+            <a:spLocks noGrp="1"/>
+          </p:cNvSpPr>
+          <p:nvPr>
+            <p:ph type="sldNum" sz="quarter" idx="10"/>
+          </p:nvPr>
+        </p:nvSpPr>
+        <p:spPr/>
+        <p:txBody>
+          <a:bodyPr/>
+          <a:lstStyle/>
+          <a:p>
+            <a:fld id="{34DB9454-9595-409E-8BC5-8848C7CC2ACF}" type="slidenum">
+              <a:rPr lang="en-US" smtClean="0"/>
+              <a:t>17</a:t>
+            </a:fld>
+            <a:endParaRPr lang="en-US"/>
+          </a:p>
+        </p:txBody>
+      </p:sp>
+    </p:spTree>
+    <p:extLst>
+      <p:ext uri="{BB962C8B-B14F-4D97-AF65-F5344CB8AC3E}">
+        <p14:creationId xmlns:p14="http://schemas.microsoft.com/office/powerpoint/2010/main" val="4264297152"/>
+      </p:ext>
+    </p:extLst>
+  </p:cSld>
+  <p:clrMapOvr>
+    <a:masterClrMapping/>
+  </p:clrMapOvr>
+</p:notes>
+</file>
+
+<file path=ppt/notesSlides/notesSlide14.xml><?xml version="1.0" encoding="utf-8"?>
+<p:notes xmlns:a="http://schemas.openxmlformats.org/drawingml/2006/main" xmlns:r="http://schemas.openxmlformats.org/officeDocument/2006/relationships" xmlns:p="http://schemas.openxmlformats.org/presentationml/2006/main">
+  <p:cSld>
+    <p:spTree>
+      <p:nvGrpSpPr>
+        <p:cNvPr id="1" name=""/>
+        <p:cNvGrpSpPr/>
+        <p:nvPr/>
+      </p:nvGrpSpPr>
+      <p:grpSpPr>
+        <a:xfrm>
+          <a:off x="0" y="0"/>
+          <a:ext cx="0" cy="0"/>
+          <a:chOff x="0" y="0"/>
+          <a:chExt cx="0" cy="0"/>
+        </a:xfrm>
+      </p:grpSpPr>
+      <p:sp>
+        <p:nvSpPr>
+          <p:cNvPr id="2" name="Контейнер за изображение на слайда 1"/>
+          <p:cNvSpPr>
+            <a:spLocks noGrp="1" noRot="1" noChangeAspect="1"/>
+          </p:cNvSpPr>
+          <p:nvPr>
+            <p:ph type="sldImg"/>
+          </p:nvPr>
+        </p:nvSpPr>
+        <p:spPr/>
+      </p:sp>
+      <p:sp>
+        <p:nvSpPr>
+          <p:cNvPr id="3" name="Контейнер за бележки 2"/>
+          <p:cNvSpPr>
+            <a:spLocks noGrp="1"/>
+          </p:cNvSpPr>
+          <p:nvPr>
+            <p:ph type="body" idx="1"/>
+          </p:nvPr>
+        </p:nvSpPr>
+        <p:spPr/>
+        <p:txBody>
+          <a:bodyPr/>
+          <a:lstStyle/>
+          <a:p>
+            <a:endParaRPr lang="en-US" dirty="0"/>
+          </a:p>
+        </p:txBody>
+      </p:sp>
+      <p:sp>
+        <p:nvSpPr>
+          <p:cNvPr id="4" name="Контейнер за номер на слайда 3"/>
+          <p:cNvSpPr>
+            <a:spLocks noGrp="1"/>
+          </p:cNvSpPr>
+          <p:nvPr>
+            <p:ph type="sldNum" sz="quarter" idx="10"/>
+          </p:nvPr>
+        </p:nvSpPr>
+        <p:spPr/>
+        <p:txBody>
+          <a:bodyPr/>
+          <a:lstStyle/>
+          <a:p>
+            <a:fld id="{34DB9454-9595-409E-8BC5-8848C7CC2ACF}" type="slidenum">
+              <a:rPr lang="en-US" smtClean="0"/>
+              <a:t>18</a:t>
+            </a:fld>
+            <a:endParaRPr lang="en-US"/>
+          </a:p>
+        </p:txBody>
+      </p:sp>
+    </p:spTree>
+    <p:extLst>
+      <p:ext uri="{BB962C8B-B14F-4D97-AF65-F5344CB8AC3E}">
+        <p14:creationId xmlns:p14="http://schemas.microsoft.com/office/powerpoint/2010/main" val="244665816"/>
+      </p:ext>
+    </p:extLst>
+  </p:cSld>
+  <p:clrMapOvr>
+    <a:masterClrMapping/>
+  </p:clrMapOvr>
+</p:notes>
+</file>
+
+<file path=ppt/notesSlides/notesSlide15.xml><?xml version="1.0" encoding="utf-8"?>
+<p:notes xmlns:a="http://schemas.openxmlformats.org/drawingml/2006/main" xmlns:r="http://schemas.openxmlformats.org/officeDocument/2006/relationships" xmlns:p="http://schemas.openxmlformats.org/presentationml/2006/main">
+  <p:cSld>
+    <p:spTree>
+      <p:nvGrpSpPr>
+        <p:cNvPr id="1" name=""/>
+        <p:cNvGrpSpPr/>
+        <p:nvPr/>
+      </p:nvGrpSpPr>
+      <p:grpSpPr>
+        <a:xfrm>
+          <a:off x="0" y="0"/>
+          <a:ext cx="0" cy="0"/>
+          <a:chOff x="0" y="0"/>
+          <a:chExt cx="0" cy="0"/>
+        </a:xfrm>
+      </p:grpSpPr>
+      <p:sp>
+        <p:nvSpPr>
+          <p:cNvPr id="2" name="Контейнер за изображение на слайда 1"/>
+          <p:cNvSpPr>
+            <a:spLocks noGrp="1" noRot="1" noChangeAspect="1"/>
+          </p:cNvSpPr>
+          <p:nvPr>
+            <p:ph type="sldImg"/>
+          </p:nvPr>
+        </p:nvSpPr>
+        <p:spPr/>
+      </p:sp>
+      <p:sp>
+        <p:nvSpPr>
+          <p:cNvPr id="3" name="Контейнер за бележки 2"/>
+          <p:cNvSpPr>
+            <a:spLocks noGrp="1"/>
+          </p:cNvSpPr>
+          <p:nvPr>
+            <p:ph type="body" idx="1"/>
+          </p:nvPr>
+        </p:nvSpPr>
+        <p:spPr/>
+        <p:txBody>
+          <a:bodyPr/>
+          <a:lstStyle/>
+          <a:p>
+            <a:endParaRPr lang="en-US" dirty="0"/>
+          </a:p>
+        </p:txBody>
+      </p:sp>
+      <p:sp>
+        <p:nvSpPr>
+          <p:cNvPr id="4" name="Контейнер за номер на слайда 3"/>
+          <p:cNvSpPr>
+            <a:spLocks noGrp="1"/>
+          </p:cNvSpPr>
+          <p:nvPr>
+            <p:ph type="sldNum" sz="quarter" idx="10"/>
+          </p:nvPr>
+        </p:nvSpPr>
+        <p:spPr/>
+        <p:txBody>
+          <a:bodyPr/>
+          <a:lstStyle/>
+          <a:p>
+            <a:fld id="{34DB9454-9595-409E-8BC5-8848C7CC2ACF}" type="slidenum">
+              <a:rPr lang="en-US" smtClean="0"/>
+              <a:t>19</a:t>
+            </a:fld>
+            <a:endParaRPr lang="en-US"/>
+          </a:p>
+        </p:txBody>
+      </p:sp>
+    </p:spTree>
+    <p:extLst>
+      <p:ext uri="{BB962C8B-B14F-4D97-AF65-F5344CB8AC3E}">
+        <p14:creationId xmlns:p14="http://schemas.microsoft.com/office/powerpoint/2010/main" val="4011043731"/>
+      </p:ext>
+    </p:extLst>
+  </p:cSld>
+  <p:clrMapOvr>
+    <a:masterClrMapping/>
+  </p:clrMapOvr>
+</p:notes>
+</file>
+
+<file path=ppt/notesSlides/notesSlide16.xml><?xml version="1.0" encoding="utf-8"?>
+<p:notes xmlns:a="http://schemas.openxmlformats.org/drawingml/2006/main" xmlns:r="http://schemas.openxmlformats.org/officeDocument/2006/relationships" xmlns:p="http://schemas.openxmlformats.org/presentationml/2006/main">
+  <p:cSld>
+    <p:spTree>
+      <p:nvGrpSpPr>
+        <p:cNvPr id="1" name=""/>
+        <p:cNvGrpSpPr/>
+        <p:nvPr/>
+      </p:nvGrpSpPr>
+      <p:grpSpPr>
+        <a:xfrm>
+          <a:off x="0" y="0"/>
+          <a:ext cx="0" cy="0"/>
+          <a:chOff x="0" y="0"/>
+          <a:chExt cx="0" cy="0"/>
+        </a:xfrm>
+      </p:grpSpPr>
+      <p:sp>
+        <p:nvSpPr>
+          <p:cNvPr id="2" name="Контейнер за изображение на слайда 1"/>
+          <p:cNvSpPr>
+            <a:spLocks noGrp="1" noRot="1" noChangeAspect="1"/>
+          </p:cNvSpPr>
+          <p:nvPr>
+            <p:ph type="sldImg"/>
+          </p:nvPr>
+        </p:nvSpPr>
+        <p:spPr/>
+      </p:sp>
+      <p:sp>
+        <p:nvSpPr>
+          <p:cNvPr id="3" name="Контейнер за бележки 2"/>
+          <p:cNvSpPr>
+            <a:spLocks noGrp="1"/>
+          </p:cNvSpPr>
+          <p:nvPr>
+            <p:ph type="body" idx="1"/>
+          </p:nvPr>
+        </p:nvSpPr>
+        <p:spPr/>
+        <p:txBody>
+          <a:bodyPr/>
+          <a:lstStyle/>
+          <a:p>
+            <a:endParaRPr lang="en-US" dirty="0"/>
+          </a:p>
+        </p:txBody>
+      </p:sp>
+      <p:sp>
+        <p:nvSpPr>
+          <p:cNvPr id="4" name="Контейнер за номер на слайда 3"/>
+          <p:cNvSpPr>
+            <a:spLocks noGrp="1"/>
+          </p:cNvSpPr>
+          <p:nvPr>
+            <p:ph type="sldNum" sz="quarter" idx="10"/>
+          </p:nvPr>
+        </p:nvSpPr>
+        <p:spPr/>
+        <p:txBody>
+          <a:bodyPr/>
+          <a:lstStyle/>
+          <a:p>
+            <a:fld id="{34DB9454-9595-409E-8BC5-8848C7CC2ACF}" type="slidenum">
+              <a:rPr lang="en-US" smtClean="0"/>
+              <a:t>20</a:t>
+            </a:fld>
+            <a:endParaRPr lang="en-US"/>
+          </a:p>
+        </p:txBody>
+      </p:sp>
+    </p:spTree>
+    <p:extLst>
+      <p:ext uri="{BB962C8B-B14F-4D97-AF65-F5344CB8AC3E}">
+        <p14:creationId xmlns:p14="http://schemas.microsoft.com/office/powerpoint/2010/main" val="3651891774"/>
+      </p:ext>
+    </p:extLst>
+  </p:cSld>
+  <p:clrMapOvr>
+    <a:masterClrMapping/>
+  </p:clrMapOvr>
+</p:notes>
+</file>
+
+<file path=ppt/notesSlides/notesSlide17.xml><?xml version="1.0" encoding="utf-8"?>
+<p:notes xmlns:a="http://schemas.openxmlformats.org/drawingml/2006/main" xmlns:r="http://schemas.openxmlformats.org/officeDocument/2006/relationships" xmlns:p="http://schemas.openxmlformats.org/presentationml/2006/main">
+  <p:cSld>
+    <p:spTree>
+      <p:nvGrpSpPr>
+        <p:cNvPr id="1" name=""/>
+        <p:cNvGrpSpPr/>
+        <p:nvPr/>
+      </p:nvGrpSpPr>
+      <p:grpSpPr>
+        <a:xfrm>
+          <a:off x="0" y="0"/>
+          <a:ext cx="0" cy="0"/>
+          <a:chOff x="0" y="0"/>
+          <a:chExt cx="0" cy="0"/>
+        </a:xfrm>
+      </p:grpSpPr>
+      <p:sp>
+        <p:nvSpPr>
+          <p:cNvPr id="2" name="Контейнер за изображение на слайда 1"/>
+          <p:cNvSpPr>
+            <a:spLocks noGrp="1" noRot="1" noChangeAspect="1"/>
+          </p:cNvSpPr>
+          <p:nvPr>
+            <p:ph type="sldImg"/>
+          </p:nvPr>
+        </p:nvSpPr>
+        <p:spPr/>
+      </p:sp>
+      <p:sp>
+        <p:nvSpPr>
+          <p:cNvPr id="3" name="Контейнер за бележки 2"/>
+          <p:cNvSpPr>
+            <a:spLocks noGrp="1"/>
+          </p:cNvSpPr>
+          <p:nvPr>
+            <p:ph type="body" idx="1"/>
+          </p:nvPr>
+        </p:nvSpPr>
+        <p:spPr/>
+        <p:txBody>
+          <a:bodyPr/>
+          <a:lstStyle/>
+          <a:p>
+            <a:endParaRPr lang="en-US" dirty="0"/>
+          </a:p>
+        </p:txBody>
+      </p:sp>
+      <p:sp>
+        <p:nvSpPr>
+          <p:cNvPr id="4" name="Контейнер за номер на слайда 3"/>
+          <p:cNvSpPr>
+            <a:spLocks noGrp="1"/>
+          </p:cNvSpPr>
+          <p:nvPr>
+            <p:ph type="sldNum" sz="quarter" idx="10"/>
+          </p:nvPr>
+        </p:nvSpPr>
+        <p:spPr/>
+        <p:txBody>
+          <a:bodyPr/>
+          <a:lstStyle/>
+          <a:p>
+            <a:fld id="{34DB9454-9595-409E-8BC5-8848C7CC2ACF}" type="slidenum">
+              <a:rPr lang="en-US" smtClean="0"/>
+              <a:t>21</a:t>
+            </a:fld>
+            <a:endParaRPr lang="en-US"/>
+          </a:p>
+        </p:txBody>
+      </p:sp>
+    </p:spTree>
+    <p:extLst>
+      <p:ext uri="{BB962C8B-B14F-4D97-AF65-F5344CB8AC3E}">
+        <p14:creationId xmlns:p14="http://schemas.microsoft.com/office/powerpoint/2010/main" val="3006008476"/>
+      </p:ext>
+    </p:extLst>
+  </p:cSld>
+  <p:clrMapOvr>
+    <a:masterClrMapping/>
+  </p:clrMapOvr>
+</p:notes>
+</file>
+
+<file path=ppt/notesSlides/notesSlide18.xml><?xml version="1.0" encoding="utf-8"?>
+<p:notes xmlns:a="http://schemas.openxmlformats.org/drawingml/2006/main" xmlns:r="http://schemas.openxmlformats.org/officeDocument/2006/relationships" xmlns:p="http://schemas.openxmlformats.org/presentationml/2006/main">
+  <p:cSld>
+    <p:spTree>
+      <p:nvGrpSpPr>
+        <p:cNvPr id="1" name=""/>
+        <p:cNvGrpSpPr/>
+        <p:nvPr/>
+      </p:nvGrpSpPr>
+      <p:grpSpPr>
+        <a:xfrm>
+          <a:off x="0" y="0"/>
+          <a:ext cx="0" cy="0"/>
+          <a:chOff x="0" y="0"/>
+          <a:chExt cx="0" cy="0"/>
+        </a:xfrm>
+      </p:grpSpPr>
+      <p:sp>
+        <p:nvSpPr>
+          <p:cNvPr id="2" name="Контейнер за изображение на слайда 1"/>
+          <p:cNvSpPr>
+            <a:spLocks noGrp="1" noRot="1" noChangeAspect="1"/>
+          </p:cNvSpPr>
+          <p:nvPr>
+            <p:ph type="sldImg"/>
+          </p:nvPr>
+        </p:nvSpPr>
+        <p:spPr/>
+      </p:sp>
+      <p:sp>
+        <p:nvSpPr>
+          <p:cNvPr id="3" name="Контейнер за бележки 2"/>
+          <p:cNvSpPr>
+            <a:spLocks noGrp="1"/>
+          </p:cNvSpPr>
+          <p:nvPr>
+            <p:ph type="body" idx="1"/>
+          </p:nvPr>
+        </p:nvSpPr>
+        <p:spPr/>
+        <p:txBody>
+          <a:bodyPr/>
+          <a:lstStyle/>
+          <a:p>
+            <a:endParaRPr lang="en-US" dirty="0"/>
+          </a:p>
+        </p:txBody>
+      </p:sp>
+      <p:sp>
+        <p:nvSpPr>
+          <p:cNvPr id="4" name="Контейнер за номер на слайда 3"/>
+          <p:cNvSpPr>
+            <a:spLocks noGrp="1"/>
+          </p:cNvSpPr>
+          <p:nvPr>
+            <p:ph type="sldNum" sz="quarter" idx="10"/>
+          </p:nvPr>
+        </p:nvSpPr>
+        <p:spPr/>
+        <p:txBody>
+          <a:bodyPr/>
+          <a:lstStyle/>
+          <a:p>
+            <a:fld id="{34DB9454-9595-409E-8BC5-8848C7CC2ACF}" type="slidenum">
+              <a:rPr lang="en-US" smtClean="0"/>
+              <a:t>22</a:t>
+            </a:fld>
+            <a:endParaRPr lang="en-US"/>
+          </a:p>
+        </p:txBody>
+      </p:sp>
+    </p:spTree>
+    <p:extLst>
+      <p:ext uri="{BB962C8B-B14F-4D97-AF65-F5344CB8AC3E}">
+        <p14:creationId xmlns:p14="http://schemas.microsoft.com/office/powerpoint/2010/main" val="2490846087"/>
       </p:ext>
     </p:extLst>
   </p:cSld>
@@ -2041,7 +2721,7 @@
             <a:fld id="{B61BEF0D-F0BB-DE4B-95CE-6DB70DBA9567}" type="datetimeFigureOut">
               <a:rPr lang="en-US" dirty="0"/>
               <a:pPr/>
-              <a:t>4/6/2016</a:t>
+              <a:t>08-Apr-16</a:t>
             </a:fld>
             <a:endParaRPr lang="en-US" dirty="0"/>
           </a:p>
@@ -2289,7 +2969,7 @@
             <a:fld id="{B61BEF0D-F0BB-DE4B-95CE-6DB70DBA9567}" type="datetimeFigureOut">
               <a:rPr lang="en-US" dirty="0"/>
               <a:pPr/>
-              <a:t>4/6/2016</a:t>
+              <a:t>08-Apr-16</a:t>
             </a:fld>
             <a:endParaRPr lang="en-US" dirty="0"/>
           </a:p>
@@ -2600,7 +3280,7 @@
             <a:fld id="{B61BEF0D-F0BB-DE4B-95CE-6DB70DBA9567}" type="datetimeFigureOut">
               <a:rPr lang="en-US" dirty="0"/>
               <a:pPr/>
-              <a:t>4/6/2016</a:t>
+              <a:t>08-Apr-16</a:t>
             </a:fld>
             <a:endParaRPr lang="en-US" dirty="0"/>
           </a:p>
@@ -2938,7 +3618,7 @@
             <a:fld id="{B61BEF0D-F0BB-DE4B-95CE-6DB70DBA9567}" type="datetimeFigureOut">
               <a:rPr lang="en-US" dirty="0"/>
               <a:pPr/>
-              <a:t>4/6/2016</a:t>
+              <a:t>08-Apr-16</a:t>
             </a:fld>
             <a:endParaRPr lang="en-US" dirty="0"/>
           </a:p>
@@ -3249,7 +3929,7 @@
             <a:fld id="{B61BEF0D-F0BB-DE4B-95CE-6DB70DBA9567}" type="datetimeFigureOut">
               <a:rPr lang="en-US" dirty="0"/>
               <a:pPr/>
-              <a:t>4/6/2016</a:t>
+              <a:t>08-Apr-16</a:t>
             </a:fld>
             <a:endParaRPr lang="en-US" dirty="0"/>
           </a:p>
@@ -3639,7 +4319,7 @@
             <a:fld id="{B61BEF0D-F0BB-DE4B-95CE-6DB70DBA9567}" type="datetimeFigureOut">
               <a:rPr lang="en-US" dirty="0"/>
               <a:pPr/>
-              <a:t>4/6/2016</a:t>
+              <a:t>08-Apr-16</a:t>
             </a:fld>
             <a:endParaRPr lang="en-US" dirty="0"/>
           </a:p>
@@ -3805,7 +4485,7 @@
           <a:p>
             <a:fld id="{55C6B4A9-1611-4792-9094-5F34BCA07E0B}" type="datetimeFigureOut">
               <a:rPr lang="en-US" dirty="0"/>
-              <a:t>4/6/2016</a:t>
+              <a:t>08-Apr-16</a:t>
             </a:fld>
             <a:endParaRPr lang="en-US" dirty="0"/>
           </a:p>
@@ -3981,7 +4661,7 @@
             <a:fld id="{B61BEF0D-F0BB-DE4B-95CE-6DB70DBA9567}" type="datetimeFigureOut">
               <a:rPr lang="en-US" dirty="0"/>
               <a:pPr/>
-              <a:t>4/6/2016</a:t>
+              <a:t>08-Apr-16</a:t>
             </a:fld>
             <a:endParaRPr lang="en-US" dirty="0"/>
           </a:p>
@@ -4154,7 +4834,7 @@
             <a:fld id="{B61BEF0D-F0BB-DE4B-95CE-6DB70DBA9567}" type="datetimeFigureOut">
               <a:rPr lang="en-US" dirty="0"/>
               <a:pPr/>
-              <a:t>4/6/2016</a:t>
+              <a:t>08-Apr-16</a:t>
             </a:fld>
             <a:endParaRPr lang="en-US" dirty="0"/>
           </a:p>
@@ -4398,7 +5078,7 @@
             <a:fld id="{B61BEF0D-F0BB-DE4B-95CE-6DB70DBA9567}" type="datetimeFigureOut">
               <a:rPr lang="en-US" dirty="0"/>
               <a:pPr/>
-              <a:t>4/6/2016</a:t>
+              <a:t>08-Apr-16</a:t>
             </a:fld>
             <a:endParaRPr lang="en-US" dirty="0"/>
           </a:p>
@@ -4626,7 +5306,7 @@
           <a:p>
             <a:fld id="{EB712588-04B1-427B-82EE-E8DB90309F08}" type="datetimeFigureOut">
               <a:rPr lang="en-US" dirty="0"/>
-              <a:t>4/6/2016</a:t>
+              <a:t>08-Apr-16</a:t>
             </a:fld>
             <a:endParaRPr lang="en-US" dirty="0"/>
           </a:p>
@@ -4996,7 +5676,7 @@
             <a:fld id="{B61BEF0D-F0BB-DE4B-95CE-6DB70DBA9567}" type="datetimeFigureOut">
               <a:rPr lang="en-US" dirty="0"/>
               <a:pPr/>
-              <a:t>4/6/2016</a:t>
+              <a:t>08-Apr-16</a:t>
             </a:fld>
             <a:endParaRPr lang="en-US" dirty="0"/>
           </a:p>
@@ -5116,7 +5796,7 @@
             <a:fld id="{B61BEF0D-F0BB-DE4B-95CE-6DB70DBA9567}" type="datetimeFigureOut">
               <a:rPr lang="en-US" dirty="0"/>
               <a:pPr/>
-              <a:t>4/6/2016</a:t>
+              <a:t>08-Apr-16</a:t>
             </a:fld>
             <a:endParaRPr lang="en-US" dirty="0"/>
           </a:p>
@@ -5208,7 +5888,7 @@
             <a:fld id="{B61BEF0D-F0BB-DE4B-95CE-6DB70DBA9567}" type="datetimeFigureOut">
               <a:rPr lang="en-US" dirty="0"/>
               <a:pPr/>
-              <a:t>4/6/2016</a:t>
+              <a:t>08-Apr-16</a:t>
             </a:fld>
             <a:endParaRPr lang="en-US" dirty="0"/>
           </a:p>
@@ -5459,7 +6139,7 @@
           <a:p>
             <a:fld id="{42A54C80-263E-416B-A8E0-580EDEADCBDC}" type="datetimeFigureOut">
               <a:rPr lang="en-US" dirty="0"/>
-              <a:t>4/6/2016</a:t>
+              <a:t>08-Apr-16</a:t>
             </a:fld>
             <a:endParaRPr lang="en-US" dirty="0"/>
           </a:p>
@@ -5718,7 +6398,7 @@
             <a:fld id="{B61BEF0D-F0BB-DE4B-95CE-6DB70DBA9567}" type="datetimeFigureOut">
               <a:rPr lang="en-US" dirty="0"/>
               <a:pPr/>
-              <a:t>4/6/2016</a:t>
+              <a:t>08-Apr-16</a:t>
             </a:fld>
             <a:endParaRPr lang="en-US" dirty="0"/>
           </a:p>
@@ -6458,7 +7138,7 @@
             <a:fld id="{B61BEF0D-F0BB-DE4B-95CE-6DB70DBA9567}" type="datetimeFigureOut">
               <a:rPr lang="en-US" dirty="0"/>
               <a:pPr/>
-              <a:t>4/6/2016</a:t>
+              <a:t>08-Apr-16</a:t>
             </a:fld>
             <a:endParaRPr lang="en-US" dirty="0"/>
           </a:p>
@@ -8660,6 +9340,1833 @@
   <p:clrMapOvr>
     <a:masterClrMapping/>
   </p:clrMapOvr>
+  <p:timing>
+    <p:tnLst>
+      <p:par>
+        <p:cTn id="1" dur="indefinite" restart="never" nodeType="tmRoot"/>
+      </p:par>
+    </p:tnLst>
+  </p:timing>
+</p:sld>
+</file>
+
+<file path=ppt/slides/slide15.xml><?xml version="1.0" encoding="utf-8"?>
+<p:sld xmlns:a="http://schemas.openxmlformats.org/drawingml/2006/main" xmlns:r="http://schemas.openxmlformats.org/officeDocument/2006/relationships" xmlns:p="http://schemas.openxmlformats.org/presentationml/2006/main">
+  <p:cSld>
+    <p:spTree>
+      <p:nvGrpSpPr>
+        <p:cNvPr id="1" name=""/>
+        <p:cNvGrpSpPr/>
+        <p:nvPr/>
+      </p:nvGrpSpPr>
+      <p:grpSpPr>
+        <a:xfrm>
+          <a:off x="0" y="0"/>
+          <a:ext cx="0" cy="0"/>
+          <a:chOff x="0" y="0"/>
+          <a:chExt cx="0" cy="0"/>
+        </a:xfrm>
+      </p:grpSpPr>
+      <p:sp>
+        <p:nvSpPr>
+          <p:cNvPr id="4" name="Title 1"/>
+          <p:cNvSpPr txBox="1">
+            <a:spLocks/>
+          </p:cNvSpPr>
+          <p:nvPr/>
+        </p:nvSpPr>
+        <p:spPr>
+          <a:xfrm>
+            <a:off x="640413" y="399245"/>
+            <a:ext cx="5987914" cy="1047481"/>
+          </a:xfrm>
+          <a:prstGeom prst="rect">
+            <a:avLst/>
+          </a:prstGeom>
+        </p:spPr>
+        <p:txBody>
+          <a:bodyPr vert="horz" lIns="91440" tIns="45720" rIns="91440" bIns="45720" rtlCol="0" anchor="t">
+            <a:normAutofit/>
+          </a:bodyPr>
+          <a:lstStyle>
+            <a:lvl1pPr algn="l" defTabSz="457200" rtl="0" eaLnBrk="1" latinLnBrk="0" hangingPunct="1">
+              <a:spcBef>
+                <a:spcPct val="0"/>
+              </a:spcBef>
+              <a:buNone/>
+              <a:defRPr sz="3600" kern="1200">
+                <a:solidFill>
+                  <a:schemeClr val="accent1"/>
+                </a:solidFill>
+                <a:latin typeface="+mj-lt"/>
+                <a:ea typeface="+mj-ea"/>
+                <a:cs typeface="+mj-cs"/>
+              </a:defRPr>
+            </a:lvl1pPr>
+            <a:lvl2pPr eaLnBrk="1" hangingPunct="1">
+              <a:defRPr>
+                <a:solidFill>
+                  <a:schemeClr val="tx2"/>
+                </a:solidFill>
+              </a:defRPr>
+            </a:lvl2pPr>
+            <a:lvl3pPr eaLnBrk="1" hangingPunct="1">
+              <a:defRPr>
+                <a:solidFill>
+                  <a:schemeClr val="tx2"/>
+                </a:solidFill>
+              </a:defRPr>
+            </a:lvl3pPr>
+            <a:lvl4pPr eaLnBrk="1" hangingPunct="1">
+              <a:defRPr>
+                <a:solidFill>
+                  <a:schemeClr val="tx2"/>
+                </a:solidFill>
+              </a:defRPr>
+            </a:lvl4pPr>
+            <a:lvl5pPr eaLnBrk="1" hangingPunct="1">
+              <a:defRPr>
+                <a:solidFill>
+                  <a:schemeClr val="tx2"/>
+                </a:solidFill>
+              </a:defRPr>
+            </a:lvl5pPr>
+            <a:lvl6pPr eaLnBrk="1" hangingPunct="1">
+              <a:defRPr>
+                <a:solidFill>
+                  <a:schemeClr val="tx2"/>
+                </a:solidFill>
+              </a:defRPr>
+            </a:lvl6pPr>
+            <a:lvl7pPr eaLnBrk="1" hangingPunct="1">
+              <a:defRPr>
+                <a:solidFill>
+                  <a:schemeClr val="tx2"/>
+                </a:solidFill>
+              </a:defRPr>
+            </a:lvl7pPr>
+            <a:lvl8pPr eaLnBrk="1" hangingPunct="1">
+              <a:defRPr>
+                <a:solidFill>
+                  <a:schemeClr val="tx2"/>
+                </a:solidFill>
+              </a:defRPr>
+            </a:lvl8pPr>
+            <a:lvl9pPr eaLnBrk="1" hangingPunct="1">
+              <a:defRPr>
+                <a:solidFill>
+                  <a:schemeClr val="tx2"/>
+                </a:solidFill>
+              </a:defRPr>
+            </a:lvl9pPr>
+          </a:lstStyle>
+          <a:p>
+            <a:r>
+              <a:rPr lang="en-US" dirty="0" smtClean="0"/>
+              <a:t>Deployment models</a:t>
+            </a:r>
+            <a:endParaRPr lang="bg-BG" dirty="0"/>
+          </a:p>
+        </p:txBody>
+      </p:sp>
+      <p:pic>
+        <p:nvPicPr>
+          <p:cNvPr id="2" name="Картина 1"/>
+          <p:cNvPicPr>
+            <a:picLocks noChangeAspect="1"/>
+          </p:cNvPicPr>
+          <p:nvPr/>
+        </p:nvPicPr>
+        <p:blipFill>
+          <a:blip r:embed="rId3">
+            <a:extLst>
+              <a:ext uri="{28A0092B-C50C-407E-A947-70E740481C1C}">
+                <a14:useLocalDpi xmlns:a14="http://schemas.microsoft.com/office/drawing/2010/main" val="0"/>
+              </a:ext>
+            </a:extLst>
+          </a:blip>
+          <a:stretch>
+            <a:fillRect/>
+          </a:stretch>
+        </p:blipFill>
+        <p:spPr>
+          <a:xfrm>
+            <a:off x="464126" y="1830704"/>
+            <a:ext cx="9137075" cy="2941321"/>
+          </a:xfrm>
+          <a:prstGeom prst="rect">
+            <a:avLst/>
+          </a:prstGeom>
+        </p:spPr>
+      </p:pic>
+    </p:spTree>
+    <p:extLst>
+      <p:ext uri="{BB962C8B-B14F-4D97-AF65-F5344CB8AC3E}">
+        <p14:creationId xmlns:p14="http://schemas.microsoft.com/office/powerpoint/2010/main" val="3621995970"/>
+      </p:ext>
+    </p:extLst>
+  </p:cSld>
+  <p:clrMapOvr>
+    <a:masterClrMapping/>
+  </p:clrMapOvr>
+  <p:timing>
+    <p:tnLst>
+      <p:par>
+        <p:cTn id="1" dur="indefinite" restart="never" nodeType="tmRoot"/>
+      </p:par>
+    </p:tnLst>
+  </p:timing>
+</p:sld>
+</file>
+
+<file path=ppt/slides/slide16.xml><?xml version="1.0" encoding="utf-8"?>
+<p:sld xmlns:a="http://schemas.openxmlformats.org/drawingml/2006/main" xmlns:r="http://schemas.openxmlformats.org/officeDocument/2006/relationships" xmlns:p="http://schemas.openxmlformats.org/presentationml/2006/main">
+  <p:cSld>
+    <p:spTree>
+      <p:nvGrpSpPr>
+        <p:cNvPr id="1" name=""/>
+        <p:cNvGrpSpPr/>
+        <p:nvPr/>
+      </p:nvGrpSpPr>
+      <p:grpSpPr>
+        <a:xfrm>
+          <a:off x="0" y="0"/>
+          <a:ext cx="0" cy="0"/>
+          <a:chOff x="0" y="0"/>
+          <a:chExt cx="0" cy="0"/>
+        </a:xfrm>
+      </p:grpSpPr>
+      <p:sp>
+        <p:nvSpPr>
+          <p:cNvPr id="4" name="Title 1"/>
+          <p:cNvSpPr txBox="1">
+            <a:spLocks/>
+          </p:cNvSpPr>
+          <p:nvPr/>
+        </p:nvSpPr>
+        <p:spPr>
+          <a:xfrm>
+            <a:off x="640413" y="399245"/>
+            <a:ext cx="5987914" cy="1047481"/>
+          </a:xfrm>
+          <a:prstGeom prst="rect">
+            <a:avLst/>
+          </a:prstGeom>
+        </p:spPr>
+        <p:txBody>
+          <a:bodyPr vert="horz" lIns="91440" tIns="45720" rIns="91440" bIns="45720" rtlCol="0" anchor="t">
+            <a:normAutofit/>
+          </a:bodyPr>
+          <a:lstStyle>
+            <a:lvl1pPr algn="l" defTabSz="457200" rtl="0" eaLnBrk="1" latinLnBrk="0" hangingPunct="1">
+              <a:spcBef>
+                <a:spcPct val="0"/>
+              </a:spcBef>
+              <a:buNone/>
+              <a:defRPr sz="3600" kern="1200">
+                <a:solidFill>
+                  <a:schemeClr val="accent1"/>
+                </a:solidFill>
+                <a:latin typeface="+mj-lt"/>
+                <a:ea typeface="+mj-ea"/>
+                <a:cs typeface="+mj-cs"/>
+              </a:defRPr>
+            </a:lvl1pPr>
+            <a:lvl2pPr eaLnBrk="1" hangingPunct="1">
+              <a:defRPr>
+                <a:solidFill>
+                  <a:schemeClr val="tx2"/>
+                </a:solidFill>
+              </a:defRPr>
+            </a:lvl2pPr>
+            <a:lvl3pPr eaLnBrk="1" hangingPunct="1">
+              <a:defRPr>
+                <a:solidFill>
+                  <a:schemeClr val="tx2"/>
+                </a:solidFill>
+              </a:defRPr>
+            </a:lvl3pPr>
+            <a:lvl4pPr eaLnBrk="1" hangingPunct="1">
+              <a:defRPr>
+                <a:solidFill>
+                  <a:schemeClr val="tx2"/>
+                </a:solidFill>
+              </a:defRPr>
+            </a:lvl4pPr>
+            <a:lvl5pPr eaLnBrk="1" hangingPunct="1">
+              <a:defRPr>
+                <a:solidFill>
+                  <a:schemeClr val="tx2"/>
+                </a:solidFill>
+              </a:defRPr>
+            </a:lvl5pPr>
+            <a:lvl6pPr eaLnBrk="1" hangingPunct="1">
+              <a:defRPr>
+                <a:solidFill>
+                  <a:schemeClr val="tx2"/>
+                </a:solidFill>
+              </a:defRPr>
+            </a:lvl6pPr>
+            <a:lvl7pPr eaLnBrk="1" hangingPunct="1">
+              <a:defRPr>
+                <a:solidFill>
+                  <a:schemeClr val="tx2"/>
+                </a:solidFill>
+              </a:defRPr>
+            </a:lvl7pPr>
+            <a:lvl8pPr eaLnBrk="1" hangingPunct="1">
+              <a:defRPr>
+                <a:solidFill>
+                  <a:schemeClr val="tx2"/>
+                </a:solidFill>
+              </a:defRPr>
+            </a:lvl8pPr>
+            <a:lvl9pPr eaLnBrk="1" hangingPunct="1">
+              <a:defRPr>
+                <a:solidFill>
+                  <a:schemeClr val="tx2"/>
+                </a:solidFill>
+              </a:defRPr>
+            </a:lvl9pPr>
+          </a:lstStyle>
+          <a:p>
+            <a:r>
+              <a:rPr lang="bg-BG" dirty="0" smtClean="0"/>
+              <a:t>Частен </a:t>
+            </a:r>
+            <a:r>
+              <a:rPr lang="en-US" dirty="0" smtClean="0"/>
+              <a:t>cloud</a:t>
+            </a:r>
+            <a:endParaRPr lang="bg-BG" dirty="0"/>
+          </a:p>
+        </p:txBody>
+      </p:sp>
+      <p:sp>
+        <p:nvSpPr>
+          <p:cNvPr id="5" name="Текстово поле 4"/>
+          <p:cNvSpPr txBox="1"/>
+          <p:nvPr/>
+        </p:nvSpPr>
+        <p:spPr>
+          <a:xfrm>
+            <a:off x="640410" y="1476712"/>
+            <a:ext cx="9646590" cy="3929281"/>
+          </a:xfrm>
+          <a:prstGeom prst="rect">
+            <a:avLst/>
+          </a:prstGeom>
+          <a:noFill/>
+        </p:spPr>
+        <p:txBody>
+          <a:bodyPr wrap="square" rtlCol="0">
+            <a:spAutoFit/>
+          </a:bodyPr>
+          <a:lstStyle/>
+          <a:p>
+            <a:r>
+              <a:rPr lang="bg-BG" sz="2400" dirty="0">
+                <a:solidFill>
+                  <a:schemeClr val="tx1">
+                    <a:lumMod val="75000"/>
+                    <a:lumOff val="25000"/>
+                  </a:schemeClr>
+                </a:solidFill>
+              </a:rPr>
+              <a:t>Основни </a:t>
+            </a:r>
+            <a:r>
+              <a:rPr lang="bg-BG" sz="2400" dirty="0" smtClean="0">
+                <a:solidFill>
+                  <a:schemeClr val="tx1">
+                    <a:lumMod val="75000"/>
+                    <a:lumOff val="25000"/>
+                  </a:schemeClr>
+                </a:solidFill>
+              </a:rPr>
+              <a:t>свойства</a:t>
+            </a:r>
+            <a:r>
+              <a:rPr lang="en-US" sz="2400" dirty="0" smtClean="0">
+                <a:solidFill>
+                  <a:schemeClr val="tx1">
+                    <a:lumMod val="75000"/>
+                    <a:lumOff val="25000"/>
+                  </a:schemeClr>
+                </a:solidFill>
+              </a:rPr>
+              <a:t> </a:t>
+            </a:r>
+            <a:r>
+              <a:rPr lang="bg-BG" sz="2400" dirty="0" smtClean="0">
+                <a:solidFill>
+                  <a:schemeClr val="tx1">
+                    <a:lumMod val="75000"/>
+                    <a:lumOff val="25000"/>
+                  </a:schemeClr>
+                </a:solidFill>
+              </a:rPr>
+              <a:t>на частния </a:t>
+            </a:r>
+            <a:r>
+              <a:rPr lang="en-US" sz="2400" dirty="0" smtClean="0">
+                <a:solidFill>
+                  <a:schemeClr val="tx1">
+                    <a:lumMod val="75000"/>
+                    <a:lumOff val="25000"/>
+                  </a:schemeClr>
+                </a:solidFill>
+              </a:rPr>
+              <a:t>cloud</a:t>
+            </a:r>
+            <a:r>
+              <a:rPr lang="bg-BG" sz="2400" dirty="0" smtClean="0">
+                <a:solidFill>
+                  <a:schemeClr val="tx1">
+                    <a:lumMod val="75000"/>
+                    <a:lumOff val="25000"/>
+                  </a:schemeClr>
+                </a:solidFill>
+              </a:rPr>
+              <a:t>:</a:t>
+            </a:r>
+            <a:endParaRPr lang="en-US" sz="2400" dirty="0" smtClean="0">
+              <a:solidFill>
+                <a:schemeClr val="tx1">
+                  <a:lumMod val="75000"/>
+                  <a:lumOff val="25000"/>
+                </a:schemeClr>
+              </a:solidFill>
+            </a:endParaRPr>
+          </a:p>
+          <a:p>
+            <a:pPr marL="854075" lvl="1" indent="-396875">
+              <a:spcBef>
+                <a:spcPts val="1000"/>
+              </a:spcBef>
+              <a:buClr>
+                <a:schemeClr val="accent1"/>
+              </a:buClr>
+              <a:buSzPct val="80000"/>
+              <a:buFont typeface="Wingdings 3" charset="2"/>
+              <a:buChar char=""/>
+              <a:tabLst>
+                <a:tab pos="0" algn="l"/>
+              </a:tabLst>
+            </a:pPr>
+            <a:r>
+              <a:rPr lang="bg-BG" sz="2400" dirty="0" smtClean="0">
+                <a:solidFill>
+                  <a:schemeClr val="tx1">
+                    <a:lumMod val="75000"/>
+                    <a:lumOff val="25000"/>
+                  </a:schemeClr>
+                </a:solidFill>
+              </a:rPr>
+              <a:t>Предоставя възможност за доставка на целия </a:t>
+            </a:r>
+            <a:r>
+              <a:rPr lang="en-US" sz="2400" dirty="0" smtClean="0">
+                <a:solidFill>
+                  <a:schemeClr val="tx1">
+                    <a:lumMod val="75000"/>
+                    <a:lumOff val="25000"/>
+                  </a:schemeClr>
+                </a:solidFill>
+              </a:rPr>
+              <a:t>cloud </a:t>
+            </a:r>
+            <a:r>
+              <a:rPr lang="bg-BG" sz="2400" dirty="0" smtClean="0">
+                <a:solidFill>
+                  <a:schemeClr val="tx1">
+                    <a:lumMod val="75000"/>
+                    <a:lumOff val="25000"/>
+                  </a:schemeClr>
+                </a:solidFill>
+              </a:rPr>
+              <a:t>като един </a:t>
+            </a:r>
+            <a:r>
+              <a:rPr lang="en-US" sz="2400" dirty="0" smtClean="0">
+                <a:solidFill>
+                  <a:schemeClr val="tx1">
+                    <a:lumMod val="75000"/>
+                    <a:lumOff val="25000"/>
+                  </a:schemeClr>
+                </a:solidFill>
+              </a:rPr>
+              <a:t>service</a:t>
+            </a:r>
+            <a:endParaRPr lang="bg-BG" sz="2400" dirty="0">
+              <a:solidFill>
+                <a:schemeClr val="tx1">
+                  <a:lumMod val="75000"/>
+                  <a:lumOff val="25000"/>
+                </a:schemeClr>
+              </a:solidFill>
+            </a:endParaRPr>
+          </a:p>
+          <a:p>
+            <a:pPr marL="854075" lvl="1" indent="-396875">
+              <a:spcBef>
+                <a:spcPts val="1000"/>
+              </a:spcBef>
+              <a:buClr>
+                <a:schemeClr val="accent1"/>
+              </a:buClr>
+              <a:buSzPct val="80000"/>
+              <a:buFont typeface="Wingdings 3" charset="2"/>
+              <a:buChar char=""/>
+              <a:tabLst>
+                <a:tab pos="0" algn="l"/>
+              </a:tabLst>
+            </a:pPr>
+            <a:r>
+              <a:rPr lang="bg-BG" sz="2400" dirty="0" smtClean="0">
+                <a:solidFill>
+                  <a:schemeClr val="tx1">
+                    <a:lumMod val="75000"/>
+                    <a:lumOff val="25000"/>
+                  </a:schemeClr>
+                </a:solidFill>
+              </a:rPr>
+              <a:t>Разделен е на отделни организации, които се грижат за доставката на ресурси</a:t>
+            </a:r>
+            <a:endParaRPr lang="bg-BG" sz="2400" dirty="0" smtClean="0">
+              <a:solidFill>
+                <a:schemeClr val="tx1">
+                  <a:lumMod val="75000"/>
+                  <a:lumOff val="25000"/>
+                </a:schemeClr>
+              </a:solidFill>
+            </a:endParaRPr>
+          </a:p>
+          <a:p>
+            <a:pPr marL="854075" lvl="1" indent="-396875">
+              <a:spcBef>
+                <a:spcPts val="1000"/>
+              </a:spcBef>
+              <a:buClr>
+                <a:schemeClr val="accent1"/>
+              </a:buClr>
+              <a:buSzPct val="80000"/>
+              <a:buFont typeface="Wingdings 3" charset="2"/>
+              <a:buChar char=""/>
+              <a:tabLst>
+                <a:tab pos="0" algn="l"/>
+              </a:tabLst>
+            </a:pPr>
+            <a:r>
+              <a:rPr lang="bg-BG" sz="2400" dirty="0" smtClean="0">
+                <a:solidFill>
+                  <a:schemeClr val="tx1">
+                    <a:lumMod val="75000"/>
+                    <a:lumOff val="25000"/>
+                  </a:schemeClr>
+                </a:solidFill>
+              </a:rPr>
+              <a:t>Дадена организация има достъп само и единствено до определени ресурси</a:t>
+            </a:r>
+            <a:endParaRPr lang="bg-BG" sz="2400" dirty="0">
+              <a:solidFill>
+                <a:schemeClr val="tx1">
+                  <a:lumMod val="75000"/>
+                  <a:lumOff val="25000"/>
+                </a:schemeClr>
+              </a:solidFill>
+            </a:endParaRPr>
+          </a:p>
+          <a:p>
+            <a:pPr marL="854075" lvl="1" indent="-396875">
+              <a:spcBef>
+                <a:spcPts val="1000"/>
+              </a:spcBef>
+              <a:buClr>
+                <a:schemeClr val="accent1"/>
+              </a:buClr>
+              <a:buSzPct val="80000"/>
+              <a:buFont typeface="Wingdings 3" charset="2"/>
+              <a:buChar char=""/>
+              <a:tabLst>
+                <a:tab pos="0" algn="l"/>
+              </a:tabLst>
+            </a:pPr>
+            <a:r>
+              <a:rPr lang="bg-BG" sz="2400" dirty="0" smtClean="0">
+                <a:solidFill>
+                  <a:schemeClr val="tx1">
+                    <a:lumMod val="75000"/>
+                    <a:lumOff val="25000"/>
+                  </a:schemeClr>
+                </a:solidFill>
+              </a:rPr>
+              <a:t>Идеален за бизнеса, тъй като позволява съхранението на частни данни</a:t>
+            </a:r>
+            <a:endParaRPr lang="bg-BG" sz="2400" dirty="0">
+              <a:solidFill>
+                <a:schemeClr val="tx1">
+                  <a:lumMod val="75000"/>
+                  <a:lumOff val="25000"/>
+                </a:schemeClr>
+              </a:solidFill>
+            </a:endParaRPr>
+          </a:p>
+        </p:txBody>
+      </p:sp>
+    </p:spTree>
+    <p:extLst>
+      <p:ext uri="{BB962C8B-B14F-4D97-AF65-F5344CB8AC3E}">
+        <p14:creationId xmlns:p14="http://schemas.microsoft.com/office/powerpoint/2010/main" val="3446053629"/>
+      </p:ext>
+    </p:extLst>
+  </p:cSld>
+  <p:clrMapOvr>
+    <a:masterClrMapping/>
+  </p:clrMapOvr>
+  <p:timing>
+    <p:tnLst>
+      <p:par>
+        <p:cTn id="1" dur="indefinite" restart="never" nodeType="tmRoot"/>
+      </p:par>
+    </p:tnLst>
+  </p:timing>
+</p:sld>
+</file>
+
+<file path=ppt/slides/slide17.xml><?xml version="1.0" encoding="utf-8"?>
+<p:sld xmlns:a="http://schemas.openxmlformats.org/drawingml/2006/main" xmlns:r="http://schemas.openxmlformats.org/officeDocument/2006/relationships" xmlns:p="http://schemas.openxmlformats.org/presentationml/2006/main">
+  <p:cSld>
+    <p:spTree>
+      <p:nvGrpSpPr>
+        <p:cNvPr id="1" name=""/>
+        <p:cNvGrpSpPr/>
+        <p:nvPr/>
+      </p:nvGrpSpPr>
+      <p:grpSpPr>
+        <a:xfrm>
+          <a:off x="0" y="0"/>
+          <a:ext cx="0" cy="0"/>
+          <a:chOff x="0" y="0"/>
+          <a:chExt cx="0" cy="0"/>
+        </a:xfrm>
+      </p:grpSpPr>
+      <p:sp>
+        <p:nvSpPr>
+          <p:cNvPr id="4" name="Title 1"/>
+          <p:cNvSpPr txBox="1">
+            <a:spLocks/>
+          </p:cNvSpPr>
+          <p:nvPr/>
+        </p:nvSpPr>
+        <p:spPr>
+          <a:xfrm>
+            <a:off x="640413" y="399245"/>
+            <a:ext cx="5987914" cy="1047481"/>
+          </a:xfrm>
+          <a:prstGeom prst="rect">
+            <a:avLst/>
+          </a:prstGeom>
+        </p:spPr>
+        <p:txBody>
+          <a:bodyPr vert="horz" lIns="91440" tIns="45720" rIns="91440" bIns="45720" rtlCol="0" anchor="t">
+            <a:normAutofit/>
+          </a:bodyPr>
+          <a:lstStyle>
+            <a:lvl1pPr algn="l" defTabSz="457200" rtl="0" eaLnBrk="1" latinLnBrk="0" hangingPunct="1">
+              <a:spcBef>
+                <a:spcPct val="0"/>
+              </a:spcBef>
+              <a:buNone/>
+              <a:defRPr sz="3600" kern="1200">
+                <a:solidFill>
+                  <a:schemeClr val="accent1"/>
+                </a:solidFill>
+                <a:latin typeface="+mj-lt"/>
+                <a:ea typeface="+mj-ea"/>
+                <a:cs typeface="+mj-cs"/>
+              </a:defRPr>
+            </a:lvl1pPr>
+            <a:lvl2pPr eaLnBrk="1" hangingPunct="1">
+              <a:defRPr>
+                <a:solidFill>
+                  <a:schemeClr val="tx2"/>
+                </a:solidFill>
+              </a:defRPr>
+            </a:lvl2pPr>
+            <a:lvl3pPr eaLnBrk="1" hangingPunct="1">
+              <a:defRPr>
+                <a:solidFill>
+                  <a:schemeClr val="tx2"/>
+                </a:solidFill>
+              </a:defRPr>
+            </a:lvl3pPr>
+            <a:lvl4pPr eaLnBrk="1" hangingPunct="1">
+              <a:defRPr>
+                <a:solidFill>
+                  <a:schemeClr val="tx2"/>
+                </a:solidFill>
+              </a:defRPr>
+            </a:lvl4pPr>
+            <a:lvl5pPr eaLnBrk="1" hangingPunct="1">
+              <a:defRPr>
+                <a:solidFill>
+                  <a:schemeClr val="tx2"/>
+                </a:solidFill>
+              </a:defRPr>
+            </a:lvl5pPr>
+            <a:lvl6pPr eaLnBrk="1" hangingPunct="1">
+              <a:defRPr>
+                <a:solidFill>
+                  <a:schemeClr val="tx2"/>
+                </a:solidFill>
+              </a:defRPr>
+            </a:lvl6pPr>
+            <a:lvl7pPr eaLnBrk="1" hangingPunct="1">
+              <a:defRPr>
+                <a:solidFill>
+                  <a:schemeClr val="tx2"/>
+                </a:solidFill>
+              </a:defRPr>
+            </a:lvl7pPr>
+            <a:lvl8pPr eaLnBrk="1" hangingPunct="1">
+              <a:defRPr>
+                <a:solidFill>
+                  <a:schemeClr val="tx2"/>
+                </a:solidFill>
+              </a:defRPr>
+            </a:lvl8pPr>
+            <a:lvl9pPr eaLnBrk="1" hangingPunct="1">
+              <a:defRPr>
+                <a:solidFill>
+                  <a:schemeClr val="tx2"/>
+                </a:solidFill>
+              </a:defRPr>
+            </a:lvl9pPr>
+          </a:lstStyle>
+          <a:p>
+            <a:r>
+              <a:rPr lang="bg-BG" dirty="0" smtClean="0"/>
+              <a:t>Частен </a:t>
+            </a:r>
+            <a:r>
+              <a:rPr lang="en-US" dirty="0" smtClean="0"/>
+              <a:t>cloud</a:t>
+            </a:r>
+            <a:endParaRPr lang="bg-BG" dirty="0"/>
+          </a:p>
+        </p:txBody>
+      </p:sp>
+      <p:sp>
+        <p:nvSpPr>
+          <p:cNvPr id="5" name="Текстово поле 4"/>
+          <p:cNvSpPr txBox="1"/>
+          <p:nvPr/>
+        </p:nvSpPr>
+        <p:spPr>
+          <a:xfrm>
+            <a:off x="640410" y="1119520"/>
+            <a:ext cx="9646590" cy="2949525"/>
+          </a:xfrm>
+          <a:prstGeom prst="rect">
+            <a:avLst/>
+          </a:prstGeom>
+          <a:noFill/>
+        </p:spPr>
+        <p:txBody>
+          <a:bodyPr wrap="square" rtlCol="0">
+            <a:spAutoFit/>
+          </a:bodyPr>
+          <a:lstStyle/>
+          <a:p>
+            <a:r>
+              <a:rPr lang="bg-BG" sz="2400" dirty="0" smtClean="0">
+                <a:solidFill>
+                  <a:schemeClr val="tx1">
+                    <a:lumMod val="75000"/>
+                    <a:lumOff val="25000"/>
+                  </a:schemeClr>
+                </a:solidFill>
+              </a:rPr>
+              <a:t>Предимства на</a:t>
+            </a:r>
+            <a:r>
+              <a:rPr lang="en-US" sz="2400" dirty="0" smtClean="0">
+                <a:solidFill>
+                  <a:schemeClr val="tx1">
+                    <a:lumMod val="75000"/>
+                    <a:lumOff val="25000"/>
+                  </a:schemeClr>
+                </a:solidFill>
+              </a:rPr>
+              <a:t> </a:t>
+            </a:r>
+            <a:r>
+              <a:rPr lang="bg-BG" sz="2400" dirty="0" smtClean="0">
+                <a:solidFill>
+                  <a:schemeClr val="tx1">
+                    <a:lumMod val="75000"/>
+                    <a:lumOff val="25000"/>
+                  </a:schemeClr>
+                </a:solidFill>
+              </a:rPr>
+              <a:t>частния </a:t>
+            </a:r>
+            <a:r>
+              <a:rPr lang="en-US" sz="2400" dirty="0" smtClean="0">
+                <a:solidFill>
+                  <a:schemeClr val="tx1">
+                    <a:lumMod val="75000"/>
+                    <a:lumOff val="25000"/>
+                  </a:schemeClr>
+                </a:solidFill>
+              </a:rPr>
+              <a:t>cloud</a:t>
+            </a:r>
+            <a:r>
+              <a:rPr lang="bg-BG" sz="2400" dirty="0" smtClean="0">
+                <a:solidFill>
+                  <a:schemeClr val="tx1">
+                    <a:lumMod val="75000"/>
+                    <a:lumOff val="25000"/>
+                  </a:schemeClr>
+                </a:solidFill>
+              </a:rPr>
+              <a:t>:</a:t>
+            </a:r>
+            <a:endParaRPr lang="en-US" sz="2400" dirty="0" smtClean="0">
+              <a:solidFill>
+                <a:schemeClr val="tx1">
+                  <a:lumMod val="75000"/>
+                  <a:lumOff val="25000"/>
+                </a:schemeClr>
+              </a:solidFill>
+            </a:endParaRPr>
+          </a:p>
+          <a:p>
+            <a:pPr marL="854075" lvl="1" indent="-396875">
+              <a:spcBef>
+                <a:spcPts val="1000"/>
+              </a:spcBef>
+              <a:buClr>
+                <a:schemeClr val="accent1"/>
+              </a:buClr>
+              <a:buSzPct val="80000"/>
+              <a:buFont typeface="Wingdings 3" charset="2"/>
+              <a:buChar char=""/>
+              <a:tabLst>
+                <a:tab pos="0" algn="l"/>
+              </a:tabLst>
+            </a:pPr>
+            <a:r>
+              <a:rPr lang="bg-BG" sz="2400" dirty="0" smtClean="0">
+                <a:solidFill>
+                  <a:schemeClr val="tx1">
+                    <a:lumMod val="75000"/>
+                    <a:lumOff val="25000"/>
+                  </a:schemeClr>
+                </a:solidFill>
+              </a:rPr>
+              <a:t>Висока сигурност и защита на лични данни</a:t>
+            </a:r>
+          </a:p>
+          <a:p>
+            <a:pPr marL="854075" lvl="1" indent="-396875">
+              <a:spcBef>
+                <a:spcPts val="1000"/>
+              </a:spcBef>
+              <a:buClr>
+                <a:schemeClr val="accent1"/>
+              </a:buClr>
+              <a:buSzPct val="80000"/>
+              <a:buFont typeface="Wingdings 3" charset="2"/>
+              <a:buChar char=""/>
+              <a:tabLst>
+                <a:tab pos="0" algn="l"/>
+              </a:tabLst>
+            </a:pPr>
+            <a:r>
+              <a:rPr lang="bg-BG" sz="2400" dirty="0" smtClean="0">
+                <a:solidFill>
+                  <a:schemeClr val="tx1">
+                    <a:lumMod val="75000"/>
+                    <a:lumOff val="25000"/>
+                  </a:schemeClr>
+                </a:solidFill>
+              </a:rPr>
+              <a:t>По-голям контрол</a:t>
+            </a:r>
+            <a:endParaRPr lang="bg-BG" sz="2400" dirty="0" smtClean="0">
+              <a:solidFill>
+                <a:schemeClr val="tx1">
+                  <a:lumMod val="75000"/>
+                  <a:lumOff val="25000"/>
+                </a:schemeClr>
+              </a:solidFill>
+            </a:endParaRPr>
+          </a:p>
+          <a:p>
+            <a:pPr marL="854075" lvl="1" indent="-396875">
+              <a:spcBef>
+                <a:spcPts val="1000"/>
+              </a:spcBef>
+              <a:buClr>
+                <a:schemeClr val="accent1"/>
+              </a:buClr>
+              <a:buSzPct val="80000"/>
+              <a:buFont typeface="Wingdings 3" charset="2"/>
+              <a:buChar char=""/>
+              <a:tabLst>
+                <a:tab pos="0" algn="l"/>
+              </a:tabLst>
+            </a:pPr>
+            <a:r>
+              <a:rPr lang="bg-BG" sz="2400" dirty="0" smtClean="0">
+                <a:solidFill>
+                  <a:schemeClr val="tx1">
+                    <a:lumMod val="75000"/>
+                    <a:lumOff val="25000"/>
+                  </a:schemeClr>
+                </a:solidFill>
+              </a:rPr>
+              <a:t>По-евтино</a:t>
+            </a:r>
+            <a:endParaRPr lang="bg-BG" sz="2400" dirty="0">
+              <a:solidFill>
+                <a:schemeClr val="tx1">
+                  <a:lumMod val="75000"/>
+                  <a:lumOff val="25000"/>
+                </a:schemeClr>
+              </a:solidFill>
+            </a:endParaRPr>
+          </a:p>
+          <a:p>
+            <a:pPr marL="854075" lvl="1" indent="-396875">
+              <a:spcBef>
+                <a:spcPts val="1000"/>
+              </a:spcBef>
+              <a:buClr>
+                <a:schemeClr val="accent1"/>
+              </a:buClr>
+              <a:buSzPct val="80000"/>
+              <a:buFont typeface="Wingdings 3" charset="2"/>
+              <a:buChar char=""/>
+              <a:tabLst>
+                <a:tab pos="0" algn="l"/>
+              </a:tabLst>
+            </a:pPr>
+            <a:r>
+              <a:rPr lang="bg-BG" sz="2400" dirty="0" smtClean="0">
+                <a:solidFill>
+                  <a:schemeClr val="tx1">
+                    <a:lumMod val="75000"/>
+                    <a:lumOff val="25000"/>
+                  </a:schemeClr>
+                </a:solidFill>
+              </a:rPr>
+              <a:t>Намалява потреблението на ресурси</a:t>
+            </a:r>
+          </a:p>
+          <a:p>
+            <a:pPr marL="854075" lvl="1" indent="-396875">
+              <a:spcBef>
+                <a:spcPts val="1000"/>
+              </a:spcBef>
+              <a:buClr>
+                <a:schemeClr val="accent1"/>
+              </a:buClr>
+              <a:buSzPct val="80000"/>
+              <a:buFont typeface="Wingdings 3" charset="2"/>
+              <a:buChar char=""/>
+              <a:tabLst>
+                <a:tab pos="0" algn="l"/>
+              </a:tabLst>
+            </a:pPr>
+            <a:r>
+              <a:rPr lang="bg-BG" sz="2400" dirty="0" smtClean="0">
+                <a:solidFill>
+                  <a:schemeClr val="tx1">
+                    <a:lumMod val="75000"/>
+                    <a:lumOff val="25000"/>
+                  </a:schemeClr>
+                </a:solidFill>
+              </a:rPr>
+              <a:t>Надеждност</a:t>
+            </a:r>
+          </a:p>
+        </p:txBody>
+      </p:sp>
+      <p:pic>
+        <p:nvPicPr>
+          <p:cNvPr id="1026" name="Picture 2" descr="http://www.definealldefinitions.com/wp-content/uploads/2014/10/private-cloud-benefits-and-features.png"/>
+          <p:cNvPicPr>
+            <a:picLocks noChangeAspect="1" noChangeArrowheads="1"/>
+          </p:cNvPicPr>
+          <p:nvPr/>
+        </p:nvPicPr>
+        <p:blipFill>
+          <a:blip r:embed="rId3">
+            <a:extLst>
+              <a:ext uri="{28A0092B-C50C-407E-A947-70E740481C1C}">
+                <a14:useLocalDpi xmlns:a14="http://schemas.microsoft.com/office/drawing/2010/main" val="0"/>
+              </a:ext>
+            </a:extLst>
+          </a:blip>
+          <a:srcRect/>
+          <a:stretch>
+            <a:fillRect/>
+          </a:stretch>
+        </p:blipFill>
+        <p:spPr bwMode="auto">
+          <a:xfrm>
+            <a:off x="3843337" y="3702139"/>
+            <a:ext cx="3857625" cy="3155861"/>
+          </a:xfrm>
+          <a:prstGeom prst="rect">
+            <a:avLst/>
+          </a:prstGeom>
+          <a:noFill/>
+          <a:extLst>
+            <a:ext uri="{909E8E84-426E-40DD-AFC4-6F175D3DCCD1}">
+              <a14:hiddenFill xmlns:a14="http://schemas.microsoft.com/office/drawing/2010/main">
+                <a:solidFill>
+                  <a:srgbClr val="FFFFFF"/>
+                </a:solidFill>
+              </a14:hiddenFill>
+            </a:ext>
+          </a:extLst>
+        </p:spPr>
+      </p:pic>
+    </p:spTree>
+    <p:extLst>
+      <p:ext uri="{BB962C8B-B14F-4D97-AF65-F5344CB8AC3E}">
+        <p14:creationId xmlns:p14="http://schemas.microsoft.com/office/powerpoint/2010/main" val="2915792218"/>
+      </p:ext>
+    </p:extLst>
+  </p:cSld>
+  <p:clrMapOvr>
+    <a:masterClrMapping/>
+  </p:clrMapOvr>
+  <p:timing>
+    <p:tnLst>
+      <p:par>
+        <p:cTn id="1" dur="indefinite" restart="never" nodeType="tmRoot"/>
+      </p:par>
+    </p:tnLst>
+  </p:timing>
+</p:sld>
+</file>
+
+<file path=ppt/slides/slide18.xml><?xml version="1.0" encoding="utf-8"?>
+<p:sld xmlns:a="http://schemas.openxmlformats.org/drawingml/2006/main" xmlns:r="http://schemas.openxmlformats.org/officeDocument/2006/relationships" xmlns:p="http://schemas.openxmlformats.org/presentationml/2006/main">
+  <p:cSld>
+    <p:spTree>
+      <p:nvGrpSpPr>
+        <p:cNvPr id="1" name=""/>
+        <p:cNvGrpSpPr/>
+        <p:nvPr/>
+      </p:nvGrpSpPr>
+      <p:grpSpPr>
+        <a:xfrm>
+          <a:off x="0" y="0"/>
+          <a:ext cx="0" cy="0"/>
+          <a:chOff x="0" y="0"/>
+          <a:chExt cx="0" cy="0"/>
+        </a:xfrm>
+      </p:grpSpPr>
+      <p:sp>
+        <p:nvSpPr>
+          <p:cNvPr id="4" name="Title 1"/>
+          <p:cNvSpPr txBox="1">
+            <a:spLocks/>
+          </p:cNvSpPr>
+          <p:nvPr/>
+        </p:nvSpPr>
+        <p:spPr>
+          <a:xfrm>
+            <a:off x="640413" y="399245"/>
+            <a:ext cx="5987914" cy="1047481"/>
+          </a:xfrm>
+          <a:prstGeom prst="rect">
+            <a:avLst/>
+          </a:prstGeom>
+        </p:spPr>
+        <p:txBody>
+          <a:bodyPr vert="horz" lIns="91440" tIns="45720" rIns="91440" bIns="45720" rtlCol="0" anchor="t">
+            <a:normAutofit/>
+          </a:bodyPr>
+          <a:lstStyle>
+            <a:lvl1pPr algn="l" defTabSz="457200" rtl="0" eaLnBrk="1" latinLnBrk="0" hangingPunct="1">
+              <a:spcBef>
+                <a:spcPct val="0"/>
+              </a:spcBef>
+              <a:buNone/>
+              <a:defRPr sz="3600" kern="1200">
+                <a:solidFill>
+                  <a:schemeClr val="accent1"/>
+                </a:solidFill>
+                <a:latin typeface="+mj-lt"/>
+                <a:ea typeface="+mj-ea"/>
+                <a:cs typeface="+mj-cs"/>
+              </a:defRPr>
+            </a:lvl1pPr>
+            <a:lvl2pPr eaLnBrk="1" hangingPunct="1">
+              <a:defRPr>
+                <a:solidFill>
+                  <a:schemeClr val="tx2"/>
+                </a:solidFill>
+              </a:defRPr>
+            </a:lvl2pPr>
+            <a:lvl3pPr eaLnBrk="1" hangingPunct="1">
+              <a:defRPr>
+                <a:solidFill>
+                  <a:schemeClr val="tx2"/>
+                </a:solidFill>
+              </a:defRPr>
+            </a:lvl3pPr>
+            <a:lvl4pPr eaLnBrk="1" hangingPunct="1">
+              <a:defRPr>
+                <a:solidFill>
+                  <a:schemeClr val="tx2"/>
+                </a:solidFill>
+              </a:defRPr>
+            </a:lvl4pPr>
+            <a:lvl5pPr eaLnBrk="1" hangingPunct="1">
+              <a:defRPr>
+                <a:solidFill>
+                  <a:schemeClr val="tx2"/>
+                </a:solidFill>
+              </a:defRPr>
+            </a:lvl5pPr>
+            <a:lvl6pPr eaLnBrk="1" hangingPunct="1">
+              <a:defRPr>
+                <a:solidFill>
+                  <a:schemeClr val="tx2"/>
+                </a:solidFill>
+              </a:defRPr>
+            </a:lvl6pPr>
+            <a:lvl7pPr eaLnBrk="1" hangingPunct="1">
+              <a:defRPr>
+                <a:solidFill>
+                  <a:schemeClr val="tx2"/>
+                </a:solidFill>
+              </a:defRPr>
+            </a:lvl7pPr>
+            <a:lvl8pPr eaLnBrk="1" hangingPunct="1">
+              <a:defRPr>
+                <a:solidFill>
+                  <a:schemeClr val="tx2"/>
+                </a:solidFill>
+              </a:defRPr>
+            </a:lvl8pPr>
+            <a:lvl9pPr eaLnBrk="1" hangingPunct="1">
+              <a:defRPr>
+                <a:solidFill>
+                  <a:schemeClr val="tx2"/>
+                </a:solidFill>
+              </a:defRPr>
+            </a:lvl9pPr>
+          </a:lstStyle>
+          <a:p>
+            <a:r>
+              <a:rPr lang="bg-BG" dirty="0" smtClean="0"/>
+              <a:t>Публичен </a:t>
+            </a:r>
+            <a:r>
+              <a:rPr lang="en-US" dirty="0" smtClean="0"/>
+              <a:t>cloud</a:t>
+            </a:r>
+            <a:endParaRPr lang="bg-BG" dirty="0"/>
+          </a:p>
+        </p:txBody>
+      </p:sp>
+      <p:sp>
+        <p:nvSpPr>
+          <p:cNvPr id="5" name="Текстово поле 4"/>
+          <p:cNvSpPr txBox="1"/>
+          <p:nvPr/>
+        </p:nvSpPr>
+        <p:spPr>
+          <a:xfrm>
+            <a:off x="640410" y="1476712"/>
+            <a:ext cx="9646590" cy="3559949"/>
+          </a:xfrm>
+          <a:prstGeom prst="rect">
+            <a:avLst/>
+          </a:prstGeom>
+          <a:noFill/>
+        </p:spPr>
+        <p:txBody>
+          <a:bodyPr wrap="square" rtlCol="0">
+            <a:spAutoFit/>
+          </a:bodyPr>
+          <a:lstStyle/>
+          <a:p>
+            <a:r>
+              <a:rPr lang="bg-BG" sz="2400" dirty="0">
+                <a:solidFill>
+                  <a:schemeClr val="tx1">
+                    <a:lumMod val="75000"/>
+                    <a:lumOff val="25000"/>
+                  </a:schemeClr>
+                </a:solidFill>
+              </a:rPr>
+              <a:t>Основни </a:t>
+            </a:r>
+            <a:r>
+              <a:rPr lang="bg-BG" sz="2400" dirty="0" smtClean="0">
+                <a:solidFill>
+                  <a:schemeClr val="tx1">
+                    <a:lumMod val="75000"/>
+                    <a:lumOff val="25000"/>
+                  </a:schemeClr>
+                </a:solidFill>
+              </a:rPr>
+              <a:t>свойства</a:t>
+            </a:r>
+            <a:r>
+              <a:rPr lang="en-US" sz="2400" dirty="0" smtClean="0">
+                <a:solidFill>
+                  <a:schemeClr val="tx1">
+                    <a:lumMod val="75000"/>
+                    <a:lumOff val="25000"/>
+                  </a:schemeClr>
+                </a:solidFill>
+              </a:rPr>
+              <a:t> </a:t>
+            </a:r>
+            <a:r>
+              <a:rPr lang="bg-BG" sz="2400" dirty="0" smtClean="0">
+                <a:solidFill>
+                  <a:schemeClr val="tx1">
+                    <a:lumMod val="75000"/>
+                    <a:lumOff val="25000"/>
+                  </a:schemeClr>
+                </a:solidFill>
+              </a:rPr>
+              <a:t>на публичния </a:t>
+            </a:r>
+            <a:r>
+              <a:rPr lang="en-US" sz="2400" dirty="0" smtClean="0">
+                <a:solidFill>
+                  <a:schemeClr val="tx1">
+                    <a:lumMod val="75000"/>
+                    <a:lumOff val="25000"/>
+                  </a:schemeClr>
+                </a:solidFill>
+              </a:rPr>
+              <a:t>cloud</a:t>
+            </a:r>
+            <a:r>
+              <a:rPr lang="bg-BG" sz="2400" dirty="0" smtClean="0">
+                <a:solidFill>
+                  <a:schemeClr val="tx1">
+                    <a:lumMod val="75000"/>
+                    <a:lumOff val="25000"/>
+                  </a:schemeClr>
+                </a:solidFill>
+              </a:rPr>
+              <a:t>:</a:t>
+            </a:r>
+            <a:endParaRPr lang="en-US" sz="2400" dirty="0" smtClean="0">
+              <a:solidFill>
+                <a:schemeClr val="tx1">
+                  <a:lumMod val="75000"/>
+                  <a:lumOff val="25000"/>
+                </a:schemeClr>
+              </a:solidFill>
+            </a:endParaRPr>
+          </a:p>
+          <a:p>
+            <a:pPr marL="854075" lvl="1" indent="-396875">
+              <a:spcBef>
+                <a:spcPts val="1000"/>
+              </a:spcBef>
+              <a:buClr>
+                <a:schemeClr val="accent1"/>
+              </a:buClr>
+              <a:buSzPct val="80000"/>
+              <a:buFont typeface="Wingdings 3" charset="2"/>
+              <a:buChar char=""/>
+              <a:tabLst>
+                <a:tab pos="0" algn="l"/>
+              </a:tabLst>
+            </a:pPr>
+            <a:r>
+              <a:rPr lang="bg-BG" sz="2400" dirty="0" smtClean="0">
+                <a:solidFill>
+                  <a:schemeClr val="tx1">
+                    <a:lumMod val="75000"/>
+                    <a:lumOff val="25000"/>
+                  </a:schemeClr>
+                </a:solidFill>
+              </a:rPr>
+              <a:t>Предоставя услуги, които се съхраняват в публичното пространство</a:t>
+            </a:r>
+            <a:endParaRPr lang="bg-BG" sz="2400" dirty="0">
+              <a:solidFill>
+                <a:schemeClr val="tx1">
+                  <a:lumMod val="75000"/>
+                  <a:lumOff val="25000"/>
+                </a:schemeClr>
+              </a:solidFill>
+            </a:endParaRPr>
+          </a:p>
+          <a:p>
+            <a:pPr marL="854075" lvl="1" indent="-396875">
+              <a:spcBef>
+                <a:spcPts val="1000"/>
+              </a:spcBef>
+              <a:buClr>
+                <a:schemeClr val="accent1"/>
+              </a:buClr>
+              <a:buSzPct val="80000"/>
+              <a:buFont typeface="Wingdings 3" charset="2"/>
+              <a:buChar char=""/>
+              <a:tabLst>
+                <a:tab pos="0" algn="l"/>
+              </a:tabLst>
+            </a:pPr>
+            <a:r>
+              <a:rPr lang="bg-BG" sz="2400" dirty="0" smtClean="0">
+                <a:solidFill>
+                  <a:schemeClr val="tx1">
+                    <a:lumMod val="75000"/>
+                    <a:lumOff val="25000"/>
+                  </a:schemeClr>
+                </a:solidFill>
+              </a:rPr>
+              <a:t>Предоставя достъп на услуги до всички клиенти на една и съща инфраструктура</a:t>
+            </a:r>
+            <a:endParaRPr lang="bg-BG" sz="2400" dirty="0" smtClean="0">
+              <a:solidFill>
+                <a:schemeClr val="tx1">
+                  <a:lumMod val="75000"/>
+                  <a:lumOff val="25000"/>
+                </a:schemeClr>
+              </a:solidFill>
+            </a:endParaRPr>
+          </a:p>
+          <a:p>
+            <a:pPr marL="854075" lvl="1" indent="-396875">
+              <a:spcBef>
+                <a:spcPts val="1000"/>
+              </a:spcBef>
+              <a:buClr>
+                <a:schemeClr val="accent1"/>
+              </a:buClr>
+              <a:buSzPct val="80000"/>
+              <a:buFont typeface="Wingdings 3" charset="2"/>
+              <a:buChar char=""/>
+              <a:tabLst>
+                <a:tab pos="0" algn="l"/>
+              </a:tabLst>
+            </a:pPr>
+            <a:r>
+              <a:rPr lang="bg-BG" sz="2400" dirty="0" smtClean="0">
+                <a:solidFill>
+                  <a:schemeClr val="tx1">
+                    <a:lumMod val="75000"/>
+                    <a:lumOff val="25000"/>
+                  </a:schemeClr>
+                </a:solidFill>
+              </a:rPr>
+              <a:t>Предоставя се на потребители, които нямат нужда от висока сигурност</a:t>
+            </a:r>
+            <a:endParaRPr lang="bg-BG" sz="2400" dirty="0">
+              <a:solidFill>
+                <a:schemeClr val="tx1">
+                  <a:lumMod val="75000"/>
+                  <a:lumOff val="25000"/>
+                </a:schemeClr>
+              </a:solidFill>
+            </a:endParaRPr>
+          </a:p>
+          <a:p>
+            <a:pPr marL="854075" lvl="1" indent="-396875">
+              <a:spcBef>
+                <a:spcPts val="1000"/>
+              </a:spcBef>
+              <a:buClr>
+                <a:schemeClr val="accent1"/>
+              </a:buClr>
+              <a:buSzPct val="80000"/>
+              <a:buFont typeface="Wingdings 3" charset="2"/>
+              <a:buChar char=""/>
+              <a:tabLst>
+                <a:tab pos="0" algn="l"/>
+              </a:tabLst>
+            </a:pPr>
+            <a:r>
+              <a:rPr lang="bg-BG" sz="2400" dirty="0" smtClean="0">
+                <a:solidFill>
+                  <a:schemeClr val="tx1">
+                    <a:lumMod val="75000"/>
+                    <a:lumOff val="25000"/>
+                  </a:schemeClr>
+                </a:solidFill>
+              </a:rPr>
+              <a:t>Всичко е публично</a:t>
+            </a:r>
+            <a:endParaRPr lang="bg-BG" sz="2400" dirty="0">
+              <a:solidFill>
+                <a:schemeClr val="tx1">
+                  <a:lumMod val="75000"/>
+                  <a:lumOff val="25000"/>
+                </a:schemeClr>
+              </a:solidFill>
+            </a:endParaRPr>
+          </a:p>
+        </p:txBody>
+      </p:sp>
+    </p:spTree>
+    <p:extLst>
+      <p:ext uri="{BB962C8B-B14F-4D97-AF65-F5344CB8AC3E}">
+        <p14:creationId xmlns:p14="http://schemas.microsoft.com/office/powerpoint/2010/main" val="2463529777"/>
+      </p:ext>
+    </p:extLst>
+  </p:cSld>
+  <p:clrMapOvr>
+    <a:masterClrMapping/>
+  </p:clrMapOvr>
+  <p:timing>
+    <p:tnLst>
+      <p:par>
+        <p:cTn id="1" dur="indefinite" restart="never" nodeType="tmRoot"/>
+      </p:par>
+    </p:tnLst>
+  </p:timing>
+</p:sld>
+</file>
+
+<file path=ppt/slides/slide19.xml><?xml version="1.0" encoding="utf-8"?>
+<p:sld xmlns:a="http://schemas.openxmlformats.org/drawingml/2006/main" xmlns:r="http://schemas.openxmlformats.org/officeDocument/2006/relationships" xmlns:p="http://schemas.openxmlformats.org/presentationml/2006/main">
+  <p:cSld>
+    <p:spTree>
+      <p:nvGrpSpPr>
+        <p:cNvPr id="1" name=""/>
+        <p:cNvGrpSpPr/>
+        <p:nvPr/>
+      </p:nvGrpSpPr>
+      <p:grpSpPr>
+        <a:xfrm>
+          <a:off x="0" y="0"/>
+          <a:ext cx="0" cy="0"/>
+          <a:chOff x="0" y="0"/>
+          <a:chExt cx="0" cy="0"/>
+        </a:xfrm>
+      </p:grpSpPr>
+      <p:sp>
+        <p:nvSpPr>
+          <p:cNvPr id="4" name="Title 1"/>
+          <p:cNvSpPr txBox="1">
+            <a:spLocks/>
+          </p:cNvSpPr>
+          <p:nvPr/>
+        </p:nvSpPr>
+        <p:spPr>
+          <a:xfrm>
+            <a:off x="640413" y="399245"/>
+            <a:ext cx="5987914" cy="1047481"/>
+          </a:xfrm>
+          <a:prstGeom prst="rect">
+            <a:avLst/>
+          </a:prstGeom>
+        </p:spPr>
+        <p:txBody>
+          <a:bodyPr vert="horz" lIns="91440" tIns="45720" rIns="91440" bIns="45720" rtlCol="0" anchor="t">
+            <a:normAutofit/>
+          </a:bodyPr>
+          <a:lstStyle>
+            <a:lvl1pPr algn="l" defTabSz="457200" rtl="0" eaLnBrk="1" latinLnBrk="0" hangingPunct="1">
+              <a:spcBef>
+                <a:spcPct val="0"/>
+              </a:spcBef>
+              <a:buNone/>
+              <a:defRPr sz="3600" kern="1200">
+                <a:solidFill>
+                  <a:schemeClr val="accent1"/>
+                </a:solidFill>
+                <a:latin typeface="+mj-lt"/>
+                <a:ea typeface="+mj-ea"/>
+                <a:cs typeface="+mj-cs"/>
+              </a:defRPr>
+            </a:lvl1pPr>
+            <a:lvl2pPr eaLnBrk="1" hangingPunct="1">
+              <a:defRPr>
+                <a:solidFill>
+                  <a:schemeClr val="tx2"/>
+                </a:solidFill>
+              </a:defRPr>
+            </a:lvl2pPr>
+            <a:lvl3pPr eaLnBrk="1" hangingPunct="1">
+              <a:defRPr>
+                <a:solidFill>
+                  <a:schemeClr val="tx2"/>
+                </a:solidFill>
+              </a:defRPr>
+            </a:lvl3pPr>
+            <a:lvl4pPr eaLnBrk="1" hangingPunct="1">
+              <a:defRPr>
+                <a:solidFill>
+                  <a:schemeClr val="tx2"/>
+                </a:solidFill>
+              </a:defRPr>
+            </a:lvl4pPr>
+            <a:lvl5pPr eaLnBrk="1" hangingPunct="1">
+              <a:defRPr>
+                <a:solidFill>
+                  <a:schemeClr val="tx2"/>
+                </a:solidFill>
+              </a:defRPr>
+            </a:lvl5pPr>
+            <a:lvl6pPr eaLnBrk="1" hangingPunct="1">
+              <a:defRPr>
+                <a:solidFill>
+                  <a:schemeClr val="tx2"/>
+                </a:solidFill>
+              </a:defRPr>
+            </a:lvl6pPr>
+            <a:lvl7pPr eaLnBrk="1" hangingPunct="1">
+              <a:defRPr>
+                <a:solidFill>
+                  <a:schemeClr val="tx2"/>
+                </a:solidFill>
+              </a:defRPr>
+            </a:lvl7pPr>
+            <a:lvl8pPr eaLnBrk="1" hangingPunct="1">
+              <a:defRPr>
+                <a:solidFill>
+                  <a:schemeClr val="tx2"/>
+                </a:solidFill>
+              </a:defRPr>
+            </a:lvl8pPr>
+            <a:lvl9pPr eaLnBrk="1" hangingPunct="1">
+              <a:defRPr>
+                <a:solidFill>
+                  <a:schemeClr val="tx2"/>
+                </a:solidFill>
+              </a:defRPr>
+            </a:lvl9pPr>
+          </a:lstStyle>
+          <a:p>
+            <a:r>
+              <a:rPr lang="bg-BG" dirty="0" smtClean="0"/>
+              <a:t>Публичен </a:t>
+            </a:r>
+            <a:r>
+              <a:rPr lang="en-US" dirty="0" smtClean="0"/>
+              <a:t>cloud</a:t>
+            </a:r>
+            <a:endParaRPr lang="bg-BG" dirty="0"/>
+          </a:p>
+        </p:txBody>
+      </p:sp>
+      <p:sp>
+        <p:nvSpPr>
+          <p:cNvPr id="5" name="Текстово поле 4"/>
+          <p:cNvSpPr txBox="1"/>
+          <p:nvPr/>
+        </p:nvSpPr>
+        <p:spPr>
+          <a:xfrm>
+            <a:off x="640410" y="1119520"/>
+            <a:ext cx="9646590" cy="2949525"/>
+          </a:xfrm>
+          <a:prstGeom prst="rect">
+            <a:avLst/>
+          </a:prstGeom>
+          <a:noFill/>
+        </p:spPr>
+        <p:txBody>
+          <a:bodyPr wrap="square" rtlCol="0">
+            <a:spAutoFit/>
+          </a:bodyPr>
+          <a:lstStyle/>
+          <a:p>
+            <a:r>
+              <a:rPr lang="bg-BG" sz="2400" dirty="0" smtClean="0">
+                <a:solidFill>
+                  <a:schemeClr val="tx1">
+                    <a:lumMod val="75000"/>
+                    <a:lumOff val="25000"/>
+                  </a:schemeClr>
+                </a:solidFill>
+              </a:rPr>
+              <a:t>Предимства на</a:t>
+            </a:r>
+            <a:r>
+              <a:rPr lang="en-US" sz="2400" dirty="0" smtClean="0">
+                <a:solidFill>
+                  <a:schemeClr val="tx1">
+                    <a:lumMod val="75000"/>
+                    <a:lumOff val="25000"/>
+                  </a:schemeClr>
+                </a:solidFill>
+              </a:rPr>
+              <a:t> </a:t>
+            </a:r>
+            <a:r>
+              <a:rPr lang="bg-BG" sz="2400" dirty="0" smtClean="0">
+                <a:solidFill>
+                  <a:schemeClr val="tx1">
+                    <a:lumMod val="75000"/>
+                    <a:lumOff val="25000"/>
+                  </a:schemeClr>
+                </a:solidFill>
+              </a:rPr>
+              <a:t>публичния </a:t>
+            </a:r>
+            <a:r>
+              <a:rPr lang="en-US" sz="2400" dirty="0" smtClean="0">
+                <a:solidFill>
+                  <a:schemeClr val="tx1">
+                    <a:lumMod val="75000"/>
+                    <a:lumOff val="25000"/>
+                  </a:schemeClr>
+                </a:solidFill>
+              </a:rPr>
+              <a:t>cloud</a:t>
+            </a:r>
+            <a:r>
+              <a:rPr lang="bg-BG" sz="2400" dirty="0" smtClean="0">
+                <a:solidFill>
+                  <a:schemeClr val="tx1">
+                    <a:lumMod val="75000"/>
+                    <a:lumOff val="25000"/>
+                  </a:schemeClr>
+                </a:solidFill>
+              </a:rPr>
+              <a:t>:</a:t>
+            </a:r>
+            <a:endParaRPr lang="en-US" sz="2400" dirty="0" smtClean="0">
+              <a:solidFill>
+                <a:schemeClr val="tx1">
+                  <a:lumMod val="75000"/>
+                  <a:lumOff val="25000"/>
+                </a:schemeClr>
+              </a:solidFill>
+            </a:endParaRPr>
+          </a:p>
+          <a:p>
+            <a:pPr marL="854075" lvl="1" indent="-396875">
+              <a:spcBef>
+                <a:spcPts val="1000"/>
+              </a:spcBef>
+              <a:buClr>
+                <a:schemeClr val="accent1"/>
+              </a:buClr>
+              <a:buSzPct val="80000"/>
+              <a:buFont typeface="Wingdings 3" charset="2"/>
+              <a:buChar char=""/>
+              <a:tabLst>
+                <a:tab pos="0" algn="l"/>
+              </a:tabLst>
+            </a:pPr>
+            <a:r>
+              <a:rPr lang="bg-BG" sz="2400" dirty="0" smtClean="0">
+                <a:solidFill>
+                  <a:schemeClr val="tx1">
+                    <a:lumMod val="75000"/>
+                    <a:lumOff val="25000"/>
+                  </a:schemeClr>
+                </a:solidFill>
+              </a:rPr>
+              <a:t>Много добра </a:t>
+            </a:r>
+            <a:r>
+              <a:rPr lang="bg-BG" sz="2400" dirty="0" err="1" smtClean="0">
+                <a:solidFill>
+                  <a:schemeClr val="tx1">
+                    <a:lumMod val="75000"/>
+                    <a:lumOff val="25000"/>
+                  </a:schemeClr>
+                </a:solidFill>
+              </a:rPr>
+              <a:t>мащабируемост</a:t>
+            </a:r>
+            <a:endParaRPr lang="bg-BG" sz="2400" dirty="0" smtClean="0">
+              <a:solidFill>
+                <a:schemeClr val="tx1">
+                  <a:lumMod val="75000"/>
+                  <a:lumOff val="25000"/>
+                </a:schemeClr>
+              </a:solidFill>
+            </a:endParaRPr>
+          </a:p>
+          <a:p>
+            <a:pPr marL="854075" lvl="1" indent="-396875">
+              <a:spcBef>
+                <a:spcPts val="1000"/>
+              </a:spcBef>
+              <a:buClr>
+                <a:schemeClr val="accent1"/>
+              </a:buClr>
+              <a:buSzPct val="80000"/>
+              <a:buFont typeface="Wingdings 3" charset="2"/>
+              <a:buChar char=""/>
+              <a:tabLst>
+                <a:tab pos="0" algn="l"/>
+              </a:tabLst>
+            </a:pPr>
+            <a:r>
+              <a:rPr lang="bg-BG" sz="2400" dirty="0" smtClean="0">
+                <a:solidFill>
+                  <a:schemeClr val="tx1">
+                    <a:lumMod val="75000"/>
+                    <a:lumOff val="25000"/>
+                  </a:schemeClr>
+                </a:solidFill>
+              </a:rPr>
+              <a:t>Удобство в избора на услуги за ползване</a:t>
+            </a:r>
+            <a:endParaRPr lang="bg-BG" sz="2400" dirty="0" smtClean="0">
+              <a:solidFill>
+                <a:schemeClr val="tx1">
+                  <a:lumMod val="75000"/>
+                  <a:lumOff val="25000"/>
+                </a:schemeClr>
+              </a:solidFill>
+            </a:endParaRPr>
+          </a:p>
+          <a:p>
+            <a:pPr marL="854075" lvl="1" indent="-396875">
+              <a:spcBef>
+                <a:spcPts val="1000"/>
+              </a:spcBef>
+              <a:buClr>
+                <a:schemeClr val="accent1"/>
+              </a:buClr>
+              <a:buSzPct val="80000"/>
+              <a:buFont typeface="Wingdings 3" charset="2"/>
+              <a:buChar char=""/>
+              <a:tabLst>
+                <a:tab pos="0" algn="l"/>
+              </a:tabLst>
+            </a:pPr>
+            <a:r>
+              <a:rPr lang="bg-BG" sz="2400" dirty="0" smtClean="0">
+                <a:solidFill>
+                  <a:schemeClr val="tx1">
+                    <a:lumMod val="75000"/>
+                    <a:lumOff val="25000"/>
+                  </a:schemeClr>
+                </a:solidFill>
+              </a:rPr>
+              <a:t>Надеждност</a:t>
+            </a:r>
+            <a:endParaRPr lang="bg-BG" sz="2400" dirty="0">
+              <a:solidFill>
+                <a:schemeClr val="tx1">
+                  <a:lumMod val="75000"/>
+                  <a:lumOff val="25000"/>
+                </a:schemeClr>
+              </a:solidFill>
+            </a:endParaRPr>
+          </a:p>
+          <a:p>
+            <a:pPr marL="854075" lvl="1" indent="-396875">
+              <a:spcBef>
+                <a:spcPts val="1000"/>
+              </a:spcBef>
+              <a:buClr>
+                <a:schemeClr val="accent1"/>
+              </a:buClr>
+              <a:buSzPct val="80000"/>
+              <a:buFont typeface="Wingdings 3" charset="2"/>
+              <a:buChar char=""/>
+              <a:tabLst>
+                <a:tab pos="0" algn="l"/>
+              </a:tabLst>
+            </a:pPr>
+            <a:r>
+              <a:rPr lang="bg-BG" sz="2400" dirty="0" smtClean="0">
+                <a:solidFill>
+                  <a:schemeClr val="tx1">
+                    <a:lumMod val="75000"/>
+                    <a:lumOff val="25000"/>
+                  </a:schemeClr>
+                </a:solidFill>
+              </a:rPr>
+              <a:t>Гъвкавост</a:t>
+            </a:r>
+          </a:p>
+          <a:p>
+            <a:pPr marL="854075" lvl="1" indent="-396875">
+              <a:spcBef>
+                <a:spcPts val="1000"/>
+              </a:spcBef>
+              <a:buClr>
+                <a:schemeClr val="accent1"/>
+              </a:buClr>
+              <a:buSzPct val="80000"/>
+              <a:buFont typeface="Wingdings 3" charset="2"/>
+              <a:buChar char=""/>
+              <a:tabLst>
+                <a:tab pos="0" algn="l"/>
+              </a:tabLst>
+            </a:pPr>
+            <a:r>
+              <a:rPr lang="bg-BG" sz="2400" dirty="0" smtClean="0">
+                <a:solidFill>
+                  <a:schemeClr val="tx1">
+                    <a:lumMod val="75000"/>
+                    <a:lumOff val="25000"/>
+                  </a:schemeClr>
+                </a:solidFill>
+              </a:rPr>
+              <a:t>Независим от локацията</a:t>
+            </a:r>
+          </a:p>
+        </p:txBody>
+      </p:sp>
+      <p:pic>
+        <p:nvPicPr>
+          <p:cNvPr id="6" name="Картина 5"/>
+          <p:cNvPicPr>
+            <a:picLocks noChangeAspect="1"/>
+          </p:cNvPicPr>
+          <p:nvPr/>
+        </p:nvPicPr>
+        <p:blipFill>
+          <a:blip r:embed="rId3">
+            <a:extLst>
+              <a:ext uri="{28A0092B-C50C-407E-A947-70E740481C1C}">
+                <a14:useLocalDpi xmlns:a14="http://schemas.microsoft.com/office/drawing/2010/main" val="0"/>
+              </a:ext>
+            </a:extLst>
+          </a:blip>
+          <a:stretch>
+            <a:fillRect/>
+          </a:stretch>
+        </p:blipFill>
+        <p:spPr>
+          <a:xfrm>
+            <a:off x="5472112" y="3033779"/>
+            <a:ext cx="3511081" cy="3511081"/>
+          </a:xfrm>
+          <a:prstGeom prst="rect">
+            <a:avLst/>
+          </a:prstGeom>
+        </p:spPr>
+      </p:pic>
+    </p:spTree>
+    <p:extLst>
+      <p:ext uri="{BB962C8B-B14F-4D97-AF65-F5344CB8AC3E}">
+        <p14:creationId xmlns:p14="http://schemas.microsoft.com/office/powerpoint/2010/main" val="2216220590"/>
+      </p:ext>
+    </p:extLst>
+  </p:cSld>
+  <p:clrMapOvr>
+    <a:masterClrMapping/>
+  </p:clrMapOvr>
+  <p:timing>
+    <p:tnLst>
+      <p:par>
+        <p:cTn id="1" dur="indefinite" restart="never" nodeType="tmRoot"/>
+      </p:par>
+    </p:tnLst>
+  </p:timing>
 </p:sld>
 </file>
 
@@ -9143,7 +11650,7 @@
               <a:t>Общностен </a:t>
             </a:r>
             <a:r>
-              <a:rPr lang="en-US" sz="2000" dirty="0"/>
+              <a:rPr lang="en-US" sz="2000" dirty="0" smtClean="0"/>
               <a:t>cloud</a:t>
             </a:r>
             <a:endParaRPr lang="bg-BG" sz="2000" dirty="0"/>
@@ -9186,6 +11693,1001 @@
   <p:clrMapOvr>
     <a:masterClrMapping/>
   </p:clrMapOvr>
+</p:sld>
+</file>
+
+<file path=ppt/slides/slide20.xml><?xml version="1.0" encoding="utf-8"?>
+<p:sld xmlns:a="http://schemas.openxmlformats.org/drawingml/2006/main" xmlns:r="http://schemas.openxmlformats.org/officeDocument/2006/relationships" xmlns:p="http://schemas.openxmlformats.org/presentationml/2006/main">
+  <p:cSld>
+    <p:spTree>
+      <p:nvGrpSpPr>
+        <p:cNvPr id="1" name=""/>
+        <p:cNvGrpSpPr/>
+        <p:nvPr/>
+      </p:nvGrpSpPr>
+      <p:grpSpPr>
+        <a:xfrm>
+          <a:off x="0" y="0"/>
+          <a:ext cx="0" cy="0"/>
+          <a:chOff x="0" y="0"/>
+          <a:chExt cx="0" cy="0"/>
+        </a:xfrm>
+      </p:grpSpPr>
+      <p:sp>
+        <p:nvSpPr>
+          <p:cNvPr id="4" name="Title 1"/>
+          <p:cNvSpPr txBox="1">
+            <a:spLocks/>
+          </p:cNvSpPr>
+          <p:nvPr/>
+        </p:nvSpPr>
+        <p:spPr>
+          <a:xfrm>
+            <a:off x="640413" y="399245"/>
+            <a:ext cx="5987914" cy="1047481"/>
+          </a:xfrm>
+          <a:prstGeom prst="rect">
+            <a:avLst/>
+          </a:prstGeom>
+        </p:spPr>
+        <p:txBody>
+          <a:bodyPr vert="horz" lIns="91440" tIns="45720" rIns="91440" bIns="45720" rtlCol="0" anchor="t">
+            <a:normAutofit/>
+          </a:bodyPr>
+          <a:lstStyle>
+            <a:lvl1pPr algn="l" defTabSz="457200" rtl="0" eaLnBrk="1" latinLnBrk="0" hangingPunct="1">
+              <a:spcBef>
+                <a:spcPct val="0"/>
+              </a:spcBef>
+              <a:buNone/>
+              <a:defRPr sz="3600" kern="1200">
+                <a:solidFill>
+                  <a:schemeClr val="accent1"/>
+                </a:solidFill>
+                <a:latin typeface="+mj-lt"/>
+                <a:ea typeface="+mj-ea"/>
+                <a:cs typeface="+mj-cs"/>
+              </a:defRPr>
+            </a:lvl1pPr>
+            <a:lvl2pPr eaLnBrk="1" hangingPunct="1">
+              <a:defRPr>
+                <a:solidFill>
+                  <a:schemeClr val="tx2"/>
+                </a:solidFill>
+              </a:defRPr>
+            </a:lvl2pPr>
+            <a:lvl3pPr eaLnBrk="1" hangingPunct="1">
+              <a:defRPr>
+                <a:solidFill>
+                  <a:schemeClr val="tx2"/>
+                </a:solidFill>
+              </a:defRPr>
+            </a:lvl3pPr>
+            <a:lvl4pPr eaLnBrk="1" hangingPunct="1">
+              <a:defRPr>
+                <a:solidFill>
+                  <a:schemeClr val="tx2"/>
+                </a:solidFill>
+              </a:defRPr>
+            </a:lvl4pPr>
+            <a:lvl5pPr eaLnBrk="1" hangingPunct="1">
+              <a:defRPr>
+                <a:solidFill>
+                  <a:schemeClr val="tx2"/>
+                </a:solidFill>
+              </a:defRPr>
+            </a:lvl5pPr>
+            <a:lvl6pPr eaLnBrk="1" hangingPunct="1">
+              <a:defRPr>
+                <a:solidFill>
+                  <a:schemeClr val="tx2"/>
+                </a:solidFill>
+              </a:defRPr>
+            </a:lvl6pPr>
+            <a:lvl7pPr eaLnBrk="1" hangingPunct="1">
+              <a:defRPr>
+                <a:solidFill>
+                  <a:schemeClr val="tx2"/>
+                </a:solidFill>
+              </a:defRPr>
+            </a:lvl7pPr>
+            <a:lvl8pPr eaLnBrk="1" hangingPunct="1">
+              <a:defRPr>
+                <a:solidFill>
+                  <a:schemeClr val="tx2"/>
+                </a:solidFill>
+              </a:defRPr>
+            </a:lvl8pPr>
+            <a:lvl9pPr eaLnBrk="1" hangingPunct="1">
+              <a:defRPr>
+                <a:solidFill>
+                  <a:schemeClr val="tx2"/>
+                </a:solidFill>
+              </a:defRPr>
+            </a:lvl9pPr>
+          </a:lstStyle>
+          <a:p>
+            <a:r>
+              <a:rPr lang="bg-BG" dirty="0" smtClean="0"/>
+              <a:t>Хибриден </a:t>
+            </a:r>
+            <a:r>
+              <a:rPr lang="en-US" dirty="0" smtClean="0"/>
+              <a:t>cloud</a:t>
+            </a:r>
+            <a:endParaRPr lang="bg-BG" dirty="0"/>
+          </a:p>
+        </p:txBody>
+      </p:sp>
+      <p:sp>
+        <p:nvSpPr>
+          <p:cNvPr id="5" name="Текстово поле 4"/>
+          <p:cNvSpPr txBox="1"/>
+          <p:nvPr/>
+        </p:nvSpPr>
+        <p:spPr>
+          <a:xfrm>
+            <a:off x="640410" y="1476712"/>
+            <a:ext cx="9646590" cy="3062377"/>
+          </a:xfrm>
+          <a:prstGeom prst="rect">
+            <a:avLst/>
+          </a:prstGeom>
+          <a:noFill/>
+        </p:spPr>
+        <p:txBody>
+          <a:bodyPr wrap="square" rtlCol="0">
+            <a:spAutoFit/>
+          </a:bodyPr>
+          <a:lstStyle/>
+          <a:p>
+            <a:r>
+              <a:rPr lang="bg-BG" sz="2400" dirty="0">
+                <a:solidFill>
+                  <a:schemeClr val="tx1">
+                    <a:lumMod val="75000"/>
+                    <a:lumOff val="25000"/>
+                  </a:schemeClr>
+                </a:solidFill>
+              </a:rPr>
+              <a:t>Основни </a:t>
+            </a:r>
+            <a:r>
+              <a:rPr lang="bg-BG" sz="2400" dirty="0" smtClean="0">
+                <a:solidFill>
+                  <a:schemeClr val="tx1">
+                    <a:lumMod val="75000"/>
+                    <a:lumOff val="25000"/>
+                  </a:schemeClr>
+                </a:solidFill>
+              </a:rPr>
+              <a:t>свойства</a:t>
+            </a:r>
+            <a:r>
+              <a:rPr lang="en-US" sz="2400" dirty="0" smtClean="0">
+                <a:solidFill>
+                  <a:schemeClr val="tx1">
+                    <a:lumMod val="75000"/>
+                    <a:lumOff val="25000"/>
+                  </a:schemeClr>
+                </a:solidFill>
+              </a:rPr>
+              <a:t> </a:t>
+            </a:r>
+            <a:r>
+              <a:rPr lang="bg-BG" sz="2400" dirty="0" smtClean="0">
+                <a:solidFill>
+                  <a:schemeClr val="tx1">
+                    <a:lumMod val="75000"/>
+                    <a:lumOff val="25000"/>
+                  </a:schemeClr>
+                </a:solidFill>
+              </a:rPr>
+              <a:t>на публичния </a:t>
+            </a:r>
+            <a:r>
+              <a:rPr lang="en-US" sz="2400" dirty="0" smtClean="0">
+                <a:solidFill>
+                  <a:schemeClr val="tx1">
+                    <a:lumMod val="75000"/>
+                    <a:lumOff val="25000"/>
+                  </a:schemeClr>
+                </a:solidFill>
+              </a:rPr>
+              <a:t>cloud</a:t>
+            </a:r>
+            <a:r>
+              <a:rPr lang="bg-BG" sz="2400" dirty="0" smtClean="0">
+                <a:solidFill>
+                  <a:schemeClr val="tx1">
+                    <a:lumMod val="75000"/>
+                    <a:lumOff val="25000"/>
+                  </a:schemeClr>
+                </a:solidFill>
+              </a:rPr>
+              <a:t>:</a:t>
+            </a:r>
+            <a:endParaRPr lang="en-US" sz="2400" dirty="0" smtClean="0">
+              <a:solidFill>
+                <a:schemeClr val="tx1">
+                  <a:lumMod val="75000"/>
+                  <a:lumOff val="25000"/>
+                </a:schemeClr>
+              </a:solidFill>
+            </a:endParaRPr>
+          </a:p>
+          <a:p>
+            <a:pPr marL="854075" lvl="1" indent="-396875">
+              <a:spcBef>
+                <a:spcPts val="1000"/>
+              </a:spcBef>
+              <a:buClr>
+                <a:schemeClr val="accent1"/>
+              </a:buClr>
+              <a:buSzPct val="80000"/>
+              <a:buFont typeface="Wingdings 3" charset="2"/>
+              <a:buChar char=""/>
+              <a:tabLst>
+                <a:tab pos="0" algn="l"/>
+              </a:tabLst>
+            </a:pPr>
+            <a:r>
+              <a:rPr lang="bg-BG" sz="2400" dirty="0" smtClean="0">
+                <a:solidFill>
+                  <a:schemeClr val="tx1">
+                    <a:lumMod val="75000"/>
+                    <a:lumOff val="25000"/>
+                  </a:schemeClr>
+                </a:solidFill>
+              </a:rPr>
+              <a:t>Представлява смесица между частен и публичен </a:t>
+            </a:r>
+            <a:r>
+              <a:rPr lang="en-US" sz="2400" dirty="0" smtClean="0">
+                <a:solidFill>
+                  <a:schemeClr val="tx1">
+                    <a:lumMod val="75000"/>
+                    <a:lumOff val="25000"/>
+                  </a:schemeClr>
+                </a:solidFill>
+              </a:rPr>
+              <a:t>cloud</a:t>
+            </a:r>
+            <a:endParaRPr lang="bg-BG" sz="2400" dirty="0">
+              <a:solidFill>
+                <a:schemeClr val="tx1">
+                  <a:lumMod val="75000"/>
+                  <a:lumOff val="25000"/>
+                </a:schemeClr>
+              </a:solidFill>
+            </a:endParaRPr>
+          </a:p>
+          <a:p>
+            <a:pPr marL="854075" lvl="1" indent="-396875">
+              <a:spcBef>
+                <a:spcPts val="1000"/>
+              </a:spcBef>
+              <a:buClr>
+                <a:schemeClr val="accent1"/>
+              </a:buClr>
+              <a:buSzPct val="80000"/>
+              <a:buFont typeface="Wingdings 3" charset="2"/>
+              <a:buChar char=""/>
+              <a:tabLst>
+                <a:tab pos="0" algn="l"/>
+              </a:tabLst>
+            </a:pPr>
+            <a:r>
+              <a:rPr lang="bg-BG" sz="2400" dirty="0" smtClean="0">
+                <a:solidFill>
+                  <a:schemeClr val="tx1">
+                    <a:lumMod val="75000"/>
+                    <a:lumOff val="25000"/>
+                  </a:schemeClr>
+                </a:solidFill>
+              </a:rPr>
+              <a:t>Има възможност за ползване както като публичен, така и като частен </a:t>
+            </a:r>
+            <a:r>
+              <a:rPr lang="en-US" sz="2400" dirty="0" smtClean="0">
+                <a:solidFill>
+                  <a:schemeClr val="tx1">
+                    <a:lumMod val="75000"/>
+                    <a:lumOff val="25000"/>
+                  </a:schemeClr>
+                </a:solidFill>
+              </a:rPr>
+              <a:t>cloud</a:t>
+            </a:r>
+            <a:endParaRPr lang="bg-BG" sz="2400" dirty="0" smtClean="0">
+              <a:solidFill>
+                <a:schemeClr val="tx1">
+                  <a:lumMod val="75000"/>
+                  <a:lumOff val="25000"/>
+                </a:schemeClr>
+              </a:solidFill>
+            </a:endParaRPr>
+          </a:p>
+          <a:p>
+            <a:pPr marL="854075" lvl="1" indent="-396875">
+              <a:spcBef>
+                <a:spcPts val="1000"/>
+              </a:spcBef>
+              <a:buClr>
+                <a:schemeClr val="accent1"/>
+              </a:buClr>
+              <a:buSzPct val="80000"/>
+              <a:buFont typeface="Wingdings 3" charset="2"/>
+              <a:buChar char=""/>
+              <a:tabLst>
+                <a:tab pos="0" algn="l"/>
+              </a:tabLst>
+            </a:pPr>
+            <a:r>
+              <a:rPr lang="bg-BG" sz="2400" dirty="0" smtClean="0">
+                <a:solidFill>
+                  <a:schemeClr val="tx1">
+                    <a:lumMod val="75000"/>
+                    <a:lumOff val="25000"/>
+                  </a:schemeClr>
+                </a:solidFill>
+              </a:rPr>
+              <a:t>Използва се най-често, когато потребителят иска висока сигурност на данните, но и достъпност на продуктите от всяко място и по всяко време</a:t>
+            </a:r>
+            <a:endParaRPr lang="bg-BG" sz="2400" dirty="0">
+              <a:solidFill>
+                <a:schemeClr val="tx1">
+                  <a:lumMod val="75000"/>
+                  <a:lumOff val="25000"/>
+                </a:schemeClr>
+              </a:solidFill>
+            </a:endParaRPr>
+          </a:p>
+        </p:txBody>
+      </p:sp>
+    </p:spTree>
+    <p:extLst>
+      <p:ext uri="{BB962C8B-B14F-4D97-AF65-F5344CB8AC3E}">
+        <p14:creationId xmlns:p14="http://schemas.microsoft.com/office/powerpoint/2010/main" val="1387788634"/>
+      </p:ext>
+    </p:extLst>
+  </p:cSld>
+  <p:clrMapOvr>
+    <a:masterClrMapping/>
+  </p:clrMapOvr>
+  <p:timing>
+    <p:tnLst>
+      <p:par>
+        <p:cTn id="1" dur="indefinite" restart="never" nodeType="tmRoot"/>
+      </p:par>
+    </p:tnLst>
+  </p:timing>
+</p:sld>
+</file>
+
+<file path=ppt/slides/slide21.xml><?xml version="1.0" encoding="utf-8"?>
+<p:sld xmlns:a="http://schemas.openxmlformats.org/drawingml/2006/main" xmlns:r="http://schemas.openxmlformats.org/officeDocument/2006/relationships" xmlns:p="http://schemas.openxmlformats.org/presentationml/2006/main">
+  <p:cSld>
+    <p:spTree>
+      <p:nvGrpSpPr>
+        <p:cNvPr id="1" name=""/>
+        <p:cNvGrpSpPr/>
+        <p:nvPr/>
+      </p:nvGrpSpPr>
+      <p:grpSpPr>
+        <a:xfrm>
+          <a:off x="0" y="0"/>
+          <a:ext cx="0" cy="0"/>
+          <a:chOff x="0" y="0"/>
+          <a:chExt cx="0" cy="0"/>
+        </a:xfrm>
+      </p:grpSpPr>
+      <p:sp>
+        <p:nvSpPr>
+          <p:cNvPr id="4" name="Title 1"/>
+          <p:cNvSpPr txBox="1">
+            <a:spLocks/>
+          </p:cNvSpPr>
+          <p:nvPr/>
+        </p:nvSpPr>
+        <p:spPr>
+          <a:xfrm>
+            <a:off x="640413" y="399245"/>
+            <a:ext cx="5987914" cy="1047481"/>
+          </a:xfrm>
+          <a:prstGeom prst="rect">
+            <a:avLst/>
+          </a:prstGeom>
+        </p:spPr>
+        <p:txBody>
+          <a:bodyPr vert="horz" lIns="91440" tIns="45720" rIns="91440" bIns="45720" rtlCol="0" anchor="t">
+            <a:normAutofit/>
+          </a:bodyPr>
+          <a:lstStyle>
+            <a:lvl1pPr algn="l" defTabSz="457200" rtl="0" eaLnBrk="1" latinLnBrk="0" hangingPunct="1">
+              <a:spcBef>
+                <a:spcPct val="0"/>
+              </a:spcBef>
+              <a:buNone/>
+              <a:defRPr sz="3600" kern="1200">
+                <a:solidFill>
+                  <a:schemeClr val="accent1"/>
+                </a:solidFill>
+                <a:latin typeface="+mj-lt"/>
+                <a:ea typeface="+mj-ea"/>
+                <a:cs typeface="+mj-cs"/>
+              </a:defRPr>
+            </a:lvl1pPr>
+            <a:lvl2pPr eaLnBrk="1" hangingPunct="1">
+              <a:defRPr>
+                <a:solidFill>
+                  <a:schemeClr val="tx2"/>
+                </a:solidFill>
+              </a:defRPr>
+            </a:lvl2pPr>
+            <a:lvl3pPr eaLnBrk="1" hangingPunct="1">
+              <a:defRPr>
+                <a:solidFill>
+                  <a:schemeClr val="tx2"/>
+                </a:solidFill>
+              </a:defRPr>
+            </a:lvl3pPr>
+            <a:lvl4pPr eaLnBrk="1" hangingPunct="1">
+              <a:defRPr>
+                <a:solidFill>
+                  <a:schemeClr val="tx2"/>
+                </a:solidFill>
+              </a:defRPr>
+            </a:lvl4pPr>
+            <a:lvl5pPr eaLnBrk="1" hangingPunct="1">
+              <a:defRPr>
+                <a:solidFill>
+                  <a:schemeClr val="tx2"/>
+                </a:solidFill>
+              </a:defRPr>
+            </a:lvl5pPr>
+            <a:lvl6pPr eaLnBrk="1" hangingPunct="1">
+              <a:defRPr>
+                <a:solidFill>
+                  <a:schemeClr val="tx2"/>
+                </a:solidFill>
+              </a:defRPr>
+            </a:lvl6pPr>
+            <a:lvl7pPr eaLnBrk="1" hangingPunct="1">
+              <a:defRPr>
+                <a:solidFill>
+                  <a:schemeClr val="tx2"/>
+                </a:solidFill>
+              </a:defRPr>
+            </a:lvl7pPr>
+            <a:lvl8pPr eaLnBrk="1" hangingPunct="1">
+              <a:defRPr>
+                <a:solidFill>
+                  <a:schemeClr val="tx2"/>
+                </a:solidFill>
+              </a:defRPr>
+            </a:lvl8pPr>
+            <a:lvl9pPr eaLnBrk="1" hangingPunct="1">
+              <a:defRPr>
+                <a:solidFill>
+                  <a:schemeClr val="tx2"/>
+                </a:solidFill>
+              </a:defRPr>
+            </a:lvl9pPr>
+          </a:lstStyle>
+          <a:p>
+            <a:r>
+              <a:rPr lang="bg-BG" dirty="0" smtClean="0"/>
+              <a:t>Хибриден </a:t>
+            </a:r>
+            <a:r>
+              <a:rPr lang="en-US" dirty="0" smtClean="0"/>
+              <a:t>cloud</a:t>
+            </a:r>
+            <a:endParaRPr lang="bg-BG" dirty="0"/>
+          </a:p>
+        </p:txBody>
+      </p:sp>
+      <p:sp>
+        <p:nvSpPr>
+          <p:cNvPr id="5" name="Текстово поле 4"/>
+          <p:cNvSpPr txBox="1"/>
+          <p:nvPr/>
+        </p:nvSpPr>
+        <p:spPr>
+          <a:xfrm>
+            <a:off x="640410" y="1119520"/>
+            <a:ext cx="9646590" cy="3318857"/>
+          </a:xfrm>
+          <a:prstGeom prst="rect">
+            <a:avLst/>
+          </a:prstGeom>
+          <a:noFill/>
+        </p:spPr>
+        <p:txBody>
+          <a:bodyPr wrap="square" rtlCol="0">
+            <a:spAutoFit/>
+          </a:bodyPr>
+          <a:lstStyle/>
+          <a:p>
+            <a:r>
+              <a:rPr lang="bg-BG" sz="2400" dirty="0" smtClean="0">
+                <a:solidFill>
+                  <a:schemeClr val="tx1">
+                    <a:lumMod val="75000"/>
+                    <a:lumOff val="25000"/>
+                  </a:schemeClr>
+                </a:solidFill>
+              </a:rPr>
+              <a:t>Предимства на</a:t>
+            </a:r>
+            <a:r>
+              <a:rPr lang="en-US" sz="2400" dirty="0" smtClean="0">
+                <a:solidFill>
+                  <a:schemeClr val="tx1">
+                    <a:lumMod val="75000"/>
+                    <a:lumOff val="25000"/>
+                  </a:schemeClr>
+                </a:solidFill>
+              </a:rPr>
+              <a:t> </a:t>
+            </a:r>
+            <a:r>
+              <a:rPr lang="bg-BG" sz="2400" dirty="0" smtClean="0">
+                <a:solidFill>
+                  <a:schemeClr val="tx1">
+                    <a:lumMod val="75000"/>
+                    <a:lumOff val="25000"/>
+                  </a:schemeClr>
+                </a:solidFill>
+              </a:rPr>
+              <a:t>хибридния </a:t>
+            </a:r>
+            <a:r>
+              <a:rPr lang="en-US" sz="2400" dirty="0" smtClean="0">
+                <a:solidFill>
+                  <a:schemeClr val="tx1">
+                    <a:lumMod val="75000"/>
+                    <a:lumOff val="25000"/>
+                  </a:schemeClr>
+                </a:solidFill>
+              </a:rPr>
+              <a:t>cloud</a:t>
+            </a:r>
+            <a:r>
+              <a:rPr lang="bg-BG" sz="2400" dirty="0" smtClean="0">
+                <a:solidFill>
+                  <a:schemeClr val="tx1">
+                    <a:lumMod val="75000"/>
+                    <a:lumOff val="25000"/>
+                  </a:schemeClr>
+                </a:solidFill>
+              </a:rPr>
+              <a:t>:</a:t>
+            </a:r>
+            <a:endParaRPr lang="en-US" sz="2400" dirty="0" smtClean="0">
+              <a:solidFill>
+                <a:schemeClr val="tx1">
+                  <a:lumMod val="75000"/>
+                  <a:lumOff val="25000"/>
+                </a:schemeClr>
+              </a:solidFill>
+            </a:endParaRPr>
+          </a:p>
+          <a:p>
+            <a:pPr marL="854075" lvl="1" indent="-396875">
+              <a:spcBef>
+                <a:spcPts val="1000"/>
+              </a:spcBef>
+              <a:buClr>
+                <a:schemeClr val="accent1"/>
+              </a:buClr>
+              <a:buSzPct val="80000"/>
+              <a:buFont typeface="Wingdings 3" charset="2"/>
+              <a:buChar char=""/>
+              <a:tabLst>
+                <a:tab pos="0" algn="l"/>
+              </a:tabLst>
+            </a:pPr>
+            <a:r>
+              <a:rPr lang="bg-BG" sz="2400" dirty="0" smtClean="0">
+                <a:solidFill>
+                  <a:schemeClr val="tx1">
+                    <a:lumMod val="75000"/>
+                    <a:lumOff val="25000"/>
+                  </a:schemeClr>
+                </a:solidFill>
+              </a:rPr>
+              <a:t>Обединява повечето предимства на публични и частния </a:t>
+            </a:r>
+            <a:r>
+              <a:rPr lang="en-US" sz="2400" dirty="0" smtClean="0">
+                <a:solidFill>
+                  <a:schemeClr val="tx1">
+                    <a:lumMod val="75000"/>
+                    <a:lumOff val="25000"/>
+                  </a:schemeClr>
+                </a:solidFill>
+              </a:rPr>
+              <a:t>cloud</a:t>
+            </a:r>
+            <a:endParaRPr lang="bg-BG" sz="2400" dirty="0" smtClean="0">
+              <a:solidFill>
+                <a:schemeClr val="tx1">
+                  <a:lumMod val="75000"/>
+                  <a:lumOff val="25000"/>
+                </a:schemeClr>
+              </a:solidFill>
+            </a:endParaRPr>
+          </a:p>
+          <a:p>
+            <a:pPr marL="854075" lvl="1" indent="-396875">
+              <a:spcBef>
+                <a:spcPts val="1000"/>
+              </a:spcBef>
+              <a:buClr>
+                <a:schemeClr val="accent1"/>
+              </a:buClr>
+              <a:buSzPct val="80000"/>
+              <a:buFont typeface="Wingdings 3" charset="2"/>
+              <a:buChar char=""/>
+              <a:tabLst>
+                <a:tab pos="0" algn="l"/>
+              </a:tabLst>
+            </a:pPr>
+            <a:r>
+              <a:rPr lang="bg-BG" sz="2400" dirty="0" err="1" smtClean="0">
+                <a:solidFill>
+                  <a:schemeClr val="tx1">
+                    <a:lumMod val="75000"/>
+                    <a:lumOff val="25000"/>
+                  </a:schemeClr>
+                </a:solidFill>
+              </a:rPr>
+              <a:t>Мащабируемост</a:t>
+            </a:r>
+            <a:endParaRPr lang="bg-BG" sz="2400" dirty="0" smtClean="0">
+              <a:solidFill>
+                <a:schemeClr val="tx1">
+                  <a:lumMod val="75000"/>
+                  <a:lumOff val="25000"/>
+                </a:schemeClr>
+              </a:solidFill>
+            </a:endParaRPr>
+          </a:p>
+          <a:p>
+            <a:pPr marL="854075" lvl="1" indent="-396875">
+              <a:spcBef>
+                <a:spcPts val="1000"/>
+              </a:spcBef>
+              <a:buClr>
+                <a:schemeClr val="accent1"/>
+              </a:buClr>
+              <a:buSzPct val="80000"/>
+              <a:buFont typeface="Wingdings 3" charset="2"/>
+              <a:buChar char=""/>
+              <a:tabLst>
+                <a:tab pos="0" algn="l"/>
+              </a:tabLst>
+            </a:pPr>
+            <a:r>
+              <a:rPr lang="bg-BG" sz="2400" dirty="0" smtClean="0">
+                <a:solidFill>
+                  <a:schemeClr val="tx1">
+                    <a:lumMod val="75000"/>
+                    <a:lumOff val="25000"/>
+                  </a:schemeClr>
+                </a:solidFill>
+              </a:rPr>
+              <a:t>Ценова ефективност</a:t>
+            </a:r>
+            <a:endParaRPr lang="bg-BG" sz="2400" dirty="0">
+              <a:solidFill>
+                <a:schemeClr val="tx1">
+                  <a:lumMod val="75000"/>
+                  <a:lumOff val="25000"/>
+                </a:schemeClr>
+              </a:solidFill>
+            </a:endParaRPr>
+          </a:p>
+          <a:p>
+            <a:pPr marL="854075" lvl="1" indent="-396875">
+              <a:spcBef>
+                <a:spcPts val="1000"/>
+              </a:spcBef>
+              <a:buClr>
+                <a:schemeClr val="accent1"/>
+              </a:buClr>
+              <a:buSzPct val="80000"/>
+              <a:buFont typeface="Wingdings 3" charset="2"/>
+              <a:buChar char=""/>
+              <a:tabLst>
+                <a:tab pos="0" algn="l"/>
+              </a:tabLst>
+            </a:pPr>
+            <a:r>
+              <a:rPr lang="bg-BG" sz="2400" dirty="0" smtClean="0">
+                <a:solidFill>
+                  <a:schemeClr val="tx1">
+                    <a:lumMod val="75000"/>
+                    <a:lumOff val="25000"/>
+                  </a:schemeClr>
+                </a:solidFill>
+              </a:rPr>
+              <a:t>Сигурност</a:t>
+            </a:r>
+          </a:p>
+          <a:p>
+            <a:pPr marL="854075" lvl="1" indent="-396875">
+              <a:spcBef>
+                <a:spcPts val="1000"/>
+              </a:spcBef>
+              <a:buClr>
+                <a:schemeClr val="accent1"/>
+              </a:buClr>
+              <a:buSzPct val="80000"/>
+              <a:buFont typeface="Wingdings 3" charset="2"/>
+              <a:buChar char=""/>
+              <a:tabLst>
+                <a:tab pos="0" algn="l"/>
+              </a:tabLst>
+            </a:pPr>
+            <a:r>
+              <a:rPr lang="bg-BG" sz="2400" dirty="0" smtClean="0">
+                <a:solidFill>
+                  <a:schemeClr val="tx1">
+                    <a:lumMod val="75000"/>
+                    <a:lumOff val="25000"/>
+                  </a:schemeClr>
+                </a:solidFill>
+              </a:rPr>
+              <a:t>Гъвкавост</a:t>
+            </a:r>
+          </a:p>
+        </p:txBody>
+      </p:sp>
+      <p:pic>
+        <p:nvPicPr>
+          <p:cNvPr id="3074" name="Picture 2" descr="http://convergenceservices.in/images/hybrid_cloud.jpg"/>
+          <p:cNvPicPr>
+            <a:picLocks noChangeAspect="1" noChangeArrowheads="1"/>
+          </p:cNvPicPr>
+          <p:nvPr/>
+        </p:nvPicPr>
+        <p:blipFill>
+          <a:blip r:embed="rId3">
+            <a:extLst>
+              <a:ext uri="{28A0092B-C50C-407E-A947-70E740481C1C}">
+                <a14:useLocalDpi xmlns:a14="http://schemas.microsoft.com/office/drawing/2010/main" val="0"/>
+              </a:ext>
+            </a:extLst>
+          </a:blip>
+          <a:srcRect/>
+          <a:stretch>
+            <a:fillRect/>
+          </a:stretch>
+        </p:blipFill>
+        <p:spPr bwMode="auto">
+          <a:xfrm>
+            <a:off x="3262889" y="3388870"/>
+            <a:ext cx="5402309" cy="3469130"/>
+          </a:xfrm>
+          <a:prstGeom prst="rect">
+            <a:avLst/>
+          </a:prstGeom>
+          <a:noFill/>
+          <a:extLst>
+            <a:ext uri="{909E8E84-426E-40DD-AFC4-6F175D3DCCD1}">
+              <a14:hiddenFill xmlns:a14="http://schemas.microsoft.com/office/drawing/2010/main">
+                <a:solidFill>
+                  <a:srgbClr val="FFFFFF"/>
+                </a:solidFill>
+              </a14:hiddenFill>
+            </a:ext>
+          </a:extLst>
+        </p:spPr>
+      </p:pic>
+    </p:spTree>
+    <p:extLst>
+      <p:ext uri="{BB962C8B-B14F-4D97-AF65-F5344CB8AC3E}">
+        <p14:creationId xmlns:p14="http://schemas.microsoft.com/office/powerpoint/2010/main" val="2141487176"/>
+      </p:ext>
+    </p:extLst>
+  </p:cSld>
+  <p:clrMapOvr>
+    <a:masterClrMapping/>
+  </p:clrMapOvr>
+  <p:timing>
+    <p:tnLst>
+      <p:par>
+        <p:cTn id="1" dur="indefinite" restart="never" nodeType="tmRoot"/>
+      </p:par>
+    </p:tnLst>
+  </p:timing>
+</p:sld>
+</file>
+
+<file path=ppt/slides/slide22.xml><?xml version="1.0" encoding="utf-8"?>
+<p:sld xmlns:a="http://schemas.openxmlformats.org/drawingml/2006/main" xmlns:r="http://schemas.openxmlformats.org/officeDocument/2006/relationships" xmlns:p="http://schemas.openxmlformats.org/presentationml/2006/main">
+  <p:cSld>
+    <p:spTree>
+      <p:nvGrpSpPr>
+        <p:cNvPr id="1" name=""/>
+        <p:cNvGrpSpPr/>
+        <p:nvPr/>
+      </p:nvGrpSpPr>
+      <p:grpSpPr>
+        <a:xfrm>
+          <a:off x="0" y="0"/>
+          <a:ext cx="0" cy="0"/>
+          <a:chOff x="0" y="0"/>
+          <a:chExt cx="0" cy="0"/>
+        </a:xfrm>
+      </p:grpSpPr>
+      <p:sp>
+        <p:nvSpPr>
+          <p:cNvPr id="4" name="Title 1"/>
+          <p:cNvSpPr txBox="1">
+            <a:spLocks/>
+          </p:cNvSpPr>
+          <p:nvPr/>
+        </p:nvSpPr>
+        <p:spPr>
+          <a:xfrm>
+            <a:off x="640413" y="399245"/>
+            <a:ext cx="5987914" cy="1047481"/>
+          </a:xfrm>
+          <a:prstGeom prst="rect">
+            <a:avLst/>
+          </a:prstGeom>
+        </p:spPr>
+        <p:txBody>
+          <a:bodyPr vert="horz" lIns="91440" tIns="45720" rIns="91440" bIns="45720" rtlCol="0" anchor="t">
+            <a:normAutofit/>
+          </a:bodyPr>
+          <a:lstStyle>
+            <a:lvl1pPr algn="l" defTabSz="457200" rtl="0" eaLnBrk="1" latinLnBrk="0" hangingPunct="1">
+              <a:spcBef>
+                <a:spcPct val="0"/>
+              </a:spcBef>
+              <a:buNone/>
+              <a:defRPr sz="3600" kern="1200">
+                <a:solidFill>
+                  <a:schemeClr val="accent1"/>
+                </a:solidFill>
+                <a:latin typeface="+mj-lt"/>
+                <a:ea typeface="+mj-ea"/>
+                <a:cs typeface="+mj-cs"/>
+              </a:defRPr>
+            </a:lvl1pPr>
+            <a:lvl2pPr eaLnBrk="1" hangingPunct="1">
+              <a:defRPr>
+                <a:solidFill>
+                  <a:schemeClr val="tx2"/>
+                </a:solidFill>
+              </a:defRPr>
+            </a:lvl2pPr>
+            <a:lvl3pPr eaLnBrk="1" hangingPunct="1">
+              <a:defRPr>
+                <a:solidFill>
+                  <a:schemeClr val="tx2"/>
+                </a:solidFill>
+              </a:defRPr>
+            </a:lvl3pPr>
+            <a:lvl4pPr eaLnBrk="1" hangingPunct="1">
+              <a:defRPr>
+                <a:solidFill>
+                  <a:schemeClr val="tx2"/>
+                </a:solidFill>
+              </a:defRPr>
+            </a:lvl4pPr>
+            <a:lvl5pPr eaLnBrk="1" hangingPunct="1">
+              <a:defRPr>
+                <a:solidFill>
+                  <a:schemeClr val="tx2"/>
+                </a:solidFill>
+              </a:defRPr>
+            </a:lvl5pPr>
+            <a:lvl6pPr eaLnBrk="1" hangingPunct="1">
+              <a:defRPr>
+                <a:solidFill>
+                  <a:schemeClr val="tx2"/>
+                </a:solidFill>
+              </a:defRPr>
+            </a:lvl6pPr>
+            <a:lvl7pPr eaLnBrk="1" hangingPunct="1">
+              <a:defRPr>
+                <a:solidFill>
+                  <a:schemeClr val="tx2"/>
+                </a:solidFill>
+              </a:defRPr>
+            </a:lvl7pPr>
+            <a:lvl8pPr eaLnBrk="1" hangingPunct="1">
+              <a:defRPr>
+                <a:solidFill>
+                  <a:schemeClr val="tx2"/>
+                </a:solidFill>
+              </a:defRPr>
+            </a:lvl8pPr>
+            <a:lvl9pPr eaLnBrk="1" hangingPunct="1">
+              <a:defRPr>
+                <a:solidFill>
+                  <a:schemeClr val="tx2"/>
+                </a:solidFill>
+              </a:defRPr>
+            </a:lvl9pPr>
+          </a:lstStyle>
+          <a:p>
+            <a:r>
+              <a:rPr lang="bg-BG" dirty="0" smtClean="0"/>
+              <a:t>Общностен </a:t>
+            </a:r>
+            <a:r>
+              <a:rPr lang="en-US" dirty="0" smtClean="0"/>
+              <a:t>cloud</a:t>
+            </a:r>
+            <a:endParaRPr lang="bg-BG" dirty="0"/>
+          </a:p>
+        </p:txBody>
+      </p:sp>
+      <p:pic>
+        <p:nvPicPr>
+          <p:cNvPr id="4098" name="Picture 2" descr="https://media.licdn.com/mpr/mpr/p/5/005/089/26d/36d5d43.jpg"/>
+          <p:cNvPicPr>
+            <a:picLocks noChangeAspect="1" noChangeArrowheads="1"/>
+          </p:cNvPicPr>
+          <p:nvPr/>
+        </p:nvPicPr>
+        <p:blipFill>
+          <a:blip r:embed="rId3">
+            <a:extLst>
+              <a:ext uri="{28A0092B-C50C-407E-A947-70E740481C1C}">
+                <a14:useLocalDpi xmlns:a14="http://schemas.microsoft.com/office/drawing/2010/main" val="0"/>
+              </a:ext>
+            </a:extLst>
+          </a:blip>
+          <a:srcRect/>
+          <a:stretch>
+            <a:fillRect/>
+          </a:stretch>
+        </p:blipFill>
+        <p:spPr bwMode="auto">
+          <a:xfrm>
+            <a:off x="441325" y="1111249"/>
+            <a:ext cx="8959721" cy="4017963"/>
+          </a:xfrm>
+          <a:prstGeom prst="rect">
+            <a:avLst/>
+          </a:prstGeom>
+          <a:noFill/>
+          <a:extLst>
+            <a:ext uri="{909E8E84-426E-40DD-AFC4-6F175D3DCCD1}">
+              <a14:hiddenFill xmlns:a14="http://schemas.microsoft.com/office/drawing/2010/main">
+                <a:solidFill>
+                  <a:srgbClr val="FFFFFF"/>
+                </a:solidFill>
+              </a14:hiddenFill>
+            </a:ext>
+          </a:extLst>
+        </p:spPr>
+      </p:pic>
+    </p:spTree>
+    <p:extLst>
+      <p:ext uri="{BB962C8B-B14F-4D97-AF65-F5344CB8AC3E}">
+        <p14:creationId xmlns:p14="http://schemas.microsoft.com/office/powerpoint/2010/main" val="2562377330"/>
+      </p:ext>
+    </p:extLst>
+  </p:cSld>
+  <p:clrMapOvr>
+    <a:masterClrMapping/>
+  </p:clrMapOvr>
+  <p:timing>
+    <p:tnLst>
+      <p:par>
+        <p:cTn id="1" dur="indefinite" restart="never" nodeType="tmRoot"/>
+      </p:par>
+    </p:tnLst>
+  </p:timing>
 </p:sld>
 </file>
 

</xml_diff>

<commit_message>
added speakers_spection that stores speakers speeches, various presentation fixes - separated in sections, words translated.
</commit_message>
<xml_diff>
--- a/CLOUD COMPUTING.pptx
+++ b/CLOUD COMPUTING.pptx
@@ -129,6 +129,71 @@
     </a:lvl9pPr>
   </p:defaultTextStyle>
   <p:extLst>
+    <p:ext uri="{521415D9-36F7-43E2-AB2F-B90AF26B5E84}">
+      <p14:sectionLst xmlns:p14="http://schemas.microsoft.com/office/powerpoint/2010/main">
+        <p14:section name="Енчо" id="{56B87C27-868D-4B94-ABE7-92F1C6C57775}">
+          <p14:sldIdLst>
+            <p14:sldId id="256"/>
+            <p14:sldId id="257"/>
+            <p14:sldId id="262"/>
+            <p14:sldId id="263"/>
+          </p14:sldIdLst>
+        </p14:section>
+        <p14:section name="Никола" id="{887EE61E-4E4D-459E-B421-CB3C9EFC835B}">
+          <p14:sldIdLst>
+            <p14:sldId id="258"/>
+          </p14:sldIdLst>
+        </p14:section>
+        <p14:section name="Енчо" id="{4A1C7280-743F-4E63-9869-069216C4A071}">
+          <p14:sldIdLst>
+            <p14:sldId id="259"/>
+          </p14:sldIdLst>
+        </p14:section>
+        <p14:section name="Никола" id="{121EF6F3-C722-46EB-BC64-4EF4213EDF03}">
+          <p14:sldIdLst>
+            <p14:sldId id="265"/>
+            <p14:sldId id="266"/>
+            <p14:sldId id="264"/>
+          </p14:sldIdLst>
+        </p14:section>
+        <p14:section name="Енчо" id="{A007A0DE-ADB0-4988-958D-9F0B7029FDCC}">
+          <p14:sldIdLst>
+            <p14:sldId id="267"/>
+            <p14:sldId id="268"/>
+            <p14:sldId id="269"/>
+          </p14:sldIdLst>
+        </p14:section>
+        <p14:section name="Георги" id="{ECE87A3E-2123-4FA3-9EA6-78FC98718998}">
+          <p14:sldIdLst>
+            <p14:sldId id="271"/>
+            <p14:sldId id="272"/>
+          </p14:sldIdLst>
+        </p14:section>
+        <p14:section name="Енчо" id="{D8C0769C-BCBD-489E-9AE6-FEC90CFD8964}">
+          <p14:sldIdLst>
+            <p14:sldId id="273"/>
+            <p14:sldId id="274"/>
+            <p14:sldId id="275"/>
+          </p14:sldIdLst>
+        </p14:section>
+        <p14:section name="Никола" id="{49A25BA8-B52E-4DAD-BB8C-6D334DAF9B6C}">
+          <p14:sldIdLst>
+            <p14:sldId id="276"/>
+            <p14:sldId id="277"/>
+          </p14:sldIdLst>
+        </p14:section>
+        <p14:section name="Георги" id="{CDB885CE-3580-440D-961F-442266F1DE7F}">
+          <p14:sldIdLst>
+            <p14:sldId id="278"/>
+            <p14:sldId id="279"/>
+            <p14:sldId id="280"/>
+          </p14:sldIdLst>
+        </p14:section>
+        <p14:section name="Енчо" id="{29817F77-7DFC-45ED-96DF-CE9CE5D863F6}">
+          <p14:sldIdLst/>
+        </p14:section>
+      </p14:sectionLst>
+    </p:ext>
     <p:ext uri="{EFAFB233-063F-42B5-8137-9DF3F51BA10A}">
       <p15:sldGuideLst xmlns:p15="http://schemas.microsoft.com/office/powerpoint/2012/main"/>
     </p:ext>
@@ -218,7 +283,7 @@
           <a:p>
             <a:fld id="{78AF2967-8E22-4B42-90F2-D88CC1BBE804}" type="datetimeFigureOut">
               <a:rPr lang="en-US" smtClean="0"/>
-              <a:t>08-Apr-16</a:t>
+              <a:t>4/12/2016</a:t>
             </a:fld>
             <a:endParaRPr lang="en-US"/>
           </a:p>
@@ -2721,7 +2786,7 @@
             <a:fld id="{B61BEF0D-F0BB-DE4B-95CE-6DB70DBA9567}" type="datetimeFigureOut">
               <a:rPr lang="en-US" dirty="0"/>
               <a:pPr/>
-              <a:t>08-Apr-16</a:t>
+              <a:t>4/12/2016</a:t>
             </a:fld>
             <a:endParaRPr lang="en-US" dirty="0"/>
           </a:p>
@@ -2969,7 +3034,7 @@
             <a:fld id="{B61BEF0D-F0BB-DE4B-95CE-6DB70DBA9567}" type="datetimeFigureOut">
               <a:rPr lang="en-US" dirty="0"/>
               <a:pPr/>
-              <a:t>08-Apr-16</a:t>
+              <a:t>4/12/2016</a:t>
             </a:fld>
             <a:endParaRPr lang="en-US" dirty="0"/>
           </a:p>
@@ -3280,7 +3345,7 @@
             <a:fld id="{B61BEF0D-F0BB-DE4B-95CE-6DB70DBA9567}" type="datetimeFigureOut">
               <a:rPr lang="en-US" dirty="0"/>
               <a:pPr/>
-              <a:t>08-Apr-16</a:t>
+              <a:t>4/12/2016</a:t>
             </a:fld>
             <a:endParaRPr lang="en-US" dirty="0"/>
           </a:p>
@@ -3618,7 +3683,7 @@
             <a:fld id="{B61BEF0D-F0BB-DE4B-95CE-6DB70DBA9567}" type="datetimeFigureOut">
               <a:rPr lang="en-US" dirty="0"/>
               <a:pPr/>
-              <a:t>08-Apr-16</a:t>
+              <a:t>4/12/2016</a:t>
             </a:fld>
             <a:endParaRPr lang="en-US" dirty="0"/>
           </a:p>
@@ -3929,7 +3994,7 @@
             <a:fld id="{B61BEF0D-F0BB-DE4B-95CE-6DB70DBA9567}" type="datetimeFigureOut">
               <a:rPr lang="en-US" dirty="0"/>
               <a:pPr/>
-              <a:t>08-Apr-16</a:t>
+              <a:t>4/12/2016</a:t>
             </a:fld>
             <a:endParaRPr lang="en-US" dirty="0"/>
           </a:p>
@@ -4319,7 +4384,7 @@
             <a:fld id="{B61BEF0D-F0BB-DE4B-95CE-6DB70DBA9567}" type="datetimeFigureOut">
               <a:rPr lang="en-US" dirty="0"/>
               <a:pPr/>
-              <a:t>08-Apr-16</a:t>
+              <a:t>4/12/2016</a:t>
             </a:fld>
             <a:endParaRPr lang="en-US" dirty="0"/>
           </a:p>
@@ -4485,7 +4550,7 @@
           <a:p>
             <a:fld id="{55C6B4A9-1611-4792-9094-5F34BCA07E0B}" type="datetimeFigureOut">
               <a:rPr lang="en-US" dirty="0"/>
-              <a:t>08-Apr-16</a:t>
+              <a:t>4/12/2016</a:t>
             </a:fld>
             <a:endParaRPr lang="en-US" dirty="0"/>
           </a:p>
@@ -4661,7 +4726,7 @@
             <a:fld id="{B61BEF0D-F0BB-DE4B-95CE-6DB70DBA9567}" type="datetimeFigureOut">
               <a:rPr lang="en-US" dirty="0"/>
               <a:pPr/>
-              <a:t>08-Apr-16</a:t>
+              <a:t>4/12/2016</a:t>
             </a:fld>
             <a:endParaRPr lang="en-US" dirty="0"/>
           </a:p>
@@ -4834,7 +4899,7 @@
             <a:fld id="{B61BEF0D-F0BB-DE4B-95CE-6DB70DBA9567}" type="datetimeFigureOut">
               <a:rPr lang="en-US" dirty="0"/>
               <a:pPr/>
-              <a:t>08-Apr-16</a:t>
+              <a:t>4/12/2016</a:t>
             </a:fld>
             <a:endParaRPr lang="en-US" dirty="0"/>
           </a:p>
@@ -5078,7 +5143,7 @@
             <a:fld id="{B61BEF0D-F0BB-DE4B-95CE-6DB70DBA9567}" type="datetimeFigureOut">
               <a:rPr lang="en-US" dirty="0"/>
               <a:pPr/>
-              <a:t>08-Apr-16</a:t>
+              <a:t>4/12/2016</a:t>
             </a:fld>
             <a:endParaRPr lang="en-US" dirty="0"/>
           </a:p>
@@ -5306,7 +5371,7 @@
           <a:p>
             <a:fld id="{EB712588-04B1-427B-82EE-E8DB90309F08}" type="datetimeFigureOut">
               <a:rPr lang="en-US" dirty="0"/>
-              <a:t>08-Apr-16</a:t>
+              <a:t>4/12/2016</a:t>
             </a:fld>
             <a:endParaRPr lang="en-US" dirty="0"/>
           </a:p>
@@ -5676,7 +5741,7 @@
             <a:fld id="{B61BEF0D-F0BB-DE4B-95CE-6DB70DBA9567}" type="datetimeFigureOut">
               <a:rPr lang="en-US" dirty="0"/>
               <a:pPr/>
-              <a:t>08-Apr-16</a:t>
+              <a:t>4/12/2016</a:t>
             </a:fld>
             <a:endParaRPr lang="en-US" dirty="0"/>
           </a:p>
@@ -5796,7 +5861,7 @@
             <a:fld id="{B61BEF0D-F0BB-DE4B-95CE-6DB70DBA9567}" type="datetimeFigureOut">
               <a:rPr lang="en-US" dirty="0"/>
               <a:pPr/>
-              <a:t>08-Apr-16</a:t>
+              <a:t>4/12/2016</a:t>
             </a:fld>
             <a:endParaRPr lang="en-US" dirty="0"/>
           </a:p>
@@ -5888,7 +5953,7 @@
             <a:fld id="{B61BEF0D-F0BB-DE4B-95CE-6DB70DBA9567}" type="datetimeFigureOut">
               <a:rPr lang="en-US" dirty="0"/>
               <a:pPr/>
-              <a:t>08-Apr-16</a:t>
+              <a:t>4/12/2016</a:t>
             </a:fld>
             <a:endParaRPr lang="en-US" dirty="0"/>
           </a:p>
@@ -6139,7 +6204,7 @@
           <a:p>
             <a:fld id="{42A54C80-263E-416B-A8E0-580EDEADCBDC}" type="datetimeFigureOut">
               <a:rPr lang="en-US" dirty="0"/>
-              <a:t>08-Apr-16</a:t>
+              <a:t>4/12/2016</a:t>
             </a:fld>
             <a:endParaRPr lang="en-US" dirty="0"/>
           </a:p>
@@ -6398,7 +6463,7 @@
             <a:fld id="{B61BEF0D-F0BB-DE4B-95CE-6DB70DBA9567}" type="datetimeFigureOut">
               <a:rPr lang="en-US" dirty="0"/>
               <a:pPr/>
-              <a:t>08-Apr-16</a:t>
+              <a:t>4/12/2016</a:t>
             </a:fld>
             <a:endParaRPr lang="en-US" dirty="0"/>
           </a:p>
@@ -7138,7 +7203,7 @@
             <a:fld id="{B61BEF0D-F0BB-DE4B-95CE-6DB70DBA9567}" type="datetimeFigureOut">
               <a:rPr lang="en-US" dirty="0"/>
               <a:pPr/>
-              <a:t>08-Apr-16</a:t>
+              <a:t>4/12/2016</a:t>
             </a:fld>
             <a:endParaRPr lang="en-US" dirty="0"/>
           </a:p>
@@ -9340,13 +9405,6 @@
   <p:clrMapOvr>
     <a:masterClrMapping/>
   </p:clrMapOvr>
-  <p:timing>
-    <p:tnLst>
-      <p:par>
-        <p:cTn id="1" dur="indefinite" restart="never" nodeType="tmRoot"/>
-      </p:par>
-    </p:tnLst>
-  </p:timing>
 </p:sld>
 </file>
 
@@ -9462,10 +9520,9 @@
           </a:lstStyle>
           <a:p>
             <a:r>
-              <a:rPr lang="en-US" dirty="0" smtClean="0"/>
-              <a:t>Deployment models</a:t>
-            </a:r>
-            <a:endParaRPr lang="bg-BG" dirty="0"/>
+              <a:rPr lang="bg-BG" dirty="0"/>
+              <a:t>Модели за разгръщане</a:t>
+            </a:r>
           </a:p>
         </p:txBody>
       </p:sp>
@@ -9509,13 +9566,6 @@
   <p:clrMapOvr>
     <a:masterClrMapping/>
   </p:clrMapOvr>
-  <p:timing>
-    <p:tnLst>
-      <p:par>
-        <p:cTn id="1" dur="indefinite" restart="never" nodeType="tmRoot"/>
-      </p:par>
-    </p:tnLst>
-  </p:timing>
 </p:sld>
 </file>
 
@@ -9631,14 +9681,9 @@
           </a:lstStyle>
           <a:p>
             <a:r>
-              <a:rPr lang="bg-BG" dirty="0" smtClean="0"/>
-              <a:t>Частен </a:t>
-            </a:r>
-            <a:r>
-              <a:rPr lang="en-US" dirty="0" smtClean="0"/>
-              <a:t>cloud</a:t>
-            </a:r>
-            <a:endParaRPr lang="bg-BG" dirty="0"/>
+              <a:rPr lang="bg-BG" dirty="0"/>
+              <a:t>Частен облак</a:t>
+            </a:r>
           </a:p>
         </p:txBody>
       </p:sp>
@@ -9673,10 +9718,10 @@
                   </a:schemeClr>
                 </a:solidFill>
               </a:rPr>
-              <a:t>Основни </a:t>
-            </a:r>
-            <a:r>
-              <a:rPr lang="bg-BG" sz="2400" dirty="0" smtClean="0">
+              <a:t>Основни свойства</a:t>
+            </a:r>
+            <a:r>
+              <a:rPr lang="en-US" sz="2400" dirty="0">
                 <a:solidFill>
                   <a:schemeClr val="tx1">
                     <a:lumMod val="75000"/>
@@ -9684,10 +9729,10 @@
                   </a:schemeClr>
                 </a:solidFill>
               </a:rPr>
-              <a:t>свойства</a:t>
-            </a:r>
-            <a:r>
-              <a:rPr lang="en-US" sz="2400" dirty="0" smtClean="0">
+              <a:t> </a:t>
+            </a:r>
+            <a:r>
+              <a:rPr lang="bg-BG" sz="2400" dirty="0">
                 <a:solidFill>
                   <a:schemeClr val="tx1">
                     <a:lumMod val="75000"/>
@@ -9695,42 +9740,13 @@
                   </a:schemeClr>
                 </a:solidFill>
               </a:rPr>
-              <a:t> </a:t>
-            </a:r>
-            <a:r>
-              <a:rPr lang="bg-BG" sz="2400" dirty="0" smtClean="0">
-                <a:solidFill>
-                  <a:schemeClr val="tx1">
-                    <a:lumMod val="75000"/>
-                    <a:lumOff val="25000"/>
-                  </a:schemeClr>
-                </a:solidFill>
-              </a:rPr>
               <a:t>на частния </a:t>
             </a:r>
             <a:r>
-              <a:rPr lang="en-US" sz="2400" dirty="0" smtClean="0">
-                <a:solidFill>
-                  <a:schemeClr val="tx1">
-                    <a:lumMod val="75000"/>
-                    <a:lumOff val="25000"/>
-                  </a:schemeClr>
-                </a:solidFill>
-              </a:rPr>
-              <a:t>cloud</a:t>
-            </a:r>
-            <a:r>
-              <a:rPr lang="bg-BG" sz="2400" dirty="0" smtClean="0">
-                <a:solidFill>
-                  <a:schemeClr val="tx1">
-                    <a:lumMod val="75000"/>
-                    <a:lumOff val="25000"/>
-                  </a:schemeClr>
-                </a:solidFill>
-              </a:rPr>
-              <a:t>:</a:t>
-            </a:r>
-            <a:endParaRPr lang="en-US" sz="2400" dirty="0" smtClean="0">
+              <a:rPr lang="bg-BG" sz="2400" dirty="0"/>
+              <a:t>облак:</a:t>
+            </a:r>
+            <a:endParaRPr lang="en-US" sz="2400" dirty="0">
               <a:solidFill>
                 <a:schemeClr val="tx1">
                   <a:lumMod val="75000"/>
@@ -9755,7 +9771,7 @@
               </a:tabLst>
             </a:pPr>
             <a:r>
-              <a:rPr lang="bg-BG" sz="2400" dirty="0" smtClean="0">
+              <a:rPr lang="bg-BG" sz="2400" dirty="0">
                 <a:solidFill>
                   <a:schemeClr val="tx1">
                     <a:lumMod val="75000"/>
@@ -9766,7 +9782,7 @@
               <a:t>Предоставя възможност за доставка на целия </a:t>
             </a:r>
             <a:r>
-              <a:rPr lang="en-US" sz="2400" dirty="0" smtClean="0">
+              <a:rPr lang="en-US" sz="2400" dirty="0">
                 <a:solidFill>
                   <a:schemeClr val="tx1">
                     <a:lumMod val="75000"/>
@@ -9777,7 +9793,7 @@
               <a:t>cloud </a:t>
             </a:r>
             <a:r>
-              <a:rPr lang="bg-BG" sz="2400" dirty="0" smtClean="0">
+              <a:rPr lang="bg-BG" sz="2400" dirty="0">
                 <a:solidFill>
                   <a:schemeClr val="tx1">
                     <a:lumMod val="75000"/>
@@ -9788,7 +9804,7 @@
               <a:t>като един </a:t>
             </a:r>
             <a:r>
-              <a:rPr lang="en-US" sz="2400" dirty="0" smtClean="0">
+              <a:rPr lang="en-US" sz="2400" dirty="0">
                 <a:solidFill>
                   <a:schemeClr val="tx1">
                     <a:lumMod val="75000"/>
@@ -9823,7 +9839,7 @@
               </a:tabLst>
             </a:pPr>
             <a:r>
-              <a:rPr lang="bg-BG" sz="2400" dirty="0" smtClean="0">
+              <a:rPr lang="bg-BG" sz="2400" dirty="0">
                 <a:solidFill>
                   <a:schemeClr val="tx1">
                     <a:lumMod val="75000"/>
@@ -9833,14 +9849,6 @@
               </a:rPr>
               <a:t>Разделен е на отделни организации, които се грижат за доставката на ресурси</a:t>
             </a:r>
-            <a:endParaRPr lang="bg-BG" sz="2400" dirty="0" smtClean="0">
-              <a:solidFill>
-                <a:schemeClr val="tx1">
-                  <a:lumMod val="75000"/>
-                  <a:lumOff val="25000"/>
-                </a:schemeClr>
-              </a:solidFill>
-            </a:endParaRPr>
           </a:p>
           <a:p>
             <a:pPr marL="854075" lvl="1" indent="-396875">
@@ -9858,7 +9866,7 @@
               </a:tabLst>
             </a:pPr>
             <a:r>
-              <a:rPr lang="bg-BG" sz="2400" dirty="0" smtClean="0">
+              <a:rPr lang="bg-BG" sz="2400" dirty="0">
                 <a:solidFill>
                   <a:schemeClr val="tx1">
                     <a:lumMod val="75000"/>
@@ -9868,14 +9876,6 @@
               </a:rPr>
               <a:t>Дадена организация има достъп само и единствено до определени ресурси</a:t>
             </a:r>
-            <a:endParaRPr lang="bg-BG" sz="2400" dirty="0">
-              <a:solidFill>
-                <a:schemeClr val="tx1">
-                  <a:lumMod val="75000"/>
-                  <a:lumOff val="25000"/>
-                </a:schemeClr>
-              </a:solidFill>
-            </a:endParaRPr>
           </a:p>
           <a:p>
             <a:pPr marL="854075" lvl="1" indent="-396875">
@@ -9893,7 +9893,7 @@
               </a:tabLst>
             </a:pPr>
             <a:r>
-              <a:rPr lang="bg-BG" sz="2400" dirty="0" smtClean="0">
+              <a:rPr lang="bg-BG" sz="2400" dirty="0">
                 <a:solidFill>
                   <a:schemeClr val="tx1">
                     <a:lumMod val="75000"/>
@@ -9903,14 +9903,6 @@
               </a:rPr>
               <a:t>Идеален за бизнеса, тъй като позволява съхранението на частни данни</a:t>
             </a:r>
-            <a:endParaRPr lang="bg-BG" sz="2400" dirty="0">
-              <a:solidFill>
-                <a:schemeClr val="tx1">
-                  <a:lumMod val="75000"/>
-                  <a:lumOff val="25000"/>
-                </a:schemeClr>
-              </a:solidFill>
-            </a:endParaRPr>
           </a:p>
         </p:txBody>
       </p:sp>
@@ -9924,13 +9916,6 @@
   <p:clrMapOvr>
     <a:masterClrMapping/>
   </p:clrMapOvr>
-  <p:timing>
-    <p:tnLst>
-      <p:par>
-        <p:cTn id="1" dur="indefinite" restart="never" nodeType="tmRoot"/>
-      </p:par>
-    </p:tnLst>
-  </p:timing>
 </p:sld>
 </file>
 
@@ -10046,14 +10031,9 @@
           </a:lstStyle>
           <a:p>
             <a:r>
-              <a:rPr lang="bg-BG" dirty="0" smtClean="0"/>
-              <a:t>Частен </a:t>
-            </a:r>
-            <a:r>
-              <a:rPr lang="en-US" dirty="0" smtClean="0"/>
-              <a:t>cloud</a:t>
-            </a:r>
-            <a:endParaRPr lang="bg-BG" dirty="0"/>
+              <a:rPr lang="bg-BG" dirty="0"/>
+              <a:t>Частен облак</a:t>
+            </a:r>
           </a:p>
         </p:txBody>
       </p:sp>
@@ -10080,7 +10060,7 @@
           <a:lstStyle/>
           <a:p>
             <a:r>
-              <a:rPr lang="bg-BG" sz="2400" dirty="0" smtClean="0">
+              <a:rPr lang="bg-BG" sz="2400" dirty="0">
                 <a:solidFill>
                   <a:schemeClr val="tx1">
                     <a:lumMod val="75000"/>
@@ -10091,7 +10071,7 @@
               <a:t>Предимства на</a:t>
             </a:r>
             <a:r>
-              <a:rPr lang="en-US" sz="2400" dirty="0" smtClean="0">
+              <a:rPr lang="en-US" sz="2400" dirty="0">
                 <a:solidFill>
                   <a:schemeClr val="tx1">
                     <a:lumMod val="75000"/>
@@ -10102,7 +10082,7 @@
               <a:t> </a:t>
             </a:r>
             <a:r>
-              <a:rPr lang="bg-BG" sz="2400" dirty="0" smtClean="0">
+              <a:rPr lang="bg-BG" sz="2400" dirty="0">
                 <a:solidFill>
                   <a:schemeClr val="tx1">
                     <a:lumMod val="75000"/>
@@ -10113,7 +10093,11 @@
               <a:t>частния </a:t>
             </a:r>
             <a:r>
-              <a:rPr lang="en-US" sz="2400" dirty="0" smtClean="0">
+              <a:rPr lang="bg-BG" sz="2400" dirty="0"/>
+              <a:t>облак</a:t>
+            </a:r>
+            <a:r>
+              <a:rPr lang="bg-BG" sz="2400" dirty="0">
                 <a:solidFill>
                   <a:schemeClr val="tx1">
                     <a:lumMod val="75000"/>
@@ -10121,20 +10105,9 @@
                   </a:schemeClr>
                 </a:solidFill>
               </a:rPr>
-              <a:t>cloud</a:t>
-            </a:r>
-            <a:r>
-              <a:rPr lang="bg-BG" sz="2400" dirty="0" smtClean="0">
-                <a:solidFill>
-                  <a:schemeClr val="tx1">
-                    <a:lumMod val="75000"/>
-                    <a:lumOff val="25000"/>
-                  </a:schemeClr>
-                </a:solidFill>
-              </a:rPr>
               <a:t>:</a:t>
             </a:r>
-            <a:endParaRPr lang="en-US" sz="2400" dirty="0" smtClean="0">
+            <a:endParaRPr lang="en-US" sz="2400" dirty="0">
               <a:solidFill>
                 <a:schemeClr val="tx1">
                   <a:lumMod val="75000"/>
@@ -10159,7 +10132,7 @@
               </a:tabLst>
             </a:pPr>
             <a:r>
-              <a:rPr lang="bg-BG" sz="2400" dirty="0" smtClean="0">
+              <a:rPr lang="bg-BG" sz="2400" dirty="0">
                 <a:solidFill>
                   <a:schemeClr val="tx1">
                     <a:lumMod val="75000"/>
@@ -10186,7 +10159,7 @@
               </a:tabLst>
             </a:pPr>
             <a:r>
-              <a:rPr lang="bg-BG" sz="2400" dirty="0" smtClean="0">
+              <a:rPr lang="bg-BG" sz="2400" dirty="0">
                 <a:solidFill>
                   <a:schemeClr val="tx1">
                     <a:lumMod val="75000"/>
@@ -10196,14 +10169,6 @@
               </a:rPr>
               <a:t>По-голям контрол</a:t>
             </a:r>
-            <a:endParaRPr lang="bg-BG" sz="2400" dirty="0" smtClean="0">
-              <a:solidFill>
-                <a:schemeClr val="tx1">
-                  <a:lumMod val="75000"/>
-                  <a:lumOff val="25000"/>
-                </a:schemeClr>
-              </a:solidFill>
-            </a:endParaRPr>
           </a:p>
           <a:p>
             <a:pPr marL="854075" lvl="1" indent="-396875">
@@ -10221,7 +10186,7 @@
               </a:tabLst>
             </a:pPr>
             <a:r>
-              <a:rPr lang="bg-BG" sz="2400" dirty="0" smtClean="0">
+              <a:rPr lang="bg-BG" sz="2400" dirty="0">
                 <a:solidFill>
                   <a:schemeClr val="tx1">
                     <a:lumMod val="75000"/>
@@ -10231,14 +10196,6 @@
               </a:rPr>
               <a:t>По-евтино</a:t>
             </a:r>
-            <a:endParaRPr lang="bg-BG" sz="2400" dirty="0">
-              <a:solidFill>
-                <a:schemeClr val="tx1">
-                  <a:lumMod val="75000"/>
-                  <a:lumOff val="25000"/>
-                </a:schemeClr>
-              </a:solidFill>
-            </a:endParaRPr>
           </a:p>
           <a:p>
             <a:pPr marL="854075" lvl="1" indent="-396875">
@@ -10256,7 +10213,7 @@
               </a:tabLst>
             </a:pPr>
             <a:r>
-              <a:rPr lang="bg-BG" sz="2400" dirty="0" smtClean="0">
+              <a:rPr lang="bg-BG" sz="2400" dirty="0">
                 <a:solidFill>
                   <a:schemeClr val="tx1">
                     <a:lumMod val="75000"/>
@@ -10283,7 +10240,7 @@
               </a:tabLst>
             </a:pPr>
             <a:r>
-              <a:rPr lang="bg-BG" sz="2400" dirty="0" smtClean="0">
+              <a:rPr lang="bg-BG" sz="2400" dirty="0">
                 <a:solidFill>
                   <a:schemeClr val="tx1">
                     <a:lumMod val="75000"/>
@@ -10347,13 +10304,6 @@
   <p:clrMapOvr>
     <a:masterClrMapping/>
   </p:clrMapOvr>
-  <p:timing>
-    <p:tnLst>
-      <p:par>
-        <p:cTn id="1" dur="indefinite" restart="never" nodeType="tmRoot"/>
-      </p:par>
-    </p:tnLst>
-  </p:timing>
 </p:sld>
 </file>
 
@@ -10469,14 +10419,9 @@
           </a:lstStyle>
           <a:p>
             <a:r>
-              <a:rPr lang="bg-BG" dirty="0" smtClean="0"/>
-              <a:t>Публичен </a:t>
-            </a:r>
-            <a:r>
-              <a:rPr lang="en-US" dirty="0" smtClean="0"/>
-              <a:t>cloud</a:t>
-            </a:r>
-            <a:endParaRPr lang="bg-BG" dirty="0"/>
+              <a:rPr lang="bg-BG" dirty="0"/>
+              <a:t>Публичен облак</a:t>
+            </a:r>
           </a:p>
         </p:txBody>
       </p:sp>
@@ -10511,10 +10456,10 @@
                   </a:schemeClr>
                 </a:solidFill>
               </a:rPr>
-              <a:t>Основни </a:t>
-            </a:r>
-            <a:r>
-              <a:rPr lang="bg-BG" sz="2400" dirty="0" smtClean="0">
+              <a:t>Основни свойства</a:t>
+            </a:r>
+            <a:r>
+              <a:rPr lang="en-US" sz="2400" dirty="0">
                 <a:solidFill>
                   <a:schemeClr val="tx1">
                     <a:lumMod val="75000"/>
@@ -10522,10 +10467,10 @@
                   </a:schemeClr>
                 </a:solidFill>
               </a:rPr>
-              <a:t>свойства</a:t>
-            </a:r>
-            <a:r>
-              <a:rPr lang="en-US" sz="2400" dirty="0" smtClean="0">
+              <a:t> </a:t>
+            </a:r>
+            <a:r>
+              <a:rPr lang="bg-BG" sz="2400" dirty="0">
                 <a:solidFill>
                   <a:schemeClr val="tx1">
                     <a:lumMod val="75000"/>
@@ -10533,10 +10478,14 @@
                   </a:schemeClr>
                 </a:solidFill>
               </a:rPr>
-              <a:t> </a:t>
-            </a:r>
-            <a:r>
-              <a:rPr lang="bg-BG" sz="2400" dirty="0" smtClean="0">
+              <a:t>на публичния </a:t>
+            </a:r>
+            <a:r>
+              <a:rPr lang="bg-BG" sz="2400" dirty="0"/>
+              <a:t>облак</a:t>
+            </a:r>
+            <a:r>
+              <a:rPr lang="bg-BG" sz="2400" dirty="0">
                 <a:solidFill>
                   <a:schemeClr val="tx1">
                     <a:lumMod val="75000"/>
@@ -10544,31 +10493,9 @@
                   </a:schemeClr>
                 </a:solidFill>
               </a:rPr>
-              <a:t>на публичния </a:t>
-            </a:r>
-            <a:r>
-              <a:rPr lang="en-US" sz="2400" dirty="0" smtClean="0">
-                <a:solidFill>
-                  <a:schemeClr val="tx1">
-                    <a:lumMod val="75000"/>
-                    <a:lumOff val="25000"/>
-                  </a:schemeClr>
-                </a:solidFill>
-              </a:rPr>
-              <a:t>cloud</a:t>
-            </a:r>
-            <a:r>
-              <a:rPr lang="bg-BG" sz="2400" dirty="0" smtClean="0">
-                <a:solidFill>
-                  <a:schemeClr val="tx1">
-                    <a:lumMod val="75000"/>
-                    <a:lumOff val="25000"/>
-                  </a:schemeClr>
-                </a:solidFill>
-              </a:rPr>
               <a:t>:</a:t>
             </a:r>
-            <a:endParaRPr lang="en-US" sz="2400" dirty="0" smtClean="0">
+            <a:endParaRPr lang="en-US" sz="2400" dirty="0">
               <a:solidFill>
                 <a:schemeClr val="tx1">
                   <a:lumMod val="75000"/>
@@ -10593,7 +10520,7 @@
               </a:tabLst>
             </a:pPr>
             <a:r>
-              <a:rPr lang="bg-BG" sz="2400" dirty="0" smtClean="0">
+              <a:rPr lang="bg-BG" sz="2400" dirty="0">
                 <a:solidFill>
                   <a:schemeClr val="tx1">
                     <a:lumMod val="75000"/>
@@ -10603,14 +10530,6 @@
               </a:rPr>
               <a:t>Предоставя услуги, които се съхраняват в публичното пространство</a:t>
             </a:r>
-            <a:endParaRPr lang="bg-BG" sz="2400" dirty="0">
-              <a:solidFill>
-                <a:schemeClr val="tx1">
-                  <a:lumMod val="75000"/>
-                  <a:lumOff val="25000"/>
-                </a:schemeClr>
-              </a:solidFill>
-            </a:endParaRPr>
           </a:p>
           <a:p>
             <a:pPr marL="854075" lvl="1" indent="-396875">
@@ -10628,7 +10547,7 @@
               </a:tabLst>
             </a:pPr>
             <a:r>
-              <a:rPr lang="bg-BG" sz="2400" dirty="0" smtClean="0">
+              <a:rPr lang="bg-BG" sz="2400" dirty="0">
                 <a:solidFill>
                   <a:schemeClr val="tx1">
                     <a:lumMod val="75000"/>
@@ -10638,14 +10557,6 @@
               </a:rPr>
               <a:t>Предоставя достъп на услуги до всички клиенти на една и съща инфраструктура</a:t>
             </a:r>
-            <a:endParaRPr lang="bg-BG" sz="2400" dirty="0" smtClean="0">
-              <a:solidFill>
-                <a:schemeClr val="tx1">
-                  <a:lumMod val="75000"/>
-                  <a:lumOff val="25000"/>
-                </a:schemeClr>
-              </a:solidFill>
-            </a:endParaRPr>
           </a:p>
           <a:p>
             <a:pPr marL="854075" lvl="1" indent="-396875">
@@ -10663,7 +10574,7 @@
               </a:tabLst>
             </a:pPr>
             <a:r>
-              <a:rPr lang="bg-BG" sz="2400" dirty="0" smtClean="0">
+              <a:rPr lang="bg-BG" sz="2400" dirty="0">
                 <a:solidFill>
                   <a:schemeClr val="tx1">
                     <a:lumMod val="75000"/>
@@ -10673,14 +10584,6 @@
               </a:rPr>
               <a:t>Предоставя се на потребители, които нямат нужда от висока сигурност</a:t>
             </a:r>
-            <a:endParaRPr lang="bg-BG" sz="2400" dirty="0">
-              <a:solidFill>
-                <a:schemeClr val="tx1">
-                  <a:lumMod val="75000"/>
-                  <a:lumOff val="25000"/>
-                </a:schemeClr>
-              </a:solidFill>
-            </a:endParaRPr>
           </a:p>
           <a:p>
             <a:pPr marL="854075" lvl="1" indent="-396875">
@@ -10698,7 +10601,7 @@
               </a:tabLst>
             </a:pPr>
             <a:r>
-              <a:rPr lang="bg-BG" sz="2400" dirty="0" smtClean="0">
+              <a:rPr lang="bg-BG" sz="2400" dirty="0">
                 <a:solidFill>
                   <a:schemeClr val="tx1">
                     <a:lumMod val="75000"/>
@@ -10708,14 +10611,6 @@
               </a:rPr>
               <a:t>Всичко е публично</a:t>
             </a:r>
-            <a:endParaRPr lang="bg-BG" sz="2400" dirty="0">
-              <a:solidFill>
-                <a:schemeClr val="tx1">
-                  <a:lumMod val="75000"/>
-                  <a:lumOff val="25000"/>
-                </a:schemeClr>
-              </a:solidFill>
-            </a:endParaRPr>
           </a:p>
         </p:txBody>
       </p:sp>
@@ -10729,13 +10624,6 @@
   <p:clrMapOvr>
     <a:masterClrMapping/>
   </p:clrMapOvr>
-  <p:timing>
-    <p:tnLst>
-      <p:par>
-        <p:cTn id="1" dur="indefinite" restart="never" nodeType="tmRoot"/>
-      </p:par>
-    </p:tnLst>
-  </p:timing>
 </p:sld>
 </file>
 
@@ -10851,14 +10739,9 @@
           </a:lstStyle>
           <a:p>
             <a:r>
-              <a:rPr lang="bg-BG" dirty="0" smtClean="0"/>
-              <a:t>Публичен </a:t>
-            </a:r>
-            <a:r>
-              <a:rPr lang="en-US" dirty="0" smtClean="0"/>
-              <a:t>cloud</a:t>
-            </a:r>
-            <a:endParaRPr lang="bg-BG" dirty="0"/>
+              <a:rPr lang="bg-BG" dirty="0"/>
+              <a:t>Публичен облак</a:t>
+            </a:r>
           </a:p>
         </p:txBody>
       </p:sp>
@@ -10885,7 +10768,7 @@
           <a:lstStyle/>
           <a:p>
             <a:r>
-              <a:rPr lang="bg-BG" sz="2400" dirty="0" smtClean="0">
+              <a:rPr lang="bg-BG" sz="2400" dirty="0">
                 <a:solidFill>
                   <a:schemeClr val="tx1">
                     <a:lumMod val="75000"/>
@@ -10896,7 +10779,7 @@
               <a:t>Предимства на</a:t>
             </a:r>
             <a:r>
-              <a:rPr lang="en-US" sz="2400" dirty="0" smtClean="0">
+              <a:rPr lang="en-US" sz="2400" dirty="0">
                 <a:solidFill>
                   <a:schemeClr val="tx1">
                     <a:lumMod val="75000"/>
@@ -10907,7 +10790,7 @@
               <a:t> </a:t>
             </a:r>
             <a:r>
-              <a:rPr lang="bg-BG" sz="2400" dirty="0" smtClean="0">
+              <a:rPr lang="bg-BG" sz="2400" dirty="0">
                 <a:solidFill>
                   <a:schemeClr val="tx1">
                     <a:lumMod val="75000"/>
@@ -10918,7 +10801,11 @@
               <a:t>публичния </a:t>
             </a:r>
             <a:r>
-              <a:rPr lang="en-US" sz="2400" dirty="0" smtClean="0">
+              <a:rPr lang="bg-BG" sz="2400" dirty="0"/>
+              <a:t>облак</a:t>
+            </a:r>
+            <a:r>
+              <a:rPr lang="bg-BG" sz="2400" dirty="0">
                 <a:solidFill>
                   <a:schemeClr val="tx1">
                     <a:lumMod val="75000"/>
@@ -10926,20 +10813,9 @@
                   </a:schemeClr>
                 </a:solidFill>
               </a:rPr>
-              <a:t>cloud</a:t>
-            </a:r>
-            <a:r>
-              <a:rPr lang="bg-BG" sz="2400" dirty="0" smtClean="0">
-                <a:solidFill>
-                  <a:schemeClr val="tx1">
-                    <a:lumMod val="75000"/>
-                    <a:lumOff val="25000"/>
-                  </a:schemeClr>
-                </a:solidFill>
-              </a:rPr>
               <a:t>:</a:t>
             </a:r>
-            <a:endParaRPr lang="en-US" sz="2400" dirty="0" smtClean="0">
+            <a:endParaRPr lang="en-US" sz="2400" dirty="0">
               <a:solidFill>
                 <a:schemeClr val="tx1">
                   <a:lumMod val="75000"/>
@@ -10964,7 +10840,7 @@
               </a:tabLst>
             </a:pPr>
             <a:r>
-              <a:rPr lang="bg-BG" sz="2400" dirty="0" smtClean="0">
+              <a:rPr lang="bg-BG" sz="2400" dirty="0">
                 <a:solidFill>
                   <a:schemeClr val="tx1">
                     <a:lumMod val="75000"/>
@@ -10975,7 +10851,7 @@
               <a:t>Много добра </a:t>
             </a:r>
             <a:r>
-              <a:rPr lang="bg-BG" sz="2400" dirty="0" err="1" smtClean="0">
+              <a:rPr lang="bg-BG" sz="2400" dirty="0" err="1">
                 <a:solidFill>
                   <a:schemeClr val="tx1">
                     <a:lumMod val="75000"/>
@@ -10985,7 +10861,7 @@
               </a:rPr>
               <a:t>мащабируемост</a:t>
             </a:r>
-            <a:endParaRPr lang="bg-BG" sz="2400" dirty="0" smtClean="0">
+            <a:endParaRPr lang="bg-BG" sz="2400" dirty="0">
               <a:solidFill>
                 <a:schemeClr val="tx1">
                   <a:lumMod val="75000"/>
@@ -11010,7 +10886,7 @@
               </a:tabLst>
             </a:pPr>
             <a:r>
-              <a:rPr lang="bg-BG" sz="2400" dirty="0" smtClean="0">
+              <a:rPr lang="bg-BG" sz="2400" dirty="0">
                 <a:solidFill>
                   <a:schemeClr val="tx1">
                     <a:lumMod val="75000"/>
@@ -11020,14 +10896,6 @@
               </a:rPr>
               <a:t>Удобство в избора на услуги за ползване</a:t>
             </a:r>
-            <a:endParaRPr lang="bg-BG" sz="2400" dirty="0" smtClean="0">
-              <a:solidFill>
-                <a:schemeClr val="tx1">
-                  <a:lumMod val="75000"/>
-                  <a:lumOff val="25000"/>
-                </a:schemeClr>
-              </a:solidFill>
-            </a:endParaRPr>
           </a:p>
           <a:p>
             <a:pPr marL="854075" lvl="1" indent="-396875">
@@ -11045,7 +10913,7 @@
               </a:tabLst>
             </a:pPr>
             <a:r>
-              <a:rPr lang="bg-BG" sz="2400" dirty="0" smtClean="0">
+              <a:rPr lang="bg-BG" sz="2400" dirty="0">
                 <a:solidFill>
                   <a:schemeClr val="tx1">
                     <a:lumMod val="75000"/>
@@ -11055,14 +10923,6 @@
               </a:rPr>
               <a:t>Надеждност</a:t>
             </a:r>
-            <a:endParaRPr lang="bg-BG" sz="2400" dirty="0">
-              <a:solidFill>
-                <a:schemeClr val="tx1">
-                  <a:lumMod val="75000"/>
-                  <a:lumOff val="25000"/>
-                </a:schemeClr>
-              </a:solidFill>
-            </a:endParaRPr>
           </a:p>
           <a:p>
             <a:pPr marL="854075" lvl="1" indent="-396875">
@@ -11080,7 +10940,7 @@
               </a:tabLst>
             </a:pPr>
             <a:r>
-              <a:rPr lang="bg-BG" sz="2400" dirty="0" smtClean="0">
+              <a:rPr lang="bg-BG" sz="2400" dirty="0">
                 <a:solidFill>
                   <a:schemeClr val="tx1">
                     <a:lumMod val="75000"/>
@@ -11107,7 +10967,7 @@
               </a:tabLst>
             </a:pPr>
             <a:r>
-              <a:rPr lang="bg-BG" sz="2400" dirty="0" smtClean="0">
+              <a:rPr lang="bg-BG" sz="2400" dirty="0">
                 <a:solidFill>
                   <a:schemeClr val="tx1">
                     <a:lumMod val="75000"/>
@@ -11160,13 +11020,6 @@
   <p:clrMapOvr>
     <a:masterClrMapping/>
   </p:clrMapOvr>
-  <p:timing>
-    <p:tnLst>
-      <p:par>
-        <p:cTn id="1" dur="indefinite" restart="never" nodeType="tmRoot"/>
-      </p:par>
-    </p:tnLst>
-  </p:timing>
 </p:sld>
 </file>
 
@@ -11597,9 +11450,10 @@
           </a:p>
           <a:p>
             <a:r>
-              <a:rPr lang="en-US" sz="2000" dirty="0"/>
-              <a:t>Deployment models</a:t>
-            </a:r>
+              <a:rPr lang="bg-BG" sz="2000" dirty="0"/>
+              <a:t>Модели за разгръщане</a:t>
+            </a:r>
+            <a:endParaRPr lang="en-US" sz="2000" dirty="0"/>
           </a:p>
           <a:p>
             <a:pPr lvl="1">
@@ -11611,8 +11465,13 @@
             </a:r>
             <a:r>
               <a:rPr lang="en-US" sz="2000" dirty="0"/>
-              <a:t> cloud</a:t>
-            </a:r>
+              <a:t> </a:t>
+            </a:r>
+            <a:r>
+              <a:rPr lang="bg-BG" sz="2000" dirty="0"/>
+              <a:t>облак</a:t>
+            </a:r>
+            <a:endParaRPr lang="en-US" sz="2000" dirty="0"/>
           </a:p>
           <a:p>
             <a:pPr lvl="1">
@@ -11624,8 +11483,13 @@
             </a:r>
             <a:r>
               <a:rPr lang="en-US" sz="2000" dirty="0"/>
-              <a:t> cloud</a:t>
-            </a:r>
+              <a:t> </a:t>
+            </a:r>
+            <a:r>
+              <a:rPr lang="bg-BG" sz="2000" dirty="0"/>
+              <a:t>облак</a:t>
+            </a:r>
+            <a:endParaRPr lang="en-US" sz="2000" dirty="0"/>
           </a:p>
           <a:p>
             <a:pPr lvl="1">
@@ -11637,9 +11501,12 @@
             </a:r>
             <a:r>
               <a:rPr lang="en-US" sz="2000" dirty="0"/>
-              <a:t> cloud</a:t>
-            </a:r>
-            <a:endParaRPr lang="bg-BG" sz="2000" dirty="0"/>
+              <a:t> </a:t>
+            </a:r>
+            <a:r>
+              <a:rPr lang="bg-BG" sz="2000" dirty="0"/>
+              <a:t>облак</a:t>
+            </a:r>
           </a:p>
           <a:p>
             <a:pPr lvl="1">
@@ -11647,13 +11514,8 @@
             </a:pPr>
             <a:r>
               <a:rPr lang="bg-BG" sz="2000" dirty="0"/>
-              <a:t>Общностен </a:t>
-            </a:r>
-            <a:r>
-              <a:rPr lang="en-US" sz="2000" dirty="0" smtClean="0"/>
-              <a:t>cloud</a:t>
-            </a:r>
-            <a:endParaRPr lang="bg-BG" sz="2000" dirty="0"/>
+              <a:t>Общностен облак</a:t>
+            </a:r>
           </a:p>
           <a:p>
             <a:r>
@@ -11808,14 +11670,9 @@
           </a:lstStyle>
           <a:p>
             <a:r>
-              <a:rPr lang="bg-BG" dirty="0" smtClean="0"/>
-              <a:t>Хибриден </a:t>
-            </a:r>
-            <a:r>
-              <a:rPr lang="en-US" dirty="0" smtClean="0"/>
-              <a:t>cloud</a:t>
-            </a:r>
-            <a:endParaRPr lang="bg-BG" dirty="0"/>
+              <a:rPr lang="bg-BG" dirty="0"/>
+              <a:t>Хибриден облак</a:t>
+            </a:r>
           </a:p>
         </p:txBody>
       </p:sp>
@@ -11850,10 +11707,10 @@
                   </a:schemeClr>
                 </a:solidFill>
               </a:rPr>
-              <a:t>Основни </a:t>
-            </a:r>
-            <a:r>
-              <a:rPr lang="bg-BG" sz="2400" dirty="0" smtClean="0">
+              <a:t>Основни свойства</a:t>
+            </a:r>
+            <a:r>
+              <a:rPr lang="en-US" sz="2400" dirty="0">
                 <a:solidFill>
                   <a:schemeClr val="tx1">
                     <a:lumMod val="75000"/>
@@ -11861,10 +11718,10 @@
                   </a:schemeClr>
                 </a:solidFill>
               </a:rPr>
-              <a:t>свойства</a:t>
-            </a:r>
-            <a:r>
-              <a:rPr lang="en-US" sz="2400" dirty="0" smtClean="0">
+              <a:t> </a:t>
+            </a:r>
+            <a:r>
+              <a:rPr lang="bg-BG" sz="2400" dirty="0">
                 <a:solidFill>
                   <a:schemeClr val="tx1">
                     <a:lumMod val="75000"/>
@@ -11872,10 +11729,14 @@
                   </a:schemeClr>
                 </a:solidFill>
               </a:rPr>
-              <a:t> </a:t>
-            </a:r>
-            <a:r>
-              <a:rPr lang="bg-BG" sz="2400" dirty="0" smtClean="0">
+              <a:t>на публичния </a:t>
+            </a:r>
+            <a:r>
+              <a:rPr lang="bg-BG" sz="2400" dirty="0"/>
+              <a:t>облак</a:t>
+            </a:r>
+            <a:r>
+              <a:rPr lang="bg-BG" sz="2400" dirty="0">
                 <a:solidFill>
                   <a:schemeClr val="tx1">
                     <a:lumMod val="75000"/>
@@ -11883,31 +11744,9 @@
                   </a:schemeClr>
                 </a:solidFill>
               </a:rPr>
-              <a:t>на публичния </a:t>
-            </a:r>
-            <a:r>
-              <a:rPr lang="en-US" sz="2400" dirty="0" smtClean="0">
-                <a:solidFill>
-                  <a:schemeClr val="tx1">
-                    <a:lumMod val="75000"/>
-                    <a:lumOff val="25000"/>
-                  </a:schemeClr>
-                </a:solidFill>
-              </a:rPr>
-              <a:t>cloud</a:t>
-            </a:r>
-            <a:r>
-              <a:rPr lang="bg-BG" sz="2400" dirty="0" smtClean="0">
-                <a:solidFill>
-                  <a:schemeClr val="tx1">
-                    <a:lumMod val="75000"/>
-                    <a:lumOff val="25000"/>
-                  </a:schemeClr>
-                </a:solidFill>
-              </a:rPr>
               <a:t>:</a:t>
             </a:r>
-            <a:endParaRPr lang="en-US" sz="2400" dirty="0" smtClean="0">
+            <a:endParaRPr lang="en-US" sz="2400" dirty="0">
               <a:solidFill>
                 <a:schemeClr val="tx1">
                   <a:lumMod val="75000"/>
@@ -11932,7 +11771,7 @@
               </a:tabLst>
             </a:pPr>
             <a:r>
-              <a:rPr lang="bg-BG" sz="2400" dirty="0" smtClean="0">
+              <a:rPr lang="bg-BG" sz="2400" dirty="0">
                 <a:solidFill>
                   <a:schemeClr val="tx1">
                     <a:lumMod val="75000"/>
@@ -11943,15 +11782,8 @@
               <a:t>Представлява смесица между частен и публичен </a:t>
             </a:r>
             <a:r>
-              <a:rPr lang="en-US" sz="2400" dirty="0" smtClean="0">
-                <a:solidFill>
-                  <a:schemeClr val="tx1">
-                    <a:lumMod val="75000"/>
-                    <a:lumOff val="25000"/>
-                  </a:schemeClr>
-                </a:solidFill>
-              </a:rPr>
-              <a:t>cloud</a:t>
+              <a:rPr lang="bg-BG" sz="2400" dirty="0"/>
+              <a:t>облак</a:t>
             </a:r>
             <a:endParaRPr lang="bg-BG" sz="2400" dirty="0">
               <a:solidFill>
@@ -11978,7 +11810,7 @@
               </a:tabLst>
             </a:pPr>
             <a:r>
-              <a:rPr lang="bg-BG" sz="2400" dirty="0" smtClean="0">
+              <a:rPr lang="bg-BG" sz="2400" dirty="0">
                 <a:solidFill>
                   <a:schemeClr val="tx1">
                     <a:lumMod val="75000"/>
@@ -11989,17 +11821,10 @@
               <a:t>Има възможност за ползване както като публичен, така и като частен </a:t>
             </a:r>
             <a:r>
-              <a:rPr lang="en-US" sz="2400" dirty="0" smtClean="0">
-                <a:solidFill>
-                  <a:schemeClr val="tx1">
-                    <a:lumMod val="75000"/>
-                    <a:lumOff val="25000"/>
-                  </a:schemeClr>
-                </a:solidFill>
-              </a:rPr>
-              <a:t>cloud</a:t>
-            </a:r>
-            <a:endParaRPr lang="bg-BG" sz="2400" dirty="0" smtClean="0">
+              <a:rPr lang="bg-BG" sz="2400" dirty="0"/>
+              <a:t>облак</a:t>
+            </a:r>
+            <a:endParaRPr lang="bg-BG" sz="2400" dirty="0">
               <a:solidFill>
                 <a:schemeClr val="tx1">
                   <a:lumMod val="75000"/>
@@ -12024,7 +11849,7 @@
               </a:tabLst>
             </a:pPr>
             <a:r>
-              <a:rPr lang="bg-BG" sz="2400" dirty="0" smtClean="0">
+              <a:rPr lang="bg-BG" sz="2400" dirty="0">
                 <a:solidFill>
                   <a:schemeClr val="tx1">
                     <a:lumMod val="75000"/>
@@ -12034,14 +11859,6 @@
               </a:rPr>
               <a:t>Използва се най-често, когато потребителят иска висока сигурност на данните, но и достъпност на продуктите от всяко място и по всяко време</a:t>
             </a:r>
-            <a:endParaRPr lang="bg-BG" sz="2400" dirty="0">
-              <a:solidFill>
-                <a:schemeClr val="tx1">
-                  <a:lumMod val="75000"/>
-                  <a:lumOff val="25000"/>
-                </a:schemeClr>
-              </a:solidFill>
-            </a:endParaRPr>
           </a:p>
         </p:txBody>
       </p:sp>
@@ -12055,13 +11872,6 @@
   <p:clrMapOvr>
     <a:masterClrMapping/>
   </p:clrMapOvr>
-  <p:timing>
-    <p:tnLst>
-      <p:par>
-        <p:cTn id="1" dur="indefinite" restart="never" nodeType="tmRoot"/>
-      </p:par>
-    </p:tnLst>
-  </p:timing>
 </p:sld>
 </file>
 
@@ -12177,14 +11987,9 @@
           </a:lstStyle>
           <a:p>
             <a:r>
-              <a:rPr lang="bg-BG" dirty="0" smtClean="0"/>
-              <a:t>Хибриден </a:t>
-            </a:r>
-            <a:r>
-              <a:rPr lang="en-US" dirty="0" smtClean="0"/>
-              <a:t>cloud</a:t>
-            </a:r>
-            <a:endParaRPr lang="bg-BG" dirty="0"/>
+              <a:rPr lang="bg-BG" dirty="0"/>
+              <a:t>Хибриден облак</a:t>
+            </a:r>
           </a:p>
         </p:txBody>
       </p:sp>
@@ -12211,7 +12016,7 @@
           <a:lstStyle/>
           <a:p>
             <a:r>
-              <a:rPr lang="bg-BG" sz="2400" dirty="0" smtClean="0">
+              <a:rPr lang="bg-BG" sz="2400" dirty="0">
                 <a:solidFill>
                   <a:schemeClr val="tx1">
                     <a:lumMod val="75000"/>
@@ -12222,7 +12027,7 @@
               <a:t>Предимства на</a:t>
             </a:r>
             <a:r>
-              <a:rPr lang="en-US" sz="2400" dirty="0" smtClean="0">
+              <a:rPr lang="en-US" sz="2400" dirty="0">
                 <a:solidFill>
                   <a:schemeClr val="tx1">
                     <a:lumMod val="75000"/>
@@ -12233,7 +12038,7 @@
               <a:t> </a:t>
             </a:r>
             <a:r>
-              <a:rPr lang="bg-BG" sz="2400" dirty="0" smtClean="0">
+              <a:rPr lang="bg-BG" sz="2400" dirty="0">
                 <a:solidFill>
                   <a:schemeClr val="tx1">
                     <a:lumMod val="75000"/>
@@ -12244,7 +12049,11 @@
               <a:t>хибридния </a:t>
             </a:r>
             <a:r>
-              <a:rPr lang="en-US" sz="2400" dirty="0" smtClean="0">
+              <a:rPr lang="bg-BG" sz="2400" dirty="0"/>
+              <a:t>облак</a:t>
+            </a:r>
+            <a:r>
+              <a:rPr lang="bg-BG" sz="2400" dirty="0">
                 <a:solidFill>
                   <a:schemeClr val="tx1">
                     <a:lumMod val="75000"/>
@@ -12252,20 +12061,9 @@
                   </a:schemeClr>
                 </a:solidFill>
               </a:rPr>
-              <a:t>cloud</a:t>
-            </a:r>
-            <a:r>
-              <a:rPr lang="bg-BG" sz="2400" dirty="0" smtClean="0">
-                <a:solidFill>
-                  <a:schemeClr val="tx1">
-                    <a:lumMod val="75000"/>
-                    <a:lumOff val="25000"/>
-                  </a:schemeClr>
-                </a:solidFill>
-              </a:rPr>
               <a:t>:</a:t>
             </a:r>
-            <a:endParaRPr lang="en-US" sz="2400" dirty="0" smtClean="0">
+            <a:endParaRPr lang="en-US" sz="2400" dirty="0">
               <a:solidFill>
                 <a:schemeClr val="tx1">
                   <a:lumMod val="75000"/>
@@ -12290,7 +12088,7 @@
               </a:tabLst>
             </a:pPr>
             <a:r>
-              <a:rPr lang="bg-BG" sz="2400" dirty="0" smtClean="0">
+              <a:rPr lang="bg-BG" sz="2400" dirty="0">
                 <a:solidFill>
                   <a:schemeClr val="tx1">
                     <a:lumMod val="75000"/>
@@ -12301,17 +12099,10 @@
               <a:t>Обединява повечето предимства на публични и частния </a:t>
             </a:r>
             <a:r>
-              <a:rPr lang="en-US" sz="2400" dirty="0" smtClean="0">
-                <a:solidFill>
-                  <a:schemeClr val="tx1">
-                    <a:lumMod val="75000"/>
-                    <a:lumOff val="25000"/>
-                  </a:schemeClr>
-                </a:solidFill>
-              </a:rPr>
-              <a:t>cloud</a:t>
-            </a:r>
-            <a:endParaRPr lang="bg-BG" sz="2400" dirty="0" smtClean="0">
+              <a:rPr lang="bg-BG" sz="2400" dirty="0"/>
+              <a:t>облак</a:t>
+            </a:r>
+            <a:endParaRPr lang="bg-BG" sz="2400" dirty="0">
               <a:solidFill>
                 <a:schemeClr val="tx1">
                   <a:lumMod val="75000"/>
@@ -12336,7 +12127,7 @@
               </a:tabLst>
             </a:pPr>
             <a:r>
-              <a:rPr lang="bg-BG" sz="2400" dirty="0" err="1" smtClean="0">
+              <a:rPr lang="bg-BG" sz="2400" dirty="0" err="1">
                 <a:solidFill>
                   <a:schemeClr val="tx1">
                     <a:lumMod val="75000"/>
@@ -12346,7 +12137,7 @@
               </a:rPr>
               <a:t>Мащабируемост</a:t>
             </a:r>
-            <a:endParaRPr lang="bg-BG" sz="2400" dirty="0" smtClean="0">
+            <a:endParaRPr lang="bg-BG" sz="2400" dirty="0">
               <a:solidFill>
                 <a:schemeClr val="tx1">
                   <a:lumMod val="75000"/>
@@ -12371,7 +12162,7 @@
               </a:tabLst>
             </a:pPr>
             <a:r>
-              <a:rPr lang="bg-BG" sz="2400" dirty="0" smtClean="0">
+              <a:rPr lang="bg-BG" sz="2400" dirty="0">
                 <a:solidFill>
                   <a:schemeClr val="tx1">
                     <a:lumMod val="75000"/>
@@ -12381,14 +12172,6 @@
               </a:rPr>
               <a:t>Ценова ефективност</a:t>
             </a:r>
-            <a:endParaRPr lang="bg-BG" sz="2400" dirty="0">
-              <a:solidFill>
-                <a:schemeClr val="tx1">
-                  <a:lumMod val="75000"/>
-                  <a:lumOff val="25000"/>
-                </a:schemeClr>
-              </a:solidFill>
-            </a:endParaRPr>
           </a:p>
           <a:p>
             <a:pPr marL="854075" lvl="1" indent="-396875">
@@ -12406,7 +12189,7 @@
               </a:tabLst>
             </a:pPr>
             <a:r>
-              <a:rPr lang="bg-BG" sz="2400" dirty="0" smtClean="0">
+              <a:rPr lang="bg-BG" sz="2400" dirty="0">
                 <a:solidFill>
                   <a:schemeClr val="tx1">
                     <a:lumMod val="75000"/>
@@ -12433,7 +12216,7 @@
               </a:tabLst>
             </a:pPr>
             <a:r>
-              <a:rPr lang="bg-BG" sz="2400" dirty="0" smtClean="0">
+              <a:rPr lang="bg-BG" sz="2400" dirty="0">
                 <a:solidFill>
                   <a:schemeClr val="tx1">
                     <a:lumMod val="75000"/>
@@ -12497,13 +12280,6 @@
   <p:clrMapOvr>
     <a:masterClrMapping/>
   </p:clrMapOvr>
-  <p:timing>
-    <p:tnLst>
-      <p:par>
-        <p:cTn id="1" dur="indefinite" restart="never" nodeType="tmRoot"/>
-      </p:par>
-    </p:tnLst>
-  </p:timing>
 </p:sld>
 </file>
 
@@ -12619,14 +12395,9 @@
           </a:lstStyle>
           <a:p>
             <a:r>
-              <a:rPr lang="bg-BG" dirty="0" smtClean="0"/>
-              <a:t>Общностен </a:t>
-            </a:r>
-            <a:r>
-              <a:rPr lang="en-US" dirty="0" smtClean="0"/>
-              <a:t>cloud</a:t>
-            </a:r>
-            <a:endParaRPr lang="bg-BG" dirty="0"/>
+              <a:rPr lang="bg-BG" dirty="0"/>
+              <a:t>Общностен облак</a:t>
+            </a:r>
           </a:p>
         </p:txBody>
       </p:sp>
@@ -12681,13 +12452,6 @@
   <p:clrMapOvr>
     <a:masterClrMapping/>
   </p:clrMapOvr>
-  <p:timing>
-    <p:tnLst>
-      <p:par>
-        <p:cTn id="1" dur="indefinite" restart="never" nodeType="tmRoot"/>
-      </p:par>
-    </p:tnLst>
-  </p:timing>
 </p:sld>
 </file>
 
@@ -14105,7 +13869,7 @@
             </a:pPr>
             <a:r>
               <a:rPr lang="bg-BG" sz="2400" dirty="0"/>
-              <a:t>Гъвкавост</a:t>
+              <a:t>Бърза Еластичност/Гъвкавост</a:t>
             </a:r>
           </a:p>
           <a:p>
@@ -14138,7 +13902,7 @@
             </a:pPr>
             <a:r>
               <a:rPr lang="bg-BG" sz="2400" dirty="0"/>
-              <a:t>Поддръжка</a:t>
+              <a:t>Измервана на Производителността</a:t>
             </a:r>
           </a:p>
           <a:p>
@@ -14149,7 +13913,7 @@
             </a:pPr>
             <a:r>
               <a:rPr lang="bg-BG" sz="2400" dirty="0"/>
-              <a:t>Производителност</a:t>
+              <a:t>Продуктивност</a:t>
             </a:r>
           </a:p>
           <a:p>
@@ -14160,7 +13924,7 @@
             </a:pPr>
             <a:r>
               <a:rPr lang="bg-BG" sz="2400" dirty="0"/>
-              <a:t>Продуктивност</a:t>
+              <a:t>Надеждност</a:t>
             </a:r>
           </a:p>
           <a:p>
@@ -14171,22 +13935,7 @@
             </a:pPr>
             <a:r>
               <a:rPr lang="bg-BG" sz="2400" dirty="0"/>
-              <a:t>Надеждност</a:t>
-            </a:r>
-          </a:p>
-          <a:p>
-            <a:pPr marL="280988" indent="-280988">
-              <a:tabLst>
-                <a:tab pos="0" algn="l"/>
-              </a:tabLst>
-            </a:pPr>
-            <a:r>
-              <a:rPr lang="bg-BG" sz="2400" dirty="0"/>
-              <a:t>Еластичност и </a:t>
-            </a:r>
-            <a:r>
-              <a:rPr lang="bg-BG" sz="2400" dirty="0" err="1"/>
-              <a:t>мащабируемост</a:t>
+              <a:t>Мащабируемост</a:t>
             </a:r>
             <a:r>
               <a:rPr lang="en-US" sz="2400" dirty="0"/>

</xml_diff>

<commit_message>
Add slides for common info and cloud providers
</commit_message>
<xml_diff>
--- a/CLOUD COMPUTING.pptx
+++ b/CLOUD COMPUTING.pptx
@@ -5,7 +5,7 @@
     <p:sldMasterId id="2147483648" r:id="rId1"/>
   </p:sldMasterIdLst>
   <p:notesMasterIdLst>
-    <p:notesMasterId r:id="rId24"/>
+    <p:notesMasterId r:id="rId25"/>
   </p:notesMasterIdLst>
   <p:sldIdLst>
     <p:sldId id="256" r:id="rId2"/>
@@ -30,6 +30,7 @@
     <p:sldId id="278" r:id="rId21"/>
     <p:sldId id="279" r:id="rId22"/>
     <p:sldId id="280" r:id="rId23"/>
+    <p:sldId id="281" r:id="rId24"/>
   </p:sldIdLst>
   <p:sldSz cx="12192000" cy="6858000"/>
   <p:notesSz cx="6858000" cy="9144000"/>
@@ -190,7 +191,9 @@
           </p14:sldIdLst>
         </p14:section>
         <p14:section name="Енчо" id="{29817F77-7DFC-45ED-96DF-CE9CE5D863F6}">
-          <p14:sldIdLst/>
+          <p14:sldIdLst>
+            <p14:sldId id="281"/>
+          </p14:sldIdLst>
         </p14:section>
       </p14:sectionLst>
     </p:ext>
@@ -283,7 +286,7 @@
           <a:p>
             <a:fld id="{78AF2967-8E22-4B42-90F2-D88CC1BBE804}" type="datetimeFigureOut">
               <a:rPr lang="en-US" smtClean="0"/>
-              <a:t>4/13/2016</a:t>
+              <a:t>14-Apr-16</a:t>
             </a:fld>
             <a:endParaRPr lang="en-US"/>
           </a:p>
@@ -1382,6 +1385,90 @@
     <p:extLst>
       <p:ext uri="{BB962C8B-B14F-4D97-AF65-F5344CB8AC3E}">
         <p14:creationId xmlns:p14="http://schemas.microsoft.com/office/powerpoint/2010/main" val="2490846087"/>
+      </p:ext>
+    </p:extLst>
+  </p:cSld>
+  <p:clrMapOvr>
+    <a:masterClrMapping/>
+  </p:clrMapOvr>
+</p:notes>
+</file>
+
+<file path=ppt/notesSlides/notesSlide19.xml><?xml version="1.0" encoding="utf-8"?>
+<p:notes xmlns:a="http://schemas.openxmlformats.org/drawingml/2006/main" xmlns:r="http://schemas.openxmlformats.org/officeDocument/2006/relationships" xmlns:p="http://schemas.openxmlformats.org/presentationml/2006/main">
+  <p:cSld>
+    <p:spTree>
+      <p:nvGrpSpPr>
+        <p:cNvPr id="1" name=""/>
+        <p:cNvGrpSpPr/>
+        <p:nvPr/>
+      </p:nvGrpSpPr>
+      <p:grpSpPr>
+        <a:xfrm>
+          <a:off x="0" y="0"/>
+          <a:ext cx="0" cy="0"/>
+          <a:chOff x="0" y="0"/>
+          <a:chExt cx="0" cy="0"/>
+        </a:xfrm>
+      </p:grpSpPr>
+      <p:sp>
+        <p:nvSpPr>
+          <p:cNvPr id="2" name="Контейнер за изображение на слайда 1"/>
+          <p:cNvSpPr>
+            <a:spLocks noGrp="1" noRot="1" noChangeAspect="1"/>
+          </p:cNvSpPr>
+          <p:nvPr>
+            <p:ph type="sldImg"/>
+          </p:nvPr>
+        </p:nvSpPr>
+        <p:spPr/>
+      </p:sp>
+      <p:sp>
+        <p:nvSpPr>
+          <p:cNvPr id="3" name="Контейнер за бележки 2"/>
+          <p:cNvSpPr>
+            <a:spLocks noGrp="1"/>
+          </p:cNvSpPr>
+          <p:nvPr>
+            <p:ph type="body" idx="1"/>
+          </p:nvPr>
+        </p:nvSpPr>
+        <p:spPr/>
+        <p:txBody>
+          <a:bodyPr/>
+          <a:lstStyle/>
+          <a:p>
+            <a:endParaRPr lang="en-US" dirty="0"/>
+          </a:p>
+        </p:txBody>
+      </p:sp>
+      <p:sp>
+        <p:nvSpPr>
+          <p:cNvPr id="4" name="Контейнер за номер на слайда 3"/>
+          <p:cNvSpPr>
+            <a:spLocks noGrp="1"/>
+          </p:cNvSpPr>
+          <p:nvPr>
+            <p:ph type="sldNum" sz="quarter" idx="10"/>
+          </p:nvPr>
+        </p:nvSpPr>
+        <p:spPr/>
+        <p:txBody>
+          <a:bodyPr/>
+          <a:lstStyle/>
+          <a:p>
+            <a:fld id="{34DB9454-9595-409E-8BC5-8848C7CC2ACF}" type="slidenum">
+              <a:rPr lang="en-US" smtClean="0"/>
+              <a:t>23</a:t>
+            </a:fld>
+            <a:endParaRPr lang="en-US"/>
+          </a:p>
+        </p:txBody>
+      </p:sp>
+    </p:spTree>
+    <p:extLst>
+      <p:ext uri="{BB962C8B-B14F-4D97-AF65-F5344CB8AC3E}">
+        <p14:creationId xmlns:p14="http://schemas.microsoft.com/office/powerpoint/2010/main" val="2753664269"/>
       </p:ext>
     </p:extLst>
   </p:cSld>
@@ -2786,7 +2873,7 @@
             <a:fld id="{B61BEF0D-F0BB-DE4B-95CE-6DB70DBA9567}" type="datetimeFigureOut">
               <a:rPr lang="en-US" dirty="0"/>
               <a:pPr/>
-              <a:t>4/13/2016</a:t>
+              <a:t>14-Apr-16</a:t>
             </a:fld>
             <a:endParaRPr lang="en-US" dirty="0"/>
           </a:p>
@@ -3034,7 +3121,7 @@
             <a:fld id="{B61BEF0D-F0BB-DE4B-95CE-6DB70DBA9567}" type="datetimeFigureOut">
               <a:rPr lang="en-US" dirty="0"/>
               <a:pPr/>
-              <a:t>4/13/2016</a:t>
+              <a:t>14-Apr-16</a:t>
             </a:fld>
             <a:endParaRPr lang="en-US" dirty="0"/>
           </a:p>
@@ -3345,7 +3432,7 @@
             <a:fld id="{B61BEF0D-F0BB-DE4B-95CE-6DB70DBA9567}" type="datetimeFigureOut">
               <a:rPr lang="en-US" dirty="0"/>
               <a:pPr/>
-              <a:t>4/13/2016</a:t>
+              <a:t>14-Apr-16</a:t>
             </a:fld>
             <a:endParaRPr lang="en-US" dirty="0"/>
           </a:p>
@@ -3683,7 +3770,7 @@
             <a:fld id="{B61BEF0D-F0BB-DE4B-95CE-6DB70DBA9567}" type="datetimeFigureOut">
               <a:rPr lang="en-US" dirty="0"/>
               <a:pPr/>
-              <a:t>4/13/2016</a:t>
+              <a:t>14-Apr-16</a:t>
             </a:fld>
             <a:endParaRPr lang="en-US" dirty="0"/>
           </a:p>
@@ -3994,7 +4081,7 @@
             <a:fld id="{B61BEF0D-F0BB-DE4B-95CE-6DB70DBA9567}" type="datetimeFigureOut">
               <a:rPr lang="en-US" dirty="0"/>
               <a:pPr/>
-              <a:t>4/13/2016</a:t>
+              <a:t>14-Apr-16</a:t>
             </a:fld>
             <a:endParaRPr lang="en-US" dirty="0"/>
           </a:p>
@@ -4384,7 +4471,7 @@
             <a:fld id="{B61BEF0D-F0BB-DE4B-95CE-6DB70DBA9567}" type="datetimeFigureOut">
               <a:rPr lang="en-US" dirty="0"/>
               <a:pPr/>
-              <a:t>4/13/2016</a:t>
+              <a:t>14-Apr-16</a:t>
             </a:fld>
             <a:endParaRPr lang="en-US" dirty="0"/>
           </a:p>
@@ -4550,7 +4637,7 @@
           <a:p>
             <a:fld id="{55C6B4A9-1611-4792-9094-5F34BCA07E0B}" type="datetimeFigureOut">
               <a:rPr lang="en-US" dirty="0"/>
-              <a:t>4/13/2016</a:t>
+              <a:t>14-Apr-16</a:t>
             </a:fld>
             <a:endParaRPr lang="en-US" dirty="0"/>
           </a:p>
@@ -4726,7 +4813,7 @@
             <a:fld id="{B61BEF0D-F0BB-DE4B-95CE-6DB70DBA9567}" type="datetimeFigureOut">
               <a:rPr lang="en-US" dirty="0"/>
               <a:pPr/>
-              <a:t>4/13/2016</a:t>
+              <a:t>14-Apr-16</a:t>
             </a:fld>
             <a:endParaRPr lang="en-US" dirty="0"/>
           </a:p>
@@ -4899,7 +4986,7 @@
             <a:fld id="{B61BEF0D-F0BB-DE4B-95CE-6DB70DBA9567}" type="datetimeFigureOut">
               <a:rPr lang="en-US" dirty="0"/>
               <a:pPr/>
-              <a:t>4/13/2016</a:t>
+              <a:t>14-Apr-16</a:t>
             </a:fld>
             <a:endParaRPr lang="en-US" dirty="0"/>
           </a:p>
@@ -5143,7 +5230,7 @@
             <a:fld id="{B61BEF0D-F0BB-DE4B-95CE-6DB70DBA9567}" type="datetimeFigureOut">
               <a:rPr lang="en-US" dirty="0"/>
               <a:pPr/>
-              <a:t>4/13/2016</a:t>
+              <a:t>14-Apr-16</a:t>
             </a:fld>
             <a:endParaRPr lang="en-US" dirty="0"/>
           </a:p>
@@ -5371,7 +5458,7 @@
           <a:p>
             <a:fld id="{EB712588-04B1-427B-82EE-E8DB90309F08}" type="datetimeFigureOut">
               <a:rPr lang="en-US" dirty="0"/>
-              <a:t>4/13/2016</a:t>
+              <a:t>14-Apr-16</a:t>
             </a:fld>
             <a:endParaRPr lang="en-US" dirty="0"/>
           </a:p>
@@ -5741,7 +5828,7 @@
             <a:fld id="{B61BEF0D-F0BB-DE4B-95CE-6DB70DBA9567}" type="datetimeFigureOut">
               <a:rPr lang="en-US" dirty="0"/>
               <a:pPr/>
-              <a:t>4/13/2016</a:t>
+              <a:t>14-Apr-16</a:t>
             </a:fld>
             <a:endParaRPr lang="en-US" dirty="0"/>
           </a:p>
@@ -5861,7 +5948,7 @@
             <a:fld id="{B61BEF0D-F0BB-DE4B-95CE-6DB70DBA9567}" type="datetimeFigureOut">
               <a:rPr lang="en-US" dirty="0"/>
               <a:pPr/>
-              <a:t>4/13/2016</a:t>
+              <a:t>14-Apr-16</a:t>
             </a:fld>
             <a:endParaRPr lang="en-US" dirty="0"/>
           </a:p>
@@ -5953,7 +6040,7 @@
             <a:fld id="{B61BEF0D-F0BB-DE4B-95CE-6DB70DBA9567}" type="datetimeFigureOut">
               <a:rPr lang="en-US" dirty="0"/>
               <a:pPr/>
-              <a:t>4/13/2016</a:t>
+              <a:t>14-Apr-16</a:t>
             </a:fld>
             <a:endParaRPr lang="en-US" dirty="0"/>
           </a:p>
@@ -6204,7 +6291,7 @@
           <a:p>
             <a:fld id="{42A54C80-263E-416B-A8E0-580EDEADCBDC}" type="datetimeFigureOut">
               <a:rPr lang="en-US" dirty="0"/>
-              <a:t>4/13/2016</a:t>
+              <a:t>14-Apr-16</a:t>
             </a:fld>
             <a:endParaRPr lang="en-US" dirty="0"/>
           </a:p>
@@ -6463,7 +6550,7 @@
             <a:fld id="{B61BEF0D-F0BB-DE4B-95CE-6DB70DBA9567}" type="datetimeFigureOut">
               <a:rPr lang="en-US" dirty="0"/>
               <a:pPr/>
-              <a:t>4/13/2016</a:t>
+              <a:t>14-Apr-16</a:t>
             </a:fld>
             <a:endParaRPr lang="en-US" dirty="0"/>
           </a:p>
@@ -7203,7 +7290,7 @@
             <a:fld id="{B61BEF0D-F0BB-DE4B-95CE-6DB70DBA9567}" type="datetimeFigureOut">
               <a:rPr lang="en-US" dirty="0"/>
               <a:pPr/>
-              <a:t>4/13/2016</a:t>
+              <a:t>14-Apr-16</a:t>
             </a:fld>
             <a:endParaRPr lang="en-US" dirty="0"/>
           </a:p>
@@ -12455,6 +12542,472 @@
 </p:sld>
 </file>
 
+<file path=ppt/slides/slide23.xml><?xml version="1.0" encoding="utf-8"?>
+<p:sld xmlns:a="http://schemas.openxmlformats.org/drawingml/2006/main" xmlns:r="http://schemas.openxmlformats.org/officeDocument/2006/relationships" xmlns:p="http://schemas.openxmlformats.org/presentationml/2006/main">
+  <p:cSld>
+    <p:spTree>
+      <p:nvGrpSpPr>
+        <p:cNvPr id="1" name=""/>
+        <p:cNvGrpSpPr/>
+        <p:nvPr/>
+      </p:nvGrpSpPr>
+      <p:grpSpPr>
+        <a:xfrm>
+          <a:off x="0" y="0"/>
+          <a:ext cx="0" cy="0"/>
+          <a:chOff x="0" y="0"/>
+          <a:chExt cx="0" cy="0"/>
+        </a:xfrm>
+      </p:grpSpPr>
+      <p:sp>
+        <p:nvSpPr>
+          <p:cNvPr id="4" name="Title 1"/>
+          <p:cNvSpPr txBox="1">
+            <a:spLocks/>
+          </p:cNvSpPr>
+          <p:nvPr/>
+        </p:nvSpPr>
+        <p:spPr>
+          <a:xfrm>
+            <a:off x="640413" y="399245"/>
+            <a:ext cx="5987914" cy="1047481"/>
+          </a:xfrm>
+          <a:prstGeom prst="rect">
+            <a:avLst/>
+          </a:prstGeom>
+        </p:spPr>
+        <p:txBody>
+          <a:bodyPr vert="horz" lIns="91440" tIns="45720" rIns="91440" bIns="45720" rtlCol="0" anchor="t">
+            <a:normAutofit fontScale="92500"/>
+          </a:bodyPr>
+          <a:lstStyle>
+            <a:lvl1pPr algn="l" defTabSz="457200" rtl="0" eaLnBrk="1" latinLnBrk="0" hangingPunct="1">
+              <a:spcBef>
+                <a:spcPct val="0"/>
+              </a:spcBef>
+              <a:buNone/>
+              <a:defRPr sz="3600" kern="1200">
+                <a:solidFill>
+                  <a:schemeClr val="accent1"/>
+                </a:solidFill>
+                <a:latin typeface="+mj-lt"/>
+                <a:ea typeface="+mj-ea"/>
+                <a:cs typeface="+mj-cs"/>
+              </a:defRPr>
+            </a:lvl1pPr>
+            <a:lvl2pPr eaLnBrk="1" hangingPunct="1">
+              <a:defRPr>
+                <a:solidFill>
+                  <a:schemeClr val="tx2"/>
+                </a:solidFill>
+              </a:defRPr>
+            </a:lvl2pPr>
+            <a:lvl3pPr eaLnBrk="1" hangingPunct="1">
+              <a:defRPr>
+                <a:solidFill>
+                  <a:schemeClr val="tx2"/>
+                </a:solidFill>
+              </a:defRPr>
+            </a:lvl3pPr>
+            <a:lvl4pPr eaLnBrk="1" hangingPunct="1">
+              <a:defRPr>
+                <a:solidFill>
+                  <a:schemeClr val="tx2"/>
+                </a:solidFill>
+              </a:defRPr>
+            </a:lvl4pPr>
+            <a:lvl5pPr eaLnBrk="1" hangingPunct="1">
+              <a:defRPr>
+                <a:solidFill>
+                  <a:schemeClr val="tx2"/>
+                </a:solidFill>
+              </a:defRPr>
+            </a:lvl5pPr>
+            <a:lvl6pPr eaLnBrk="1" hangingPunct="1">
+              <a:defRPr>
+                <a:solidFill>
+                  <a:schemeClr val="tx2"/>
+                </a:solidFill>
+              </a:defRPr>
+            </a:lvl6pPr>
+            <a:lvl7pPr eaLnBrk="1" hangingPunct="1">
+              <a:defRPr>
+                <a:solidFill>
+                  <a:schemeClr val="tx2"/>
+                </a:solidFill>
+              </a:defRPr>
+            </a:lvl7pPr>
+            <a:lvl8pPr eaLnBrk="1" hangingPunct="1">
+              <a:defRPr>
+                <a:solidFill>
+                  <a:schemeClr val="tx2"/>
+                </a:solidFill>
+              </a:defRPr>
+            </a:lvl8pPr>
+            <a:lvl9pPr eaLnBrk="1" hangingPunct="1">
+              <a:defRPr>
+                <a:solidFill>
+                  <a:schemeClr val="tx2"/>
+                </a:solidFill>
+              </a:defRPr>
+            </a:lvl9pPr>
+          </a:lstStyle>
+          <a:p>
+            <a:r>
+              <a:rPr lang="bg-BG" dirty="0" smtClean="0"/>
+              <a:t>Известни </a:t>
+            </a:r>
+            <a:r>
+              <a:rPr lang="en-US" dirty="0" smtClean="0"/>
+              <a:t>Cloud </a:t>
+            </a:r>
+            <a:r>
+              <a:rPr lang="bg-BG" dirty="0" smtClean="0"/>
+              <a:t>доставчици</a:t>
+            </a:r>
+            <a:endParaRPr lang="bg-BG" dirty="0"/>
+          </a:p>
+        </p:txBody>
+      </p:sp>
+      <p:pic>
+        <p:nvPicPr>
+          <p:cNvPr id="1026" name="Picture 2" descr="https://www.facebook.com/images/fb_icon_325x325.png"/>
+          <p:cNvPicPr>
+            <a:picLocks noChangeAspect="1" noChangeArrowheads="1"/>
+          </p:cNvPicPr>
+          <p:nvPr/>
+        </p:nvPicPr>
+        <p:blipFill>
+          <a:blip r:embed="rId3">
+            <a:extLst>
+              <a:ext uri="{28A0092B-C50C-407E-A947-70E740481C1C}">
+                <a14:useLocalDpi xmlns:a14="http://schemas.microsoft.com/office/drawing/2010/main" val="0"/>
+              </a:ext>
+            </a:extLst>
+          </a:blip>
+          <a:srcRect/>
+          <a:stretch>
+            <a:fillRect/>
+          </a:stretch>
+        </p:blipFill>
+        <p:spPr bwMode="auto">
+          <a:xfrm>
+            <a:off x="640414" y="1232905"/>
+            <a:ext cx="1181684" cy="1181684"/>
+          </a:xfrm>
+          <a:prstGeom prst="rect">
+            <a:avLst/>
+          </a:prstGeom>
+          <a:noFill/>
+          <a:extLst>
+            <a:ext uri="{909E8E84-426E-40DD-AFC4-6F175D3DCCD1}">
+              <a14:hiddenFill xmlns:a14="http://schemas.microsoft.com/office/drawing/2010/main">
+                <a:solidFill>
+                  <a:srgbClr val="FFFFFF"/>
+                </a:solidFill>
+              </a14:hiddenFill>
+            </a:ext>
+          </a:extLst>
+        </p:spPr>
+      </p:pic>
+      <p:sp>
+        <p:nvSpPr>
+          <p:cNvPr id="2" name="AutoShape 4" descr="data:image/jpeg;base64,/9j/4AAQSkZJRgABAQAAAQABAAD/2wCEAAkGBw8QDw0QDxIQEBAQEA8QDxAQEA8QDw8QFRUYFxUVFRUYHSggGBolGxUVIjEhJSkrLi4uFx8zODMtNygtLisBCgoKDg0OGhAQGyslHyUrLS0tLS0uLS0tKy0tLS0tLS0tLS0tLS0tLS0tLS0tLS0tLS0tLS0tLSstLS0tLS0tLf/AABEIAIwBZwMBEQACEQEDEQH/xAAcAAEAAQUBAQAAAAAAAAAAAAAABwEDBQYIBAL/xABIEAABAwIABgoPBwQCAwAAAAABAAIDBBEFBgcSITETNEFRYXFzdLGyFCIjMjM1UlOBkZKTobPRFhckQlRy0mKClMFD4RVjov/EABsBAQACAwEBAAAAAAAAAAAAAAABBgMEBQIH/8QANBEAAgECAwYFAwMFAAMAAAAAAAECAwQRM3EFEjEyQVETFSFhkVKBsRQioQYjNEJyFsHw/9oADAMBAAIRAxEAPwCcUAQBAEAQBAEAQBAEAQBAEAQBAEAQBAEAQBAEAQBAEAQBAEAQBAEAQBAEAQBAEAQBAEAQBAEAQBAEAQBAEAUYgopBVAEAQBAEAQBAEAQBAEAQBAEAQBAEAQBAEAQBAEAQBAEAQBAEAQBAEAQBAEAQBAEAQBAEAQFC4IQ3gYysxhoYiRLU07CPymVmd6r3WaNvVlwi/gxuvTXo2jHnHnBf6qP2ZP4r3+ir/Szx+qpfUj20uM1BLYR1VO4nU3ZWB3sk3XiVtVjxiz0rik/9kZVjwQCCCDpBBuCsJmxxBeN8KUsSMVwGeN8esJgxihnjfHrCYMbyKhwOpQTiVQBAEAQBAEAQBAEAQBAEAQBAfOeN8esKcGRvIZ43x6wmDGKGeN8esJgxvI+rqCQgCAIAgCAIAgCAIAgCAIAgCAIAgKFAYPGzGWLB8Oe/tpH3EMQOmRwG7vNG6f8AdlsW1tKvPdXDqzXuLhUY4viQ1hzGisrHEzSuDNyGMuZEP7Qe24zdWOhZ0qS9F92cOrdVanXAw1ltYLoa2JVSQUKh4dSVidD4tQ5lFRM1ZtPCP/kKnV3jUbXctFJfsSIpyoyOGE5LEjuMOgEgaiu/syMXQ9UcfaE5Kr6M1LZn+U72iujuR7I0fEn3Y2Z3lO9oqNyPZfwSqk+7+SWcjriaOquSfxRGk3/4o1X9qrCqsOx2dnNum8TbsPTOjpap7DmvZDI5rha4cGkgrQpJSmk+5vVHhFshT7bYU/VSexD/ABVm8vt/p/JX/wBbW+ofbfCn6qT2If4p5fb/AE/kfra31FyHHXChewGqksXNB7SHUSP6V4nYW6i2onqF7WckmydQqwWBH0hIQBAEAQBAEAQGKxqP4Cu5tN1Cs1tmx1Rir5csOxz6JneU72irbuR7L+CteJPHi/kbM/yne0VO5Hsv4I8Sfdl6jmdssPbO8JH+Y+UFjq04bj9FwPdKpPfXqzpAKn4ln6FUJCAIAgCAIAgCAIAgCAIAgCAIAgKFAQJjthd1XXVD73YxxiiG4GMNifSblWmxoqnRS6v1K5eVXUqv2MAt01AoB9MaSQ0Alx1NAJJ9AUNpcWelFvgilSxzAc4OYSDbPBbp9KhSi1jielCSfqjpWmjDGMYNTWtaPQLKmyeMmy0R5SGMqnjOTkYOgqybLyF9zhbRzTUF0DQCkEuZG9p1XOj8qNV3a2ctDubMy3qbZjLtKs5vN1SufQzFqb1XkZzuriVVhAXabv4/3s6wXmpyPQ90+danSipfEtXQ+lJIQBAEAQBAEAQGKxr2hX82n6hWe2zo6ow3GVLQ55CtxV3xCkF+i8LDysfWCx1eR6GSlzo6TVNLT0KoSEAQBAEAQBAEAQBAEAQBAEAQBAeTCs+xwVEnm4pX+y0n/S901jNL3PE3hF6HN44fTxq5Iqr4hSQfcbC4hrdLnENaN9xNh8SvMpbqbZ6isWkdA4t4CiooGRRtGdmtMr7dtI+2lxPHubiqNxXlVm22WajRjTikkZOSIOBa4BwOsOAIPGCsKbMrSPsISQplU8ZycjB0FWXZeQvucDaWcaguiaAQEuZG9p1XOnfKjVd2tnLQ7mzcp6m64SpNmhmiJzRJG9mcBe2cLXXNhLdkmdCSxWBoX3TxfqpPdsXV83qdkc3yyPcfdPF+ql92xPN6nZDyyHcqzJVEC09lSGxB8GzcN1EtrVGmsETHZsYtPEkVck6ZVAEAQBAEAQBAEBisa9oV/Np+oVnts6OqMNxlS0OeQrcVd8QpBeovCw8pH1gsdXkloZKPOjpRU0tPQqhIQBAEAQBAUugKoAgCAICl0AugKoCl0BizjJQA2NXSC2sdkQ/yWXwKv0v4Zidemv8AZGOxjxgoX0daxlVSuc6mna1raiEuc4xuAAGdpKy0aFVVIvdfFdGY6tem4NYrgQUrYmVoID14KcBUUxcQGieEuJIDQA8XJJ1LDcJulJLsZaPpNNk9DGXB/wCspP8AJh/kqo7er9L+GWRV6f1L5Bxlwf8ArKT/ACYf5J4FX6X8Mjx6f1L5MnHIHBrmkOa4AtcCCCDqIO6FiwafqZU8V6ELZVPGcnIwdBVl2XkL7nB2jnGoLomgEBLmRvadVzp3yo1XdrZy0O5szLepvksrWBznENa0Euc4gBoGsknUFy0mzot4GNGMuD/1lJ/kw/yWX9PV+l/DMfj0/qXyPtJg/wDWUn+RD/JPAq/S/hkePT+pfIGMlBqFXSEnQB2RDcn2k8Cr9L+GT49P6kZQFYce5kKqSQgPklCPTqYvCGMlDTm01TCx3kbI0v8AZGlZqdtVqcsWY516cOLRh5Mo2DGnwkjuFsMhHrstjy64+kwO/orqfLMpODD+eQccMn0R7NuOxH6+j3MpQ424OmIbHUw5x0Br3bG4k7gDrXPEsNS0rQ4xZmjc05cJGaab6lrmcxmNe0K/m0/UKz22dHVGG4ypaHPIVuKu+IUgvUXhYeUj6wWOryS0MlHnR0oqaWnoEJZ5KzCdPBm7PNDDnXzdlkZHnWte2cdNrj1r1CnOfKsTxKpGPo3geb7SYP8A1lJ/kQ/yXvwKv0v4Z48en9S+R9pMH/rKT/Ih/kngVfpfwx49P6l8n1HjBQuc1rKqlc5xDWtbUQlzidQAB0lQ6NRLFxfwSq1OTwTRkljMpizjDQgkGqpgQbEbPFcHe1r1uSNhWdfpCXr7MfaOg/V0vv4vqm5LsT+iuPol8M+4cPUb3NYyppnucbNa2aJznHeAB0lNyXY8yta8VjKDw0ZkLryYPTAxOE8ZKOmNpp42vtfMBzpLftGkL2oSZt0Nn3FfLg2Yj7xsHX76Xj2F/wBF68GRveQXuHL/ACjM4GxgpazP7HfnlgBcM1zS0HVrHAvEouJo3VjXtsPFjhiXJMNQNk2Il4k8nYZjouBe+bbNuR22rSii2Y1a1HDfw9Ck2HqVsMdQ6VohktmP7Yh19VgBfcPqTdfQmNpXlUdNReK4o58qR3STlH9Yq5R4FMnzMtKcDxiwpAQBQBZSMWCFDSJTOi8X9p0fN4eoFTqvPLUtNLkREeVTxnJyMHQVYdl5C+5xNo5xqC6JoBAS5kb2nVc6d8qNVza+ctDubMy3qbZjNtKs5vN1StGhmR1N6ryM53AVwKqwgLlMO3j/AHs6QvFRfseh7pP961OllTS1oXQg17GrGynoG9v3SZwuyBpAceFx/K3hPoutq2tKld/t4dzXuLmFFevEifDuONbVkh0pij3IYSWM9J1u9J9AXeoWFKkvRYvuzjVrypUfZGvLdSRpthSAgCgYkoZG5JXCuDnvMbOxxGwucWMJ2QuzQdX5fUuDteMU44L1O1s2UmnizdcavF9dzafqFc62zo6o37jLloc9BW8qz4hSC9ReFh5SPrBY6vJLQyUedHSippaehYrquOGKSWVwbHG0ueTuABeoQc5KK6kTkoLFkBYz4bfXVL536G97EzzcY1DjOs8KtVrbKhDd6lbua7qzxMStk1xZPcklTJhipsbW107e3cPw7CNLGEeEI3HHc3hxqv7Su95+HHguJ2rG1cVvyJFdqPEuUjqLic61Y7rLyj+sV0Ir9qPq1uv7UdEWV6M2BlcVR+PoecRdK8VOVnO2t/h1NDecoOODonOpKV1pP+aVuuP+hvDbWdzj1YKVPH1ZWdibHVVePW5ei7kZOJJJJJJNySbknfJW0lgXaMVFYJFFJJI+R9m3Xck3pP8AtatwU7+qJetOOpu1RRPNUJRbM7Flh16c9z2uGjesCsCfoVyFWMaO4+O8n8JmsV2KtU6nMLdjzWNjdC3OsBK/N2biAzXEHd2VyyKaR0qG0KVOr4ksfXHHTp/97ER1Mjdkk0jv37o8oq2xksD51OL3my3nt3x61O8uGJ43WVUkBSAoB857d8esJiid19gZG749YUOSwxJUWdG4v7To+bw9QKnVeeWpaKXIiI8qnjOTkYOgqxbLyF9zibRzjUF0TQCAlzI3tOq5075Uarm185aHc2ZlvU2zGXaVZzebqlaNDMjqb1XkZzuriVUIC7TeEj/ezrBeKnI9D3T51qdKqmFrNfx0xibQU5fodK+7IGG9nPtrP9I1n0DdWzaW7r1N3p1Ne5reFDHqQXWVUksj5ZXF8j3FznONySegbw3NStVOEYRUYr0RXJzc3vSLK9HjEqgKb3DoHCeBMUSk3wPT/wCPntfYZrb+xSW9dl48WH1L5R78Gp2Z590jdGsbo9C9p48Dw01xJayOw2pKl3lVFr8DWNHSSq/taWNVL2O5s1YU3qbXjXtCv5tP1CtC2zo6o27jKloc8q3lXfEKQXqLwsPKx9YLHV5JaMyUudHSd1TS09CJcqGM2zSdhwu7lE68xGqSUam8Ib08S72zLXBeJJaHH2hcYvciaAuucoIDccnmKvZk2zTNvTQu0gjRNIPyadbRoJ9A31zdoXfhR3Icz/g6Nlbb73pcCaGiyrh3dA7UUXElHOtX4WXlH9Yrox5UfVrfKjovwWVJmPTg6rMM0UoFzG4PA1aRq+KhrFGC6oeNSlTfUsSSFznOcSXOJc4nWXE3JPpU4YIyQpxhFRXBeh8qT3iVQEn5IGdxq3b8rR6m/wDa1K79Skf1O/78V7f+yQbLXKyLIC3sDPJb7IU70u553I9jCY7QtGDa8hrQex5NQG8ti0lLx46mC5jFUpPDoQKrYVtlFJB7MDbZpeXg64WG4ypaGag/7kdTorYGeS32QqhvS7lm3I9hsDPJb7ITel3G5HsXALWA1KD0QplU8ZycjB0FWXZeQvucDaOcaguiaAQEuZG9p1XOnfKjVc2vnLQ7mzMt6m2Yy7SrObzdUrRoZkdTeq8jOdwriVUIC5Td/H+9nWCx1OR6HulzrU6VVNLV7kHZRcLmpr5QD3OnvBHxjvz6XA+hoVm2dSVOkn34nAvqrnUw6I1hdA0WUQGcxTxckr59jacyNgDppbXzG7gG+46bDgK07u6jbx9+xtW1s6z9iaMCYuUlI0NgiaHWsZHAOldxvOn0alW6txUqvGbO9ToQprCKMtZYTNgeDCeCKapbmzwxyDUC5ozm8TtY9CyU61Sm/wBsmjHOlCawaxPjF/AkNFE6GDOzDI+QB5ziM7cvbSBw6VNWtKrLelxFOlGmsInzjXtCv5tP1CvVtnR1R5uMqWhzyFbirviFIL1F4WHlI+sFjq8j0MlLnWpNGULGXsKnzIz+ImBbH/62/mk9Gi3CRwqt2Nr41T14I7t5ceFDBcSEide7fWdZKs6TSwK+3i8WE9CDKYt4EkrqhkEdwD20sm5HGNbuPcA31rXVzGhTxNi3oeLLAnrBtBHTxRwwtzY42hrRxbpO6Tvqq1Juct+XEscIKC3VwPWF5PYdqKlEric6VfhZeUf1iuhHlR9Wt8qOi/BZUmYID0YPopJ5WRQtL5HmzQPiSdwDfUSluo17i4p29Nzm8EiTMDZNadrWuqnvlfbSxhLIgeMdsfX6FqyrvoU66/qSvJ4UUor5ZmTiNg21tgHHnvv67rx4sjQ87vccd8yOBMCQUbHspw5rXvzyHOL7GwGgnTuLzKTbNS7vKt1JSqvFmUXk1QgCAweO/i2v5vJ0LZs8+OpgucqWhAKtnQrBRSD2YG2zS8vB12rDcZUtGZaGZHU6OVP6lpKoCiAhTKp4zk5GDoKsuy8hfc4G0c41BdE0AgJcyN7TqudO+VGq5tfOWh3NmZb1Nsxl2lWc3m6pWjQzI6m9V5Gc7q4lVCAu03hI/wB7OsFjqcj0PdPnWp0hUyZrHu8lrneoEqnRWMsC0yeCZzY+Qvc551vJceNxuelXOKwil7FVm8ZNnyvR5CAnLJzgwU+D4Dbtp+7yHdJd3vqaGhVS/qudd+3oWOzp7lJG0LTRtlVICAIDFY17Qr+bT9QrPbZ0dUYbjKloc8hW4q74hSC5TvDXxuN7NexxtrsCDo9S8zW9FrueoS3ZJnsw9hWSsqZaiTW82a3cZGO9aOLpJWK3oKjBQRkr1XVm5Mx6zGEu0sD5HsjjaXPe4MY0ay4mwC8zmoRcn0PUIuUlFdSdsTcXGUFOGaHSvs6d4/M/eH9IuQP+1Vbu5dee906FktqCoww6mwLWNgICjtRUolcTnSr8LLyj+sV0I8qPq1vlR0X4LKkzBAyVcleBwyB9U4dvMS1h8mNpt8Tf1BalaWLwKL/Ud26lbwVwj+TfAsBXCqAIAgCAIDB47+La/m8nQtmzz46mC5ypaEAq2dCsFFIPZgbbNLy8HzGrDcZUtGZaGZHU6OVO6lpKqQUQEKZVPGcnIwdBVl2XkL7nA2jnGoLomgEBLmRvadVzp3yo1XNr5y0O5szLeptmMu0qzm83VK0aGZHU3qvIzncK4lVCAu03hI/3s6wWOpyPQ90+dHRWFWk09QBrMMoHpaVUaTwqRfui0T5Wc3s1DiCuK4FVfEqpICEo6HxZkDqGiLdXY0HwYAehU6v6VJY92Wii8YLQyYWIylUAQBAYrGvaFfzafqFZ7bOjqjDcZUtDnkK3FXfEKQXaZgdJG06nPY0212LgCvE3hFs9QWMkj1YcwY+kqZqeS943EA+Ww6Wu9I/3vLHQrKrSU0e69J05uLPAs5iZ9xSOa5rmktc0hzXDW1w0gheZRUluvgz1CTi8UTniPjI2upgXWE8VmztHlbjwPJdY+ojcVWvLZ0KmHToWK1rqrDHqbKtQ2ggKO1FSiVxOdKvwsvKP6xXQjyo+rW+VHRfgsqTMFIJ6xQiDcH0AG7TwuPG5ocfiVzp8zPl20ZOV3U/6f5MwvJphAEAQBAEBg8d/FtfzeToWzZ58dTBc5UtCAVbOhWCikHswNtml5eD5jVhuMqWjMtDMjqdHKndS0lVIKICFMqnjOTkYOgqy7LyF9zgbRzjUF0TQCAlzI3tOq5075Uarm185aHc2ZlvU2zGXaVZzebqlaNDMjqb1XkZzuFcSqsIC7TeEj/ezrBY6nI9D3T51qdJvbcEHUQQqangy1NYo5xwpRmCeeEixilkZbgB0fCyuFCe/TjL2KvWg41GjyrMYggJWyU4xNdF2DK4CSPOdBc9/GdJaOFpvo3iN4qvbTtt2XiR4M7ez6+9HcfQkQFco6ZVAEBS6AxeNe0K/m0/UKz22dDVGG4ypaHPIVuKu+IUgvUXhYeVj6wWOryS0Zkpc6JXyq4A2aBtXGO6U47pbW6DdP9p08RcuBs253J7j4P8AJ2b+hvw3lxRERVixOEwgMtizhuShqY52XLe9lZfRJGdY490cIWvdW6rU918TYt6/hT3lwJ8oKyOeKOaJwdHI0OaRug9B4FVJwcJOL4lkhJSWKPSvJ6KO1FSiVxOdKvwsvKP6xXQjyo+rW+VHRfgsqTMEBPuK20KDmtP8tq58+Zny2/8A8qr/ANS/JlV5NQIAgCAIAgMHjv4tr+bydC2bPPjqYLnKloQCrZ0KwUUg9mBts0vLwfMasNxlS0ZloZkdTo5U7qWkqpBRAQplU8ZycjB0FWXZeQvucDaOcaguiaAQEuZG9p1XOnfKjVc2vnLQ7mzMt6m2Yy7SrObzdUrRoZkdTeq8jOd1cSqhAXabwkf72dYLxU5Hoe6XOtTpRUwtaIoys4CLJm1rB2ktmTkflkAswn9zdH9o313dl3Cw8J/Y420aDx8REers4HKCA+43lrmuaS1zSC1zSWuad8EaQVDipLBr0PUZNeq9DfsBZTpowGVcezgC2yxkMk/uae1PGLcS49fZUW8ab+x06O0mlhM2VmUzBxGnZwd7YSegrS8suMfRG5+votcTyV2VOlaDsMM0h3M7NjbfhNyfgstPZNV8zSMU9pQXKejEPGyfCE9WJWsjZHHE6NjLm13OBu499qG4FjvbSNCKweJ7tLp1m8TYsatoV3Np+oVqWubDVGzXypaHPQVvKu+IUgvUXhYeUj6wWOryS0PdLnR0jIwOBa4AtcCHAi4IOggqnJtPFFqwxWDIExvwGaGrkht3N3bwO34zucYNx6Ad1WmyuFVpp9eDK5d0PCn7GDW2aoUg3zJhjNsEvYkzu4zO7k4k2ilP5eBrunjXI2lab0fFjxXE6lhcYPw5EvArgHaDtRUolcTnSr8LLyj+sV0I8qPq1vlR0X4LKkzBAyfcVtoUHNaf5bVoT5mfLb//ACqv/UvyZVeDUCAIAgCAIDB47+La/m8nQtmzz46mC5ypaEAq2dCsFFIPZgbbVLy8HzGrDcZUtGZaGZHU6OCp/UtBVCSiAhTKp4zk5GDoKsuy8hfc4G0c01BdE0AoBLmRvadVzo/KjVd2vnLQ7mzMt6m2Yy7SrObzdUrRoZkdTeq8jOdwriVVhAXabwkf72dYLxU5Hoe6fOtTpVUwtZ56+jjnikilaHxyNLXNO6Pru3Uwm4SUo9DzKKlFpkIY3YpzUDydMlO49zm3r6mv3nfA/BWa0vY112fY4FzaOk8VwNcW+aRVQCikBAVUAkDI2fxNXyDPg/8A7XI2xyR1OrszmZImNW0K/m0/UK49tnQ1R07jKloc9BW8rD4hSQXqLwsPKR9YLHV5HoZKXOjpRU0tJqmUTAHZlI5zBeenzpI7a3C3bs9IGjhAW7YXPg1PZ+hqXlDxIenFEIK0FeYUkFQo46E8PUmnJ1jP2ZBsUp/EwgB53ZWahJx7h4eNVm+tfBniuDLBZ3Kqxw6m3u1HiWguJvLic61nhZeUf1iuhHlR9Wt8qOi/BZXozBAyfcVtoUHNaf5bVz58zPlt/wD5VX/qX5ZlV5NQIAgCAIAgMVjTSPnoquGIZ0kkL2MFwLuI0aSs1vNQqxk+CMVaLlTcURF93+FPMt97F9VYPMrfu/g4nl9b2H3fYU8y33sX1TzK37v4Hl9b2PTg3ETCTJ4HuhAayWJzjssehrXgnd3gsdbaFCVNxT4o90rGrGabwJoVdO6VQFEBGGP2KVdVVz5oIw+MxxNDi9jdIBvoJXasb2lSpbsn6nKvLSpVqb0TXfu+wp5lvvYvqtzzK37v4NTy+t7D7v8ACnmR72L6p5lb938Dy+t7Eh5NcC1FHTTx1DAxz5y9oDmuu3MY3cO+0rj7QrQrVFKHY6llRlSg1I2DDkDpKWpjYLvfFIxouBdxaQNK1aUlGabNmosYtIhwZPsKeZHvYvqrH5lb938HC8vrew+7/CnmW+9i+qeZW/d/A8vrex9wYgYTD2Ewiwc0nusWoHjXie0aDi1i/g9QsKqkn6E3KtneFkB8Twte0teA5rgQ5rgC1w3iCpTaeKIaTWDNDw7kxgkzn0jzTuNzsbrvhvwbrfiOBdOjtSpH0n6r+TnVdnQl6x9GaVX4h4Thv3HZR5ULw8eo2PwXThtGhLrgaE7GrHoYWbBNUzv6eob+6CUfGy2lcUnwkvk13QqLoz5iwdUP7yCd/wC2GV3QEdamuMl8kKjUfRmSo8UMIy2zaaUA7sgEQ9OcQVhnfUIf7fBljZ1ZdCQsnmKFVQyzTVBiGyRhgYxznOBzgbk2A3Ny649/eQrJRj0OrZ2sqTbkbbh+mfLSVcTBd8kErGC4F3FpAFzwrRoSUakZPo0blWLlCSXYh0ZPsKeZb72L6qw+ZUO7+Dh+X1vYfd9hTzLfexfVT5lb938Dy+t7FymxBwm2SNxhFmvYT3WLUHAndXiptGg4tJnunYVVJP0JtVbO4EJImxsxAqnVcslHG18Mp2S2exuxvPfNsSNF9I413bTaMI01GpxRx7mwk54w4GH+77CnmW+9i+q2fMrfu/g1/L63sPu/wp5ke9i+qnzK34Yv4Hl9b2PZgjFHDFLPHPFC3PjOoyx5r2nvmnTqIWGveW1Wm4Nv4MtG1r0p7ywJhicXMaS0sJaCWkglp3iRoVf4M7cfch2oxEwiXyOETbF7iO6R6ieNbSrRSRfqO3rOMFFt+iXQt/YLCXmm+8j+qnxomT/yCy7v4H2Cwl5pvvI/qp8aI/8AILLu/glzANO6KkpIniz44IWPFwbOawAi/GFpyeMmyi3dRVK85x4OTa+7PeoNcIAgCAIAgKIAgCAWQjAqhIQBAUQBAEACAqgKIAgCAqgCAIAgKIBZBgEI9ClkJKhAVQFEAQBAVQBAUsgCAIAgCAWQBALIAgKoAgCAIAgCAIAgCAIAgCAIAgCAIAgCAIAgCAIAgCAIAgCAIAgCAIAgCAIAgCAIAgCAIAgCAIAgCAIAgCAIAgP/2Q=="/>
+          <p:cNvSpPr>
+            <a:spLocks noChangeAspect="1" noChangeArrowheads="1"/>
+          </p:cNvSpPr>
+          <p:nvPr/>
+        </p:nvSpPr>
+        <p:spPr bwMode="auto">
+          <a:xfrm>
+            <a:off x="155575" y="-890588"/>
+            <a:ext cx="4762500" cy="1866901"/>
+          </a:xfrm>
+          <a:prstGeom prst="rect">
+            <a:avLst/>
+          </a:prstGeom>
+          <a:noFill/>
+          <a:extLst>
+            <a:ext uri="{909E8E84-426E-40DD-AFC4-6F175D3DCCD1}">
+              <a14:hiddenFill xmlns:a14="http://schemas.microsoft.com/office/drawing/2010/main">
+                <a:solidFill>
+                  <a:srgbClr val="FFFFFF"/>
+                </a:solidFill>
+              </a14:hiddenFill>
+            </a:ext>
+          </a:extLst>
+        </p:spPr>
+        <p:txBody>
+          <a:bodyPr vert="horz" wrap="square" lIns="91440" tIns="45720" rIns="91440" bIns="45720" numCol="1" anchor="t" anchorCtr="0" compatLnSpc="1">
+            <a:prstTxWarp prst="textNoShape">
+              <a:avLst/>
+            </a:prstTxWarp>
+          </a:bodyPr>
+          <a:lstStyle/>
+          <a:p>
+            <a:endParaRPr lang="en-US"/>
+          </a:p>
+        </p:txBody>
+      </p:sp>
+      <p:pic>
+        <p:nvPicPr>
+          <p:cNvPr id="1034" name="Picture 10" descr="http://www.cloudave.com/wp-content/uploads/2011/11/cloud-foundry-logo1.png"/>
+          <p:cNvPicPr>
+            <a:picLocks noChangeAspect="1" noChangeArrowheads="1"/>
+          </p:cNvPicPr>
+          <p:nvPr/>
+        </p:nvPicPr>
+        <p:blipFill>
+          <a:blip r:embed="rId4">
+            <a:extLst>
+              <a:ext uri="{28A0092B-C50C-407E-A947-70E740481C1C}">
+                <a14:useLocalDpi xmlns:a14="http://schemas.microsoft.com/office/drawing/2010/main" val="0"/>
+              </a:ext>
+            </a:extLst>
+          </a:blip>
+          <a:srcRect/>
+          <a:stretch>
+            <a:fillRect/>
+          </a:stretch>
+        </p:blipFill>
+        <p:spPr bwMode="auto">
+          <a:xfrm>
+            <a:off x="155575" y="2671181"/>
+            <a:ext cx="2857500" cy="2857500"/>
+          </a:xfrm>
+          <a:prstGeom prst="rect">
+            <a:avLst/>
+          </a:prstGeom>
+          <a:noFill/>
+          <a:extLst>
+            <a:ext uri="{909E8E84-426E-40DD-AFC4-6F175D3DCCD1}">
+              <a14:hiddenFill xmlns:a14="http://schemas.microsoft.com/office/drawing/2010/main">
+                <a:solidFill>
+                  <a:srgbClr val="FFFFFF"/>
+                </a:solidFill>
+              </a14:hiddenFill>
+            </a:ext>
+          </a:extLst>
+        </p:spPr>
+      </p:pic>
+      <p:pic>
+        <p:nvPicPr>
+          <p:cNvPr id="1036" name="Picture 12" descr="https://blog.phusion.nl/content/images/2015/11/Heroku.png"/>
+          <p:cNvPicPr>
+            <a:picLocks noChangeAspect="1" noChangeArrowheads="1"/>
+          </p:cNvPicPr>
+          <p:nvPr/>
+        </p:nvPicPr>
+        <p:blipFill>
+          <a:blip r:embed="rId5">
+            <a:extLst>
+              <a:ext uri="{28A0092B-C50C-407E-A947-70E740481C1C}">
+                <a14:useLocalDpi xmlns:a14="http://schemas.microsoft.com/office/drawing/2010/main" val="0"/>
+              </a:ext>
+            </a:extLst>
+          </a:blip>
+          <a:srcRect/>
+          <a:stretch>
+            <a:fillRect/>
+          </a:stretch>
+        </p:blipFill>
+        <p:spPr bwMode="auto">
+          <a:xfrm>
+            <a:off x="3893656" y="2736559"/>
+            <a:ext cx="4894262" cy="2065140"/>
+          </a:xfrm>
+          <a:prstGeom prst="rect">
+            <a:avLst/>
+          </a:prstGeom>
+          <a:noFill/>
+          <a:extLst>
+            <a:ext uri="{909E8E84-426E-40DD-AFC4-6F175D3DCCD1}">
+              <a14:hiddenFill xmlns:a14="http://schemas.microsoft.com/office/drawing/2010/main">
+                <a:solidFill>
+                  <a:srgbClr val="FFFFFF"/>
+                </a:solidFill>
+              </a14:hiddenFill>
+            </a:ext>
+          </a:extLst>
+        </p:spPr>
+      </p:pic>
+      <p:pic>
+        <p:nvPicPr>
+          <p:cNvPr id="1038" name="Picture 14" descr="http://selfpublishingadvice.org/wp-content/uploads/2013/10/twitter-1024x1024.png"/>
+          <p:cNvPicPr>
+            <a:picLocks noChangeAspect="1" noChangeArrowheads="1"/>
+          </p:cNvPicPr>
+          <p:nvPr/>
+        </p:nvPicPr>
+        <p:blipFill>
+          <a:blip r:embed="rId6">
+            <a:extLst>
+              <a:ext uri="{28A0092B-C50C-407E-A947-70E740481C1C}">
+                <a14:useLocalDpi xmlns:a14="http://schemas.microsoft.com/office/drawing/2010/main" val="0"/>
+              </a:ext>
+            </a:extLst>
+          </a:blip>
+          <a:srcRect/>
+          <a:stretch>
+            <a:fillRect/>
+          </a:stretch>
+        </p:blipFill>
+        <p:spPr bwMode="auto">
+          <a:xfrm>
+            <a:off x="6713057" y="399245"/>
+            <a:ext cx="2584942" cy="2584942"/>
+          </a:xfrm>
+          <a:prstGeom prst="rect">
+            <a:avLst/>
+          </a:prstGeom>
+          <a:noFill/>
+          <a:extLst>
+            <a:ext uri="{909E8E84-426E-40DD-AFC4-6F175D3DCCD1}">
+              <a14:hiddenFill xmlns:a14="http://schemas.microsoft.com/office/drawing/2010/main">
+                <a:solidFill>
+                  <a:srgbClr val="FFFFFF"/>
+                </a:solidFill>
+              </a14:hiddenFill>
+            </a:ext>
+          </a:extLst>
+        </p:spPr>
+      </p:pic>
+      <p:pic>
+        <p:nvPicPr>
+          <p:cNvPr id="1040" name="Picture 16" descr="http://getcloudify.org/img/openstack-one-color-alt.png"/>
+          <p:cNvPicPr>
+            <a:picLocks noChangeAspect="1" noChangeArrowheads="1"/>
+          </p:cNvPicPr>
+          <p:nvPr/>
+        </p:nvPicPr>
+        <p:blipFill>
+          <a:blip r:embed="rId7">
+            <a:extLst>
+              <a:ext uri="{28A0092B-C50C-407E-A947-70E740481C1C}">
+                <a14:useLocalDpi xmlns:a14="http://schemas.microsoft.com/office/drawing/2010/main" val="0"/>
+              </a:ext>
+            </a:extLst>
+          </a:blip>
+          <a:srcRect/>
+          <a:stretch>
+            <a:fillRect/>
+          </a:stretch>
+        </p:blipFill>
+        <p:spPr bwMode="auto">
+          <a:xfrm>
+            <a:off x="2753153" y="4625659"/>
+            <a:ext cx="1930399" cy="1986899"/>
+          </a:xfrm>
+          <a:prstGeom prst="rect">
+            <a:avLst/>
+          </a:prstGeom>
+          <a:noFill/>
+          <a:extLst>
+            <a:ext uri="{909E8E84-426E-40DD-AFC4-6F175D3DCCD1}">
+              <a14:hiddenFill xmlns:a14="http://schemas.microsoft.com/office/drawing/2010/main">
+                <a:solidFill>
+                  <a:srgbClr val="FFFFFF"/>
+                </a:solidFill>
+              </a14:hiddenFill>
+            </a:ext>
+          </a:extLst>
+        </p:spPr>
+      </p:pic>
+      <p:pic>
+        <p:nvPicPr>
+          <p:cNvPr id="1042" name="Picture 18" descr="https://lh3.googleusercontent.com/-c9bKgaRfC3Q/AAAAAAAAAAI/AAAAAAAAJUE/Eo2MLCqyiZs/photo.jpg"/>
+          <p:cNvPicPr>
+            <a:picLocks noChangeAspect="1" noChangeArrowheads="1"/>
+          </p:cNvPicPr>
+          <p:nvPr/>
+        </p:nvPicPr>
+        <p:blipFill>
+          <a:blip r:embed="rId8">
+            <a:extLst>
+              <a:ext uri="{28A0092B-C50C-407E-A947-70E740481C1C}">
+                <a14:useLocalDpi xmlns:a14="http://schemas.microsoft.com/office/drawing/2010/main" val="0"/>
+              </a:ext>
+            </a:extLst>
+          </a:blip>
+          <a:srcRect/>
+          <a:stretch>
+            <a:fillRect/>
+          </a:stretch>
+        </p:blipFill>
+        <p:spPr bwMode="auto">
+          <a:xfrm>
+            <a:off x="5916360" y="4666608"/>
+            <a:ext cx="1905000" cy="1905000"/>
+          </a:xfrm>
+          <a:prstGeom prst="rect">
+            <a:avLst/>
+          </a:prstGeom>
+          <a:noFill/>
+          <a:extLst>
+            <a:ext uri="{909E8E84-426E-40DD-AFC4-6F175D3DCCD1}">
+              <a14:hiddenFill xmlns:a14="http://schemas.microsoft.com/office/drawing/2010/main">
+                <a:solidFill>
+                  <a:srgbClr val="FFFFFF"/>
+                </a:solidFill>
+              </a14:hiddenFill>
+            </a:ext>
+          </a:extLst>
+        </p:spPr>
+      </p:pic>
+      <p:pic>
+        <p:nvPicPr>
+          <p:cNvPr id="1044" name="Picture 20" descr="https://cf.dropboxstatic.com/static/images/brand/glyph@2x-vflJ1vxbq.png"/>
+          <p:cNvPicPr>
+            <a:picLocks noChangeAspect="1" noChangeArrowheads="1"/>
+          </p:cNvPicPr>
+          <p:nvPr/>
+        </p:nvPicPr>
+        <p:blipFill>
+          <a:blip r:embed="rId9">
+            <a:extLst>
+              <a:ext uri="{28A0092B-C50C-407E-A947-70E740481C1C}">
+                <a14:useLocalDpi xmlns:a14="http://schemas.microsoft.com/office/drawing/2010/main" val="0"/>
+              </a:ext>
+            </a:extLst>
+          </a:blip>
+          <a:srcRect/>
+          <a:stretch>
+            <a:fillRect/>
+          </a:stretch>
+        </p:blipFill>
+        <p:spPr bwMode="auto">
+          <a:xfrm>
+            <a:off x="3206037" y="1106454"/>
+            <a:ext cx="2038350" cy="1905000"/>
+          </a:xfrm>
+          <a:prstGeom prst="rect">
+            <a:avLst/>
+          </a:prstGeom>
+          <a:noFill/>
+          <a:extLst>
+            <a:ext uri="{909E8E84-426E-40DD-AFC4-6F175D3DCCD1}">
+              <a14:hiddenFill xmlns:a14="http://schemas.microsoft.com/office/drawing/2010/main">
+                <a:solidFill>
+                  <a:srgbClr val="FFFFFF"/>
+                </a:solidFill>
+              </a14:hiddenFill>
+            </a:ext>
+          </a:extLst>
+        </p:spPr>
+      </p:pic>
+    </p:spTree>
+    <p:extLst>
+      <p:ext uri="{BB962C8B-B14F-4D97-AF65-F5344CB8AC3E}">
+        <p14:creationId xmlns:p14="http://schemas.microsoft.com/office/powerpoint/2010/main" val="956478541"/>
+      </p:ext>
+    </p:extLst>
+  </p:cSld>
+  <p:clrMapOvr>
+    <a:masterClrMapping/>
+  </p:clrMapOvr>
+</p:sld>
+</file>
+
 <file path=ppt/slides/slide3.xml><?xml version="1.0" encoding="utf-8"?>
 <p:sld xmlns:a="http://schemas.openxmlformats.org/drawingml/2006/main" xmlns:r="http://schemas.openxmlformats.org/officeDocument/2006/relationships" xmlns:p="http://schemas.openxmlformats.org/presentationml/2006/main">
   <p:cSld>
@@ -12826,6 +13379,285 @@
               <a:buNone/>
             </a:pPr>
             <a:endParaRPr lang="bg-BG" sz="2400" dirty="0"/>
+          </a:p>
+        </p:txBody>
+      </p:sp>
+      <p:sp>
+        <p:nvSpPr>
+          <p:cNvPr id="3" name="Текстово поле 2"/>
+          <p:cNvSpPr txBox="1"/>
+          <p:nvPr/>
+        </p:nvSpPr>
+        <p:spPr>
+          <a:xfrm>
+            <a:off x="671510" y="1216646"/>
+            <a:ext cx="7072313" cy="4909036"/>
+          </a:xfrm>
+          <a:prstGeom prst="rect">
+            <a:avLst/>
+          </a:prstGeom>
+          <a:noFill/>
+        </p:spPr>
+        <p:txBody>
+          <a:bodyPr wrap="square" rtlCol="0">
+            <a:spAutoFit/>
+          </a:bodyPr>
+          <a:lstStyle/>
+          <a:p>
+            <a:pPr marL="285750" indent="-285750">
+              <a:spcBef>
+                <a:spcPts val="1000"/>
+              </a:spcBef>
+              <a:buClr>
+                <a:schemeClr val="accent1"/>
+              </a:buClr>
+              <a:buFont typeface="Wingdings 3" charset="2"/>
+              <a:buChar char=""/>
+            </a:pPr>
+            <a:r>
+              <a:rPr lang="bg-BG" sz="2000" dirty="0">
+                <a:solidFill>
+                  <a:schemeClr val="tx1">
+                    <a:lumMod val="75000"/>
+                    <a:lumOff val="25000"/>
+                  </a:schemeClr>
+                </a:solidFill>
+              </a:rPr>
+              <a:t>Разпространен термин в информационните технологии</a:t>
+            </a:r>
+          </a:p>
+          <a:p>
+            <a:pPr marL="285750" indent="-285750">
+              <a:spcBef>
+                <a:spcPts val="1000"/>
+              </a:spcBef>
+              <a:buClr>
+                <a:schemeClr val="accent1"/>
+              </a:buClr>
+              <a:buFont typeface="Wingdings 3" charset="2"/>
+              <a:buChar char=""/>
+            </a:pPr>
+            <a:r>
+              <a:rPr lang="bg-BG" sz="2000" dirty="0">
+                <a:solidFill>
+                  <a:schemeClr val="tx1">
+                    <a:lumMod val="75000"/>
+                    <a:lumOff val="25000"/>
+                  </a:schemeClr>
+                </a:solidFill>
+              </a:rPr>
+              <a:t>Обединяване на изчислителната мощ на много компютри в една</a:t>
+            </a:r>
+          </a:p>
+          <a:p>
+            <a:pPr marL="285750" indent="-285750">
+              <a:spcBef>
+                <a:spcPts val="1000"/>
+              </a:spcBef>
+              <a:buClr>
+                <a:schemeClr val="accent1"/>
+              </a:buClr>
+              <a:buFont typeface="Wingdings 3" charset="2"/>
+              <a:buChar char=""/>
+            </a:pPr>
+            <a:r>
+              <a:rPr lang="bg-BG" sz="2000" dirty="0">
+                <a:solidFill>
+                  <a:schemeClr val="tx1">
+                    <a:lumMod val="75000"/>
+                    <a:lumOff val="25000"/>
+                  </a:schemeClr>
+                </a:solidFill>
+              </a:rPr>
+              <a:t>Ресурсите се предоставят като услуга</a:t>
+            </a:r>
+          </a:p>
+          <a:p>
+            <a:pPr marL="285750" indent="-285750">
+              <a:spcBef>
+                <a:spcPts val="1000"/>
+              </a:spcBef>
+              <a:buClr>
+                <a:schemeClr val="accent1"/>
+              </a:buClr>
+              <a:buFont typeface="Wingdings 3" charset="2"/>
+              <a:buChar char=""/>
+            </a:pPr>
+            <a:r>
+              <a:rPr lang="bg-BG" sz="2000" dirty="0">
+                <a:solidFill>
+                  <a:schemeClr val="tx1">
+                    <a:lumMod val="75000"/>
+                    <a:lumOff val="25000"/>
+                  </a:schemeClr>
+                </a:solidFill>
+              </a:rPr>
+              <a:t>Споделени физически и виртуални ресурси</a:t>
+            </a:r>
+          </a:p>
+          <a:p>
+            <a:pPr marL="285750" indent="-285750">
+              <a:spcBef>
+                <a:spcPts val="1000"/>
+              </a:spcBef>
+              <a:buClr>
+                <a:schemeClr val="accent1"/>
+              </a:buClr>
+              <a:buFont typeface="Wingdings 3" charset="2"/>
+              <a:buChar char=""/>
+            </a:pPr>
+            <a:r>
+              <a:rPr lang="bg-BG" sz="2000" dirty="0">
+                <a:solidFill>
+                  <a:schemeClr val="tx1">
+                    <a:lumMod val="75000"/>
+                    <a:lumOff val="25000"/>
+                  </a:schemeClr>
+                </a:solidFill>
+              </a:rPr>
+              <a:t>Няма локален персонален хардуер или софтуер</a:t>
+            </a:r>
+          </a:p>
+          <a:p>
+            <a:pPr marL="285750" indent="-285750">
+              <a:spcBef>
+                <a:spcPts val="1000"/>
+              </a:spcBef>
+              <a:buClr>
+                <a:schemeClr val="accent1"/>
+              </a:buClr>
+              <a:buFont typeface="Wingdings 3" charset="2"/>
+              <a:buChar char=""/>
+            </a:pPr>
+            <a:r>
+              <a:rPr lang="bg-BG" sz="2000" dirty="0">
+                <a:solidFill>
+                  <a:schemeClr val="tx1">
+                    <a:lumMod val="75000"/>
+                    <a:lumOff val="25000"/>
+                  </a:schemeClr>
+                </a:solidFill>
+              </a:rPr>
+              <a:t>Позволява подбирането на:</a:t>
+            </a:r>
+          </a:p>
+          <a:p>
+            <a:pPr marL="742950" lvl="1" indent="-285750">
+              <a:spcBef>
+                <a:spcPts val="1000"/>
+              </a:spcBef>
+              <a:buClr>
+                <a:schemeClr val="accent1"/>
+              </a:buClr>
+              <a:buFont typeface="Wingdings 3" charset="2"/>
+              <a:buChar char=""/>
+            </a:pPr>
+            <a:r>
+              <a:rPr lang="bg-BG" sz="2000" dirty="0">
+                <a:solidFill>
+                  <a:schemeClr val="tx1">
+                    <a:lumMod val="75000"/>
+                    <a:lumOff val="25000"/>
+                  </a:schemeClr>
+                </a:solidFill>
+              </a:rPr>
+              <a:t>сървъри,</a:t>
+            </a:r>
+          </a:p>
+          <a:p>
+            <a:pPr marL="742950" lvl="1" indent="-285750">
+              <a:spcBef>
+                <a:spcPts val="1000"/>
+              </a:spcBef>
+              <a:buClr>
+                <a:schemeClr val="accent1"/>
+              </a:buClr>
+              <a:buFont typeface="Wingdings 3" charset="2"/>
+              <a:buChar char=""/>
+            </a:pPr>
+            <a:r>
+              <a:rPr lang="bg-BG" sz="2000" dirty="0">
+                <a:solidFill>
+                  <a:schemeClr val="tx1">
+                    <a:lumMod val="75000"/>
+                    <a:lumOff val="25000"/>
+                  </a:schemeClr>
+                </a:solidFill>
+              </a:rPr>
+              <a:t>м</a:t>
+            </a:r>
+            <a:r>
+              <a:rPr lang="bg-BG" sz="2000" dirty="0">
+                <a:solidFill>
+                  <a:schemeClr val="tx1">
+                    <a:lumMod val="75000"/>
+                    <a:lumOff val="25000"/>
+                  </a:schemeClr>
+                </a:solidFill>
+              </a:rPr>
+              <a:t>режи</a:t>
+            </a:r>
+          </a:p>
+          <a:p>
+            <a:pPr marL="742950" lvl="1" indent="-285750">
+              <a:spcBef>
+                <a:spcPts val="1000"/>
+              </a:spcBef>
+              <a:buClr>
+                <a:schemeClr val="accent1"/>
+              </a:buClr>
+              <a:buFont typeface="Wingdings 3" charset="2"/>
+              <a:buChar char=""/>
+            </a:pPr>
+            <a:r>
+              <a:rPr lang="bg-BG" sz="2000" dirty="0">
+                <a:solidFill>
+                  <a:schemeClr val="tx1">
+                    <a:lumMod val="75000"/>
+                    <a:lumOff val="25000"/>
+                  </a:schemeClr>
+                </a:solidFill>
+              </a:rPr>
+              <a:t>приложения</a:t>
+            </a:r>
+          </a:p>
+          <a:p>
+            <a:pPr marL="742950" lvl="1" indent="-285750">
+              <a:spcBef>
+                <a:spcPts val="1000"/>
+              </a:spcBef>
+              <a:buClr>
+                <a:schemeClr val="accent1"/>
+              </a:buClr>
+              <a:buFont typeface="Wingdings 3" charset="2"/>
+              <a:buChar char=""/>
+            </a:pPr>
+            <a:r>
+              <a:rPr lang="bg-BG" sz="2000" dirty="0" err="1">
+                <a:solidFill>
+                  <a:schemeClr val="tx1">
+                    <a:lumMod val="75000"/>
+                    <a:lumOff val="25000"/>
+                  </a:schemeClr>
+                </a:solidFill>
+              </a:rPr>
+              <a:t>сървиси</a:t>
+            </a:r>
+            <a:endParaRPr lang="bg-BG" sz="2000" dirty="0">
+              <a:solidFill>
+                <a:schemeClr val="tx1">
+                  <a:lumMod val="75000"/>
+                  <a:lumOff val="25000"/>
+                </a:schemeClr>
+              </a:solidFill>
+            </a:endParaRPr>
+          </a:p>
+          <a:p>
+            <a:pPr marL="742950" lvl="1" indent="-285750">
+              <a:buFont typeface="Arial" panose="020B0604020202020204" pitchFamily="34" charset="0"/>
+              <a:buChar char="•"/>
+            </a:pPr>
+            <a:endParaRPr lang="bg-BG" dirty="0" smtClean="0"/>
           </a:p>
         </p:txBody>
       </p:sp>
@@ -13213,6 +14045,166 @@
               <a:buNone/>
             </a:pPr>
             <a:endParaRPr lang="bg-BG" sz="2400" dirty="0"/>
+          </a:p>
+        </p:txBody>
+      </p:sp>
+      <p:sp>
+        <p:nvSpPr>
+          <p:cNvPr id="2" name="Текстово поле 1"/>
+          <p:cNvSpPr txBox="1"/>
+          <p:nvPr/>
+        </p:nvSpPr>
+        <p:spPr>
+          <a:xfrm>
+            <a:off x="640413" y="1446726"/>
+            <a:ext cx="6329363" cy="3067506"/>
+          </a:xfrm>
+          <a:prstGeom prst="rect">
+            <a:avLst/>
+          </a:prstGeom>
+          <a:noFill/>
+        </p:spPr>
+        <p:txBody>
+          <a:bodyPr wrap="square" rtlCol="0">
+            <a:spAutoFit/>
+          </a:bodyPr>
+          <a:lstStyle/>
+          <a:p>
+            <a:pPr marL="285750" indent="-285750">
+              <a:spcBef>
+                <a:spcPts val="1000"/>
+              </a:spcBef>
+              <a:buClr>
+                <a:schemeClr val="accent1"/>
+              </a:buClr>
+              <a:buFont typeface="Wingdings 3" charset="2"/>
+              <a:buChar char=""/>
+            </a:pPr>
+            <a:r>
+              <a:rPr lang="bg-BG" sz="2000" dirty="0">
+                <a:solidFill>
+                  <a:schemeClr val="tx1">
+                    <a:lumMod val="75000"/>
+                    <a:lumOff val="25000"/>
+                  </a:schemeClr>
+                </a:solidFill>
+              </a:rPr>
+              <a:t>Подобрява работата на клиентите</a:t>
+            </a:r>
+          </a:p>
+          <a:p>
+            <a:pPr marL="285750" indent="-285750">
+              <a:spcBef>
+                <a:spcPts val="1000"/>
+              </a:spcBef>
+              <a:buClr>
+                <a:schemeClr val="accent1"/>
+              </a:buClr>
+              <a:buFont typeface="Wingdings 3" charset="2"/>
+              <a:buChar char=""/>
+            </a:pPr>
+            <a:r>
+              <a:rPr lang="bg-BG" sz="2000" dirty="0">
+                <a:solidFill>
+                  <a:schemeClr val="tx1">
+                    <a:lumMod val="75000"/>
+                    <a:lumOff val="25000"/>
+                  </a:schemeClr>
+                </a:solidFill>
+              </a:rPr>
+              <a:t>Позволява бързо и динамично публикуване на продукти</a:t>
+            </a:r>
+          </a:p>
+          <a:p>
+            <a:pPr marL="285750" indent="-285750">
+              <a:spcBef>
+                <a:spcPts val="1000"/>
+              </a:spcBef>
+              <a:buClr>
+                <a:schemeClr val="accent1"/>
+              </a:buClr>
+              <a:buFont typeface="Wingdings 3" charset="2"/>
+              <a:buChar char=""/>
+            </a:pPr>
+            <a:r>
+              <a:rPr lang="bg-BG" sz="2000" dirty="0">
+                <a:solidFill>
+                  <a:schemeClr val="tx1">
+                    <a:lumMod val="75000"/>
+                    <a:lumOff val="25000"/>
+                  </a:schemeClr>
+                </a:solidFill>
+              </a:rPr>
+              <a:t>Няма забавяне на доставката на продукти от фирмите към клиента</a:t>
+            </a:r>
+          </a:p>
+          <a:p>
+            <a:pPr marL="285750" indent="-285750">
+              <a:spcBef>
+                <a:spcPts val="1000"/>
+              </a:spcBef>
+              <a:buClr>
+                <a:schemeClr val="accent1"/>
+              </a:buClr>
+              <a:buFont typeface="Wingdings 3" charset="2"/>
+              <a:buChar char=""/>
+            </a:pPr>
+            <a:r>
+              <a:rPr lang="bg-BG" sz="2000" dirty="0">
+                <a:solidFill>
+                  <a:schemeClr val="tx1">
+                    <a:lumMod val="75000"/>
+                    <a:lumOff val="25000"/>
+                  </a:schemeClr>
+                </a:solidFill>
+              </a:rPr>
+              <a:t>Позволява по-бърза разработка на приложенията в </a:t>
+            </a:r>
+            <a:r>
+              <a:rPr lang="bg-BG" sz="2000" dirty="0" err="1">
+                <a:solidFill>
+                  <a:schemeClr val="tx1">
+                    <a:lumMod val="75000"/>
+                    <a:lumOff val="25000"/>
+                  </a:schemeClr>
+                </a:solidFill>
+              </a:rPr>
+              <a:t>клауда</a:t>
+            </a:r>
+            <a:r>
+              <a:rPr lang="bg-BG" sz="2000" dirty="0">
+                <a:solidFill>
+                  <a:schemeClr val="tx1">
+                    <a:lumMod val="75000"/>
+                    <a:lumOff val="25000"/>
+                  </a:schemeClr>
+                </a:solidFill>
+              </a:rPr>
+              <a:t> от програмистите</a:t>
+            </a:r>
+          </a:p>
+          <a:p>
+            <a:pPr marL="285750" indent="-285750">
+              <a:spcBef>
+                <a:spcPts val="1000"/>
+              </a:spcBef>
+              <a:buClr>
+                <a:schemeClr val="accent1"/>
+              </a:buClr>
+              <a:buFont typeface="Wingdings 3" charset="2"/>
+              <a:buChar char=""/>
+            </a:pPr>
+            <a:r>
+              <a:rPr lang="bg-BG" sz="2000" dirty="0">
+                <a:solidFill>
+                  <a:schemeClr val="tx1">
+                    <a:lumMod val="75000"/>
+                    <a:lumOff val="25000"/>
+                  </a:schemeClr>
+                </a:solidFill>
+              </a:rPr>
+              <a:t>„Плащаш толкова колкото ще ползваш“</a:t>
+            </a:r>
           </a:p>
         </p:txBody>
       </p:sp>

</xml_diff>